<commit_message>
Updated UserGuide and added git ignore
</commit_message>
<xml_diff>
--- a/docs/PyKrev Interface.pptx
+++ b/docs/PyKrev Interface.pptx
@@ -107,6 +107,11 @@
       </a:defRPr>
     </a:lvl9pPr>
   </p:defaultTextStyle>
+  <p:extLst>
+    <p:ext uri="{EFAFB233-063F-42B5-8137-9DF3F51BA10A}">
+      <p15:sldGuideLst xmlns:p15="http://schemas.microsoft.com/office/powerpoint/2012/main"/>
+    </p:ext>
+  </p:extLst>
 </p:presentation>
 </file>
 
@@ -192,7 +197,7 @@
           <a:p>
             <a:fld id="{9740D62B-E2DD-4F8E-B5D8-976E68D9A4FC}" type="datetimeFigureOut">
               <a:rPr lang="en-GB" smtClean="0"/>
-              <a:t>17/11/2020</a:t>
+              <a:t>18/11/2020</a:t>
             </a:fld>
             <a:endParaRPr lang="en-GB"/>
           </a:p>
@@ -693,7 +698,7 @@
           <a:p>
             <a:fld id="{2E13BE49-2C18-44EC-B643-1287673AC118}" type="datetimeFigureOut">
               <a:rPr lang="en-GB" smtClean="0"/>
-              <a:t>17/11/2020</a:t>
+              <a:t>18/11/2020</a:t>
             </a:fld>
             <a:endParaRPr lang="en-GB"/>
           </a:p>
@@ -893,7 +898,7 @@
           <a:p>
             <a:fld id="{2E13BE49-2C18-44EC-B643-1287673AC118}" type="datetimeFigureOut">
               <a:rPr lang="en-GB" smtClean="0"/>
-              <a:t>17/11/2020</a:t>
+              <a:t>18/11/2020</a:t>
             </a:fld>
             <a:endParaRPr lang="en-GB"/>
           </a:p>
@@ -1103,7 +1108,7 @@
           <a:p>
             <a:fld id="{2E13BE49-2C18-44EC-B643-1287673AC118}" type="datetimeFigureOut">
               <a:rPr lang="en-GB" smtClean="0"/>
-              <a:t>17/11/2020</a:t>
+              <a:t>18/11/2020</a:t>
             </a:fld>
             <a:endParaRPr lang="en-GB"/>
           </a:p>
@@ -1303,7 +1308,7 @@
           <a:p>
             <a:fld id="{2E13BE49-2C18-44EC-B643-1287673AC118}" type="datetimeFigureOut">
               <a:rPr lang="en-GB" smtClean="0"/>
-              <a:t>17/11/2020</a:t>
+              <a:t>18/11/2020</a:t>
             </a:fld>
             <a:endParaRPr lang="en-GB"/>
           </a:p>
@@ -1579,7 +1584,7 @@
           <a:p>
             <a:fld id="{2E13BE49-2C18-44EC-B643-1287673AC118}" type="datetimeFigureOut">
               <a:rPr lang="en-GB" smtClean="0"/>
-              <a:t>17/11/2020</a:t>
+              <a:t>18/11/2020</a:t>
             </a:fld>
             <a:endParaRPr lang="en-GB"/>
           </a:p>
@@ -1847,7 +1852,7 @@
           <a:p>
             <a:fld id="{2E13BE49-2C18-44EC-B643-1287673AC118}" type="datetimeFigureOut">
               <a:rPr lang="en-GB" smtClean="0"/>
-              <a:t>17/11/2020</a:t>
+              <a:t>18/11/2020</a:t>
             </a:fld>
             <a:endParaRPr lang="en-GB"/>
           </a:p>
@@ -2262,7 +2267,7 @@
           <a:p>
             <a:fld id="{2E13BE49-2C18-44EC-B643-1287673AC118}" type="datetimeFigureOut">
               <a:rPr lang="en-GB" smtClean="0"/>
-              <a:t>17/11/2020</a:t>
+              <a:t>18/11/2020</a:t>
             </a:fld>
             <a:endParaRPr lang="en-GB"/>
           </a:p>
@@ -2404,7 +2409,7 @@
           <a:p>
             <a:fld id="{2E13BE49-2C18-44EC-B643-1287673AC118}" type="datetimeFigureOut">
               <a:rPr lang="en-GB" smtClean="0"/>
-              <a:t>17/11/2020</a:t>
+              <a:t>18/11/2020</a:t>
             </a:fld>
             <a:endParaRPr lang="en-GB"/>
           </a:p>
@@ -2517,7 +2522,7 @@
           <a:p>
             <a:fld id="{2E13BE49-2C18-44EC-B643-1287673AC118}" type="datetimeFigureOut">
               <a:rPr lang="en-GB" smtClean="0"/>
-              <a:t>17/11/2020</a:t>
+              <a:t>18/11/2020</a:t>
             </a:fld>
             <a:endParaRPr lang="en-GB"/>
           </a:p>
@@ -2830,7 +2835,7 @@
           <a:p>
             <a:fld id="{2E13BE49-2C18-44EC-B643-1287673AC118}" type="datetimeFigureOut">
               <a:rPr lang="en-GB" smtClean="0"/>
-              <a:t>17/11/2020</a:t>
+              <a:t>18/11/2020</a:t>
             </a:fld>
             <a:endParaRPr lang="en-GB"/>
           </a:p>
@@ -3119,7 +3124,7 @@
           <a:p>
             <a:fld id="{2E13BE49-2C18-44EC-B643-1287673AC118}" type="datetimeFigureOut">
               <a:rPr lang="en-GB" smtClean="0"/>
-              <a:t>17/11/2020</a:t>
+              <a:t>18/11/2020</a:t>
             </a:fld>
             <a:endParaRPr lang="en-GB"/>
           </a:p>
@@ -3362,7 +3367,7 @@
           <a:p>
             <a:fld id="{2E13BE49-2C18-44EC-B643-1287673AC118}" type="datetimeFigureOut">
               <a:rPr lang="en-GB" smtClean="0"/>
-              <a:t>17/11/2020</a:t>
+              <a:t>18/11/2020</a:t>
             </a:fld>
             <a:endParaRPr lang="en-GB"/>
           </a:p>
@@ -3779,1542 +3784,1563 @@
           <a:chExt cx="0" cy="0"/>
         </a:xfrm>
       </p:grpSpPr>
-      <p:sp>
-        <p:nvSpPr>
-          <p:cNvPr id="38" name="Left Brace 37">
-            <a:extLst>
-              <a:ext uri="{FF2B5EF4-FFF2-40B4-BE49-F238E27FC236}">
-                <a16:creationId xmlns:a16="http://schemas.microsoft.com/office/drawing/2014/main" id="{17B59A6E-315B-4B3B-A099-80D84DBFD058}"/>
-              </a:ext>
-            </a:extLst>
-          </p:cNvPr>
-          <p:cNvSpPr/>
+      <p:grpSp>
+        <p:nvGrpSpPr>
+          <p:cNvPr id="2" name="Group 1">
+            <a:extLst>
+              <a:ext uri="{FF2B5EF4-FFF2-40B4-BE49-F238E27FC236}">
+                <a16:creationId xmlns:a16="http://schemas.microsoft.com/office/drawing/2014/main" id="{56E3B14B-4D8B-41A0-B7F8-2715EDB9F66A}"/>
+              </a:ext>
+            </a:extLst>
+          </p:cNvPr>
+          <p:cNvGrpSpPr/>
           <p:nvPr/>
-        </p:nvSpPr>
-        <p:spPr>
-          <a:xfrm rot="5400000">
-            <a:off x="1989151" y="856898"/>
-            <a:ext cx="785054" cy="4359150"/>
+        </p:nvGrpSpPr>
+        <p:grpSpPr>
+          <a:xfrm>
+            <a:off x="123548" y="163556"/>
+            <a:ext cx="11944904" cy="5026090"/>
+            <a:chOff x="123548" y="-128675"/>
+            <a:chExt cx="11944904" cy="5026090"/>
           </a:xfrm>
-          <a:prstGeom prst="leftBrace">
-            <a:avLst/>
-          </a:prstGeom>
-          <a:solidFill>
-            <a:schemeClr val="accent2">
-              <a:lumMod val="20000"/>
-              <a:lumOff val="80000"/>
-            </a:schemeClr>
-          </a:solidFill>
-          <a:ln>
+        </p:grpSpPr>
+        <p:sp>
+          <p:nvSpPr>
+            <p:cNvPr id="38" name="Left Brace 37">
+              <a:extLst>
+                <a:ext uri="{FF2B5EF4-FFF2-40B4-BE49-F238E27FC236}">
+                  <a16:creationId xmlns:a16="http://schemas.microsoft.com/office/drawing/2014/main" id="{17B59A6E-315B-4B3B-A099-80D84DBFD058}"/>
+                </a:ext>
+              </a:extLst>
+            </p:cNvPr>
+            <p:cNvSpPr/>
+            <p:nvPr/>
+          </p:nvSpPr>
+          <p:spPr>
+            <a:xfrm rot="5400000">
+              <a:off x="1989151" y="856898"/>
+              <a:ext cx="785054" cy="4359150"/>
+            </a:xfrm>
+            <a:prstGeom prst="leftBrace">
+              <a:avLst/>
+            </a:prstGeom>
             <a:solidFill>
               <a:schemeClr val="accent2">
                 <a:lumMod val="20000"/>
                 <a:lumOff val="80000"/>
               </a:schemeClr>
             </a:solidFill>
-          </a:ln>
-        </p:spPr>
-        <p:style>
-          <a:lnRef idx="1">
-            <a:schemeClr val="accent1"/>
-          </a:lnRef>
-          <a:fillRef idx="0">
-            <a:schemeClr val="accent1"/>
-          </a:fillRef>
-          <a:effectRef idx="0">
-            <a:schemeClr val="accent1"/>
-          </a:effectRef>
-          <a:fontRef idx="minor">
-            <a:schemeClr val="tx1"/>
-          </a:fontRef>
-        </p:style>
-        <p:txBody>
-          <a:bodyPr rtlCol="0" anchor="ctr"/>
-          <a:lstStyle/>
-          <a:p>
-            <a:pPr algn="ctr"/>
-            <a:endParaRPr lang="en-GB"/>
-          </a:p>
-        </p:txBody>
-      </p:sp>
-      <p:sp>
-        <p:nvSpPr>
-          <p:cNvPr id="15" name="Right Brace 14">
-            <a:extLst>
-              <a:ext uri="{FF2B5EF4-FFF2-40B4-BE49-F238E27FC236}">
-                <a16:creationId xmlns:a16="http://schemas.microsoft.com/office/drawing/2014/main" id="{53DFC4B4-62FF-4762-B70C-3815C1AEAD9E}"/>
-              </a:ext>
-            </a:extLst>
-          </p:cNvPr>
-          <p:cNvSpPr/>
-          <p:nvPr/>
-        </p:nvSpPr>
-        <p:spPr>
-          <a:xfrm rot="16200000">
-            <a:off x="5510373" y="-3078550"/>
-            <a:ext cx="1318941" cy="9982985"/>
-          </a:xfrm>
-          <a:prstGeom prst="rightBrace">
-            <a:avLst/>
-          </a:prstGeom>
-          <a:solidFill>
-            <a:schemeClr val="accent1">
-              <a:lumMod val="40000"/>
-              <a:lumOff val="60000"/>
-            </a:schemeClr>
-          </a:solidFill>
-          <a:ln w="9525"/>
-        </p:spPr>
-        <p:style>
-          <a:lnRef idx="1">
-            <a:schemeClr val="accent1"/>
-          </a:lnRef>
-          <a:fillRef idx="0">
-            <a:schemeClr val="accent1"/>
-          </a:fillRef>
-          <a:effectRef idx="0">
-            <a:schemeClr val="accent1"/>
-          </a:effectRef>
-          <a:fontRef idx="minor">
-            <a:schemeClr val="tx1"/>
-          </a:fontRef>
-        </p:style>
-        <p:txBody>
-          <a:bodyPr rtlCol="0" anchor="ctr"/>
-          <a:lstStyle/>
-          <a:p>
-            <a:pPr algn="ctr"/>
-            <a:endParaRPr lang="en-GB"/>
-          </a:p>
-        </p:txBody>
-      </p:sp>
-      <p:pic>
-        <p:nvPicPr>
-          <p:cNvPr id="5" name="Picture 4">
-            <a:extLst>
-              <a:ext uri="{FF2B5EF4-FFF2-40B4-BE49-F238E27FC236}">
-                <a16:creationId xmlns:a16="http://schemas.microsoft.com/office/drawing/2014/main" id="{B5F909E9-3930-4E12-8CF3-7E8E3B5D29EA}"/>
-              </a:ext>
-            </a:extLst>
-          </p:cNvPr>
-          <p:cNvPicPr>
-            <a:picLocks noChangeAspect="1"/>
-          </p:cNvPicPr>
-          <p:nvPr/>
-        </p:nvPicPr>
-        <p:blipFill>
-          <a:blip r:embed="rId3">
-            <a:extLst>
-              <a:ext uri="{28A0092B-C50C-407E-A947-70E740481C1C}">
-                <a14:useLocalDpi xmlns:a14="http://schemas.microsoft.com/office/drawing/2010/main" val="0"/>
-              </a:ext>
-            </a:extLst>
-          </a:blip>
-          <a:stretch>
-            <a:fillRect/>
-          </a:stretch>
-        </p:blipFill>
-        <p:spPr>
-          <a:xfrm>
-            <a:off x="4069642" y="-128675"/>
-            <a:ext cx="4195615" cy="1679052"/>
-          </a:xfrm>
-          <a:prstGeom prst="rect">
-            <a:avLst/>
-          </a:prstGeom>
-        </p:spPr>
-      </p:pic>
-      <p:sp>
-        <p:nvSpPr>
-          <p:cNvPr id="6" name="TextBox 5">
-            <a:extLst>
-              <a:ext uri="{FF2B5EF4-FFF2-40B4-BE49-F238E27FC236}">
-                <a16:creationId xmlns:a16="http://schemas.microsoft.com/office/drawing/2014/main" id="{4A3529D3-1F6C-470A-AEF0-E90ADF35C881}"/>
-              </a:ext>
-            </a:extLst>
-          </p:cNvPr>
-          <p:cNvSpPr txBox="1"/>
-          <p:nvPr/>
-        </p:nvSpPr>
-        <p:spPr>
-          <a:xfrm>
-            <a:off x="1566342" y="2103224"/>
-            <a:ext cx="1781665" cy="369332"/>
-          </a:xfrm>
-          <a:prstGeom prst="rect">
-            <a:avLst/>
-          </a:prstGeom>
-          <a:noFill/>
-        </p:spPr>
-        <p:txBody>
-          <a:bodyPr wrap="square" rtlCol="0">
-            <a:spAutoFit/>
-          </a:bodyPr>
-          <a:lstStyle/>
-          <a:p>
-            <a:r>
-              <a:rPr lang="en-GB" u="sng" dirty="0">
-                <a:latin typeface="Abadi" panose="020B0604020104020204" pitchFamily="34" charset="0"/>
-              </a:rPr>
-              <a:t>.</a:t>
-            </a:r>
-            <a:r>
-              <a:rPr lang="en-GB" u="sng" dirty="0" err="1">
-                <a:latin typeface="Abadi" panose="020B0604020104020204" pitchFamily="34" charset="0"/>
-              </a:rPr>
-              <a:t>pykrev</a:t>
-            </a:r>
-            <a:r>
-              <a:rPr lang="en-GB" u="sng" dirty="0">
-                <a:latin typeface="Abadi" panose="020B0604020104020204" pitchFamily="34" charset="0"/>
-              </a:rPr>
-              <a:t>/formula </a:t>
-            </a:r>
-          </a:p>
-        </p:txBody>
-      </p:sp>
-      <p:sp>
-        <p:nvSpPr>
-          <p:cNvPr id="17" name="TextBox 16">
-            <a:extLst>
-              <a:ext uri="{FF2B5EF4-FFF2-40B4-BE49-F238E27FC236}">
-                <a16:creationId xmlns:a16="http://schemas.microsoft.com/office/drawing/2014/main" id="{D8A5E8C1-4283-4F9F-BBEF-77DCA9A88110}"/>
-              </a:ext>
-            </a:extLst>
-          </p:cNvPr>
-          <p:cNvSpPr txBox="1"/>
-          <p:nvPr/>
-        </p:nvSpPr>
-        <p:spPr>
-          <a:xfrm>
-            <a:off x="123548" y="3484638"/>
-            <a:ext cx="1582702" cy="261610"/>
-          </a:xfrm>
-          <a:prstGeom prst="rect">
-            <a:avLst/>
-          </a:prstGeom>
-          <a:noFill/>
-        </p:spPr>
-        <p:txBody>
-          <a:bodyPr wrap="square" rtlCol="0">
-            <a:spAutoFit/>
-          </a:bodyPr>
-          <a:lstStyle/>
-          <a:p>
-            <a:r>
-              <a:rPr lang="en-GB" sz="1050" dirty="0">
-                <a:latin typeface="Abadi" panose="020B0604020104020204" pitchFamily="34" charset="0"/>
-              </a:rPr>
-              <a:t>element_counts.py</a:t>
-            </a:r>
-          </a:p>
-        </p:txBody>
-      </p:sp>
-      <p:sp>
-        <p:nvSpPr>
-          <p:cNvPr id="19" name="TextBox 18">
-            <a:extLst>
-              <a:ext uri="{FF2B5EF4-FFF2-40B4-BE49-F238E27FC236}">
-                <a16:creationId xmlns:a16="http://schemas.microsoft.com/office/drawing/2014/main" id="{6849FE89-FE1A-4725-9119-1BF82E005FBD}"/>
-              </a:ext>
-            </a:extLst>
-          </p:cNvPr>
-          <p:cNvSpPr txBox="1"/>
-          <p:nvPr/>
-        </p:nvSpPr>
-        <p:spPr>
-          <a:xfrm>
-            <a:off x="1793982" y="3503579"/>
-            <a:ext cx="1582702" cy="261610"/>
-          </a:xfrm>
-          <a:prstGeom prst="rect">
-            <a:avLst/>
-          </a:prstGeom>
-          <a:noFill/>
-        </p:spPr>
-        <p:txBody>
-          <a:bodyPr wrap="square" rtlCol="0">
-            <a:spAutoFit/>
-          </a:bodyPr>
-          <a:lstStyle/>
-          <a:p>
-            <a:r>
-              <a:rPr lang="en-GB" sz="1050" dirty="0">
-                <a:latin typeface="Abadi" panose="020B0604020104020204" pitchFamily="34" charset="0"/>
-              </a:rPr>
-              <a:t>calculate_mass.py</a:t>
-            </a:r>
-          </a:p>
-        </p:txBody>
-      </p:sp>
-      <p:sp>
-        <p:nvSpPr>
-          <p:cNvPr id="21" name="TextBox 20">
-            <a:extLst>
-              <a:ext uri="{FF2B5EF4-FFF2-40B4-BE49-F238E27FC236}">
-                <a16:creationId xmlns:a16="http://schemas.microsoft.com/office/drawing/2014/main" id="{F9F23654-1617-4BC2-82D6-1DAF0244D0E8}"/>
-              </a:ext>
-            </a:extLst>
-          </p:cNvPr>
-          <p:cNvSpPr txBox="1"/>
-          <p:nvPr/>
-        </p:nvSpPr>
-        <p:spPr>
-          <a:xfrm>
-            <a:off x="1865591" y="3802696"/>
-            <a:ext cx="1113279" cy="415497"/>
-          </a:xfrm>
-          <a:prstGeom prst="rect">
-            <a:avLst/>
-          </a:prstGeom>
-          <a:noFill/>
-        </p:spPr>
-        <p:txBody>
-          <a:bodyPr wrap="square" rtlCol="0">
-            <a:spAutoFit/>
-          </a:bodyPr>
-          <a:lstStyle/>
-          <a:p>
-            <a:r>
-              <a:rPr lang="en-GB" sz="1050" dirty="0">
-                <a:latin typeface="Abadi" panose="020B0604020104020204" pitchFamily="34" charset="0"/>
-              </a:rPr>
-              <a:t>kendrick_mass_defect.py</a:t>
-            </a:r>
-          </a:p>
-        </p:txBody>
-      </p:sp>
-      <p:sp>
-        <p:nvSpPr>
-          <p:cNvPr id="23" name="TextBox 22">
-            <a:extLst>
-              <a:ext uri="{FF2B5EF4-FFF2-40B4-BE49-F238E27FC236}">
-                <a16:creationId xmlns:a16="http://schemas.microsoft.com/office/drawing/2014/main" id="{5720F916-A2E5-4FF6-97CA-1AA032FE75A5}"/>
-              </a:ext>
-            </a:extLst>
-          </p:cNvPr>
-          <p:cNvSpPr txBox="1"/>
-          <p:nvPr/>
-        </p:nvSpPr>
-        <p:spPr>
-          <a:xfrm>
-            <a:off x="3464417" y="3204674"/>
-            <a:ext cx="1582702" cy="276999"/>
-          </a:xfrm>
-          <a:prstGeom prst="rect">
-            <a:avLst/>
-          </a:prstGeom>
-          <a:noFill/>
-        </p:spPr>
-        <p:txBody>
-          <a:bodyPr wrap="square" rtlCol="0">
-            <a:spAutoFit/>
-          </a:bodyPr>
-          <a:lstStyle/>
-          <a:p>
-            <a:r>
-              <a:rPr lang="en-GB" sz="1200" u="sng" dirty="0">
-                <a:latin typeface="Abadi" panose="020B0604020104020204" pitchFamily="34" charset="0"/>
-              </a:rPr>
-              <a:t>Set analysis</a:t>
-            </a:r>
-          </a:p>
-        </p:txBody>
-      </p:sp>
-      <p:sp>
-        <p:nvSpPr>
-          <p:cNvPr id="25" name="TextBox 24">
-            <a:extLst>
-              <a:ext uri="{FF2B5EF4-FFF2-40B4-BE49-F238E27FC236}">
-                <a16:creationId xmlns:a16="http://schemas.microsoft.com/office/drawing/2014/main" id="{91C46627-0931-4840-B034-4F9566B3D21C}"/>
-              </a:ext>
-            </a:extLst>
-          </p:cNvPr>
-          <p:cNvSpPr txBox="1"/>
-          <p:nvPr/>
-        </p:nvSpPr>
-        <p:spPr>
-          <a:xfrm>
-            <a:off x="3279273" y="3499287"/>
-            <a:ext cx="1836722" cy="261610"/>
-          </a:xfrm>
-          <a:prstGeom prst="rect">
-            <a:avLst/>
-          </a:prstGeom>
-          <a:noFill/>
-        </p:spPr>
-        <p:txBody>
-          <a:bodyPr wrap="square" rtlCol="0">
-            <a:spAutoFit/>
-          </a:bodyPr>
-          <a:lstStyle/>
-          <a:p>
-            <a:r>
-              <a:rPr lang="en-GB" sz="1050" dirty="0">
-                <a:latin typeface="Abadi" panose="020B0604020104020204" pitchFamily="34" charset="0"/>
-              </a:rPr>
-              <a:t>find_intersections.py</a:t>
-            </a:r>
-          </a:p>
-        </p:txBody>
-      </p:sp>
-      <p:sp>
-        <p:nvSpPr>
-          <p:cNvPr id="27" name="TextBox 26">
-            <a:extLst>
-              <a:ext uri="{FF2B5EF4-FFF2-40B4-BE49-F238E27FC236}">
-                <a16:creationId xmlns:a16="http://schemas.microsoft.com/office/drawing/2014/main" id="{D76C5206-36B7-4F79-B701-E9935EDA533E}"/>
-              </a:ext>
-            </a:extLst>
-          </p:cNvPr>
-          <p:cNvSpPr txBox="1"/>
-          <p:nvPr/>
-        </p:nvSpPr>
-        <p:spPr>
-          <a:xfrm>
-            <a:off x="3279273" y="3735848"/>
-            <a:ext cx="1836722" cy="261610"/>
-          </a:xfrm>
-          <a:prstGeom prst="rect">
-            <a:avLst/>
-          </a:prstGeom>
-          <a:noFill/>
-        </p:spPr>
-        <p:txBody>
-          <a:bodyPr wrap="square" rtlCol="0">
-            <a:spAutoFit/>
-          </a:bodyPr>
-          <a:lstStyle/>
-          <a:p>
-            <a:r>
-              <a:rPr lang="en-GB" sz="1050" dirty="0">
-                <a:latin typeface="Abadi" panose="020B0604020104020204" pitchFamily="34" charset="0"/>
-              </a:rPr>
-              <a:t>unique_groups.py</a:t>
-            </a:r>
-          </a:p>
-        </p:txBody>
-      </p:sp>
-      <p:sp>
-        <p:nvSpPr>
-          <p:cNvPr id="29" name="TextBox 28">
-            <a:extLst>
-              <a:ext uri="{FF2B5EF4-FFF2-40B4-BE49-F238E27FC236}">
-                <a16:creationId xmlns:a16="http://schemas.microsoft.com/office/drawing/2014/main" id="{7C2C892A-12CE-4B2D-825D-3D8318E7BE40}"/>
-              </a:ext>
-            </a:extLst>
-          </p:cNvPr>
-          <p:cNvSpPr txBox="1"/>
-          <p:nvPr/>
-        </p:nvSpPr>
-        <p:spPr>
-          <a:xfrm>
-            <a:off x="3279273" y="3993611"/>
-            <a:ext cx="1836722" cy="261610"/>
-          </a:xfrm>
-          <a:prstGeom prst="rect">
-            <a:avLst/>
-          </a:prstGeom>
-          <a:noFill/>
-        </p:spPr>
-        <p:txBody>
-          <a:bodyPr wrap="square" rtlCol="0">
-            <a:spAutoFit/>
-          </a:bodyPr>
-          <a:lstStyle/>
-          <a:p>
-            <a:r>
-              <a:rPr lang="en-GB" sz="1050" dirty="0">
-                <a:latin typeface="Abadi" panose="020B0604020104020204" pitchFamily="34" charset="0"/>
-              </a:rPr>
-              <a:t>missing_groups.py</a:t>
-            </a:r>
-          </a:p>
-        </p:txBody>
-      </p:sp>
-      <p:sp>
-        <p:nvSpPr>
-          <p:cNvPr id="31" name="TextBox 30">
-            <a:extLst>
-              <a:ext uri="{FF2B5EF4-FFF2-40B4-BE49-F238E27FC236}">
-                <a16:creationId xmlns:a16="http://schemas.microsoft.com/office/drawing/2014/main" id="{1B90A93C-152D-4680-88A8-0F233EDD5513}"/>
-              </a:ext>
-            </a:extLst>
-          </p:cNvPr>
-          <p:cNvSpPr txBox="1"/>
-          <p:nvPr/>
-        </p:nvSpPr>
-        <p:spPr>
-          <a:xfrm>
-            <a:off x="123548" y="4019059"/>
-            <a:ext cx="1034059" cy="415497"/>
-          </a:xfrm>
-          <a:prstGeom prst="rect">
-            <a:avLst/>
-          </a:prstGeom>
-          <a:noFill/>
-        </p:spPr>
-        <p:txBody>
-          <a:bodyPr wrap="square" rtlCol="0">
-            <a:spAutoFit/>
-          </a:bodyPr>
-          <a:lstStyle/>
-          <a:p>
-            <a:r>
-              <a:rPr lang="en-GB" sz="1050" dirty="0">
-                <a:latin typeface="Abadi" panose="020B0604020104020204" pitchFamily="34" charset="0"/>
-              </a:rPr>
-              <a:t>double_bond_equivalent.py</a:t>
-            </a:r>
-          </a:p>
-        </p:txBody>
-      </p:sp>
-      <p:sp>
-        <p:nvSpPr>
-          <p:cNvPr id="33" name="TextBox 32">
-            <a:extLst>
-              <a:ext uri="{FF2B5EF4-FFF2-40B4-BE49-F238E27FC236}">
-                <a16:creationId xmlns:a16="http://schemas.microsoft.com/office/drawing/2014/main" id="{B36588A5-FF59-4957-875F-EBA2ECBCBD65}"/>
-              </a:ext>
-            </a:extLst>
-          </p:cNvPr>
-          <p:cNvSpPr txBox="1"/>
-          <p:nvPr/>
-        </p:nvSpPr>
-        <p:spPr>
-          <a:xfrm>
-            <a:off x="123548" y="4389583"/>
-            <a:ext cx="1836722" cy="253916"/>
-          </a:xfrm>
-          <a:prstGeom prst="rect">
-            <a:avLst/>
-          </a:prstGeom>
-          <a:noFill/>
-        </p:spPr>
-        <p:txBody>
-          <a:bodyPr wrap="square" rtlCol="0">
-            <a:spAutoFit/>
-          </a:bodyPr>
-          <a:lstStyle/>
-          <a:p>
-            <a:r>
-              <a:rPr lang="en-GB" sz="1050" dirty="0">
-                <a:latin typeface="Abadi" panose="020B0604020104020204" pitchFamily="34" charset="0"/>
-              </a:rPr>
-              <a:t>aromaticity_index.py</a:t>
-            </a:r>
-          </a:p>
-        </p:txBody>
-      </p:sp>
-      <p:sp>
-        <p:nvSpPr>
-          <p:cNvPr id="35" name="TextBox 34">
-            <a:extLst>
-              <a:ext uri="{FF2B5EF4-FFF2-40B4-BE49-F238E27FC236}">
-                <a16:creationId xmlns:a16="http://schemas.microsoft.com/office/drawing/2014/main" id="{4B9C0C85-4EF8-4491-B0EE-19C68CE97DD2}"/>
-              </a:ext>
-            </a:extLst>
-          </p:cNvPr>
-          <p:cNvSpPr txBox="1"/>
-          <p:nvPr/>
-        </p:nvSpPr>
-        <p:spPr>
-          <a:xfrm>
-            <a:off x="123548" y="4643499"/>
-            <a:ext cx="1836722" cy="253916"/>
-          </a:xfrm>
-          <a:prstGeom prst="rect">
-            <a:avLst/>
-          </a:prstGeom>
-          <a:noFill/>
-        </p:spPr>
-        <p:txBody>
-          <a:bodyPr wrap="square" rtlCol="0">
-            <a:spAutoFit/>
-          </a:bodyPr>
-          <a:lstStyle/>
-          <a:p>
-            <a:r>
-              <a:rPr lang="en-GB" sz="1050" dirty="0">
-                <a:latin typeface="Abadi" panose="020B0604020104020204" pitchFamily="34" charset="0"/>
-              </a:rPr>
-              <a:t>nominal_oxidation_state.py</a:t>
-            </a:r>
-          </a:p>
-        </p:txBody>
-      </p:sp>
-      <p:sp>
-        <p:nvSpPr>
-          <p:cNvPr id="37" name="TextBox 36">
-            <a:extLst>
-              <a:ext uri="{FF2B5EF4-FFF2-40B4-BE49-F238E27FC236}">
-                <a16:creationId xmlns:a16="http://schemas.microsoft.com/office/drawing/2014/main" id="{87235915-F6CF-4215-8602-DC452CCFD485}"/>
-              </a:ext>
-            </a:extLst>
-          </p:cNvPr>
-          <p:cNvSpPr txBox="1"/>
-          <p:nvPr/>
-        </p:nvSpPr>
-        <p:spPr>
-          <a:xfrm>
-            <a:off x="123548" y="3763898"/>
-            <a:ext cx="1836722" cy="261610"/>
-          </a:xfrm>
-          <a:prstGeom prst="rect">
-            <a:avLst/>
-          </a:prstGeom>
-          <a:noFill/>
-        </p:spPr>
-        <p:txBody>
-          <a:bodyPr wrap="square" rtlCol="0">
-            <a:spAutoFit/>
-          </a:bodyPr>
-          <a:lstStyle/>
-          <a:p>
-            <a:r>
-              <a:rPr lang="en-GB" sz="1050" dirty="0">
-                <a:latin typeface="Abadi" panose="020B0604020104020204" pitchFamily="34" charset="0"/>
-              </a:rPr>
-              <a:t>element_ratios.py</a:t>
-            </a:r>
-          </a:p>
-        </p:txBody>
-      </p:sp>
-      <p:sp>
-        <p:nvSpPr>
-          <p:cNvPr id="40" name="TextBox 39">
-            <a:extLst>
-              <a:ext uri="{FF2B5EF4-FFF2-40B4-BE49-F238E27FC236}">
-                <a16:creationId xmlns:a16="http://schemas.microsoft.com/office/drawing/2014/main" id="{62FFD0EF-8A37-4D98-A5F9-849FF2AD321E}"/>
-              </a:ext>
-            </a:extLst>
-          </p:cNvPr>
-          <p:cNvSpPr txBox="1"/>
-          <p:nvPr/>
-        </p:nvSpPr>
-        <p:spPr>
-          <a:xfrm>
-            <a:off x="1863704" y="3207462"/>
-            <a:ext cx="1582702" cy="276999"/>
-          </a:xfrm>
-          <a:prstGeom prst="rect">
-            <a:avLst/>
-          </a:prstGeom>
-          <a:noFill/>
-        </p:spPr>
-        <p:txBody>
-          <a:bodyPr wrap="square" rtlCol="0">
-            <a:spAutoFit/>
-          </a:bodyPr>
-          <a:lstStyle/>
-          <a:p>
-            <a:r>
-              <a:rPr lang="en-GB" sz="1200" u="sng" dirty="0">
-                <a:latin typeface="Abadi" panose="020B0604020104020204" pitchFamily="34" charset="0"/>
-              </a:rPr>
-              <a:t>Mass analysis</a:t>
-            </a:r>
-          </a:p>
-        </p:txBody>
-      </p:sp>
-      <p:sp>
-        <p:nvSpPr>
-          <p:cNvPr id="42" name="TextBox 41">
-            <a:extLst>
-              <a:ext uri="{FF2B5EF4-FFF2-40B4-BE49-F238E27FC236}">
-                <a16:creationId xmlns:a16="http://schemas.microsoft.com/office/drawing/2014/main" id="{246B4A45-DEF9-44C8-8671-380A03F6A3F0}"/>
-              </a:ext>
-            </a:extLst>
-          </p:cNvPr>
-          <p:cNvSpPr txBox="1"/>
-          <p:nvPr/>
-        </p:nvSpPr>
-        <p:spPr>
-          <a:xfrm>
-            <a:off x="293822" y="3022796"/>
-            <a:ext cx="1582702" cy="461665"/>
-          </a:xfrm>
-          <a:prstGeom prst="rect">
-            <a:avLst/>
-          </a:prstGeom>
-          <a:noFill/>
-        </p:spPr>
-        <p:txBody>
-          <a:bodyPr wrap="square" rtlCol="0">
-            <a:spAutoFit/>
-          </a:bodyPr>
-          <a:lstStyle/>
-          <a:p>
-            <a:r>
-              <a:rPr lang="en-GB" sz="1200" u="sng" dirty="0">
-                <a:latin typeface="Abadi" panose="020B0604020104020204" pitchFamily="34" charset="0"/>
-              </a:rPr>
-              <a:t>Stoichiometric analysis</a:t>
-            </a:r>
-          </a:p>
-        </p:txBody>
-      </p:sp>
-      <p:sp>
-        <p:nvSpPr>
-          <p:cNvPr id="44" name="Left Brace 43">
-            <a:extLst>
-              <a:ext uri="{FF2B5EF4-FFF2-40B4-BE49-F238E27FC236}">
-                <a16:creationId xmlns:a16="http://schemas.microsoft.com/office/drawing/2014/main" id="{B13BC78F-A9EA-4C6B-AC51-4DA8DD768EF3}"/>
-              </a:ext>
-            </a:extLst>
-          </p:cNvPr>
-          <p:cNvSpPr/>
-          <p:nvPr/>
-        </p:nvSpPr>
-        <p:spPr>
-          <a:xfrm rot="5400000">
-            <a:off x="5703472" y="1693154"/>
-            <a:ext cx="785054" cy="2686639"/>
-          </a:xfrm>
-          <a:prstGeom prst="leftBrace">
-            <a:avLst/>
-          </a:prstGeom>
-          <a:solidFill>
-            <a:schemeClr val="accent6">
-              <a:lumMod val="20000"/>
-              <a:lumOff val="80000"/>
-            </a:schemeClr>
-          </a:solidFill>
-          <a:ln>
+            <a:ln>
+              <a:solidFill>
+                <a:schemeClr val="accent2">
+                  <a:lumMod val="20000"/>
+                  <a:lumOff val="80000"/>
+                </a:schemeClr>
+              </a:solidFill>
+            </a:ln>
+          </p:spPr>
+          <p:style>
+            <a:lnRef idx="1">
+              <a:schemeClr val="accent1"/>
+            </a:lnRef>
+            <a:fillRef idx="0">
+              <a:schemeClr val="accent1"/>
+            </a:fillRef>
+            <a:effectRef idx="0">
+              <a:schemeClr val="accent1"/>
+            </a:effectRef>
+            <a:fontRef idx="minor">
+              <a:schemeClr val="tx1"/>
+            </a:fontRef>
+          </p:style>
+          <p:txBody>
+            <a:bodyPr rtlCol="0" anchor="ctr"/>
+            <a:lstStyle/>
+            <a:p>
+              <a:pPr algn="ctr"/>
+              <a:endParaRPr lang="en-GB"/>
+            </a:p>
+          </p:txBody>
+        </p:sp>
+        <p:sp>
+          <p:nvSpPr>
+            <p:cNvPr id="15" name="Right Brace 14">
+              <a:extLst>
+                <a:ext uri="{FF2B5EF4-FFF2-40B4-BE49-F238E27FC236}">
+                  <a16:creationId xmlns:a16="http://schemas.microsoft.com/office/drawing/2014/main" id="{53DFC4B4-62FF-4762-B70C-3815C1AEAD9E}"/>
+                </a:ext>
+              </a:extLst>
+            </p:cNvPr>
+            <p:cNvSpPr/>
+            <p:nvPr/>
+          </p:nvSpPr>
+          <p:spPr>
+            <a:xfrm rot="16200000">
+              <a:off x="5510373" y="-3078550"/>
+              <a:ext cx="1318941" cy="9982985"/>
+            </a:xfrm>
+            <a:prstGeom prst="rightBrace">
+              <a:avLst/>
+            </a:prstGeom>
+            <a:solidFill>
+              <a:schemeClr val="accent1">
+                <a:lumMod val="40000"/>
+                <a:lumOff val="60000"/>
+              </a:schemeClr>
+            </a:solidFill>
+            <a:ln w="9525"/>
+          </p:spPr>
+          <p:style>
+            <a:lnRef idx="1">
+              <a:schemeClr val="accent1"/>
+            </a:lnRef>
+            <a:fillRef idx="0">
+              <a:schemeClr val="accent1"/>
+            </a:fillRef>
+            <a:effectRef idx="0">
+              <a:schemeClr val="accent1"/>
+            </a:effectRef>
+            <a:fontRef idx="minor">
+              <a:schemeClr val="tx1"/>
+            </a:fontRef>
+          </p:style>
+          <p:txBody>
+            <a:bodyPr rtlCol="0" anchor="ctr"/>
+            <a:lstStyle/>
+            <a:p>
+              <a:pPr algn="ctr"/>
+              <a:endParaRPr lang="en-GB"/>
+            </a:p>
+          </p:txBody>
+        </p:sp>
+        <p:pic>
+          <p:nvPicPr>
+            <p:cNvPr id="5" name="Picture 4">
+              <a:extLst>
+                <a:ext uri="{FF2B5EF4-FFF2-40B4-BE49-F238E27FC236}">
+                  <a16:creationId xmlns:a16="http://schemas.microsoft.com/office/drawing/2014/main" id="{B5F909E9-3930-4E12-8CF3-7E8E3B5D29EA}"/>
+                </a:ext>
+              </a:extLst>
+            </p:cNvPr>
+            <p:cNvPicPr>
+              <a:picLocks noChangeAspect="1"/>
+            </p:cNvPicPr>
+            <p:nvPr/>
+          </p:nvPicPr>
+          <p:blipFill>
+            <a:blip r:embed="rId3">
+              <a:extLst>
+                <a:ext uri="{28A0092B-C50C-407E-A947-70E740481C1C}">
+                  <a14:useLocalDpi xmlns:a14="http://schemas.microsoft.com/office/drawing/2010/main" val="0"/>
+                </a:ext>
+              </a:extLst>
+            </a:blip>
+            <a:stretch>
+              <a:fillRect/>
+            </a:stretch>
+          </p:blipFill>
+          <p:spPr>
+            <a:xfrm>
+              <a:off x="4069642" y="-128675"/>
+              <a:ext cx="4195615" cy="1679052"/>
+            </a:xfrm>
+            <a:prstGeom prst="rect">
+              <a:avLst/>
+            </a:prstGeom>
+          </p:spPr>
+        </p:pic>
+        <p:sp>
+          <p:nvSpPr>
+            <p:cNvPr id="6" name="TextBox 5">
+              <a:extLst>
+                <a:ext uri="{FF2B5EF4-FFF2-40B4-BE49-F238E27FC236}">
+                  <a16:creationId xmlns:a16="http://schemas.microsoft.com/office/drawing/2014/main" id="{4A3529D3-1F6C-470A-AEF0-E90ADF35C881}"/>
+                </a:ext>
+              </a:extLst>
+            </p:cNvPr>
+            <p:cNvSpPr txBox="1"/>
+            <p:nvPr/>
+          </p:nvSpPr>
+          <p:spPr>
+            <a:xfrm>
+              <a:off x="1566342" y="2103224"/>
+              <a:ext cx="1781665" cy="369332"/>
+            </a:xfrm>
+            <a:prstGeom prst="rect">
+              <a:avLst/>
+            </a:prstGeom>
+            <a:noFill/>
+          </p:spPr>
+          <p:txBody>
+            <a:bodyPr wrap="square" rtlCol="0">
+              <a:spAutoFit/>
+            </a:bodyPr>
+            <a:lstStyle/>
+            <a:p>
+              <a:r>
+                <a:rPr lang="en-GB" u="sng" dirty="0">
+                  <a:latin typeface="Abadi" panose="020B0604020104020204" pitchFamily="34" charset="0"/>
+                </a:rPr>
+                <a:t>.</a:t>
+              </a:r>
+              <a:r>
+                <a:rPr lang="en-GB" u="sng" dirty="0" err="1">
+                  <a:latin typeface="Abadi" panose="020B0604020104020204" pitchFamily="34" charset="0"/>
+                </a:rPr>
+                <a:t>pykrev</a:t>
+              </a:r>
+              <a:r>
+                <a:rPr lang="en-GB" u="sng" dirty="0">
+                  <a:latin typeface="Abadi" panose="020B0604020104020204" pitchFamily="34" charset="0"/>
+                </a:rPr>
+                <a:t>/formula </a:t>
+              </a:r>
+            </a:p>
+          </p:txBody>
+        </p:sp>
+        <p:sp>
+          <p:nvSpPr>
+            <p:cNvPr id="17" name="TextBox 16">
+              <a:extLst>
+                <a:ext uri="{FF2B5EF4-FFF2-40B4-BE49-F238E27FC236}">
+                  <a16:creationId xmlns:a16="http://schemas.microsoft.com/office/drawing/2014/main" id="{D8A5E8C1-4283-4F9F-BBEF-77DCA9A88110}"/>
+                </a:ext>
+              </a:extLst>
+            </p:cNvPr>
+            <p:cNvSpPr txBox="1"/>
+            <p:nvPr/>
+          </p:nvSpPr>
+          <p:spPr>
+            <a:xfrm>
+              <a:off x="123548" y="3484638"/>
+              <a:ext cx="1582702" cy="261610"/>
+            </a:xfrm>
+            <a:prstGeom prst="rect">
+              <a:avLst/>
+            </a:prstGeom>
+            <a:noFill/>
+          </p:spPr>
+          <p:txBody>
+            <a:bodyPr wrap="square" rtlCol="0">
+              <a:spAutoFit/>
+            </a:bodyPr>
+            <a:lstStyle/>
+            <a:p>
+              <a:r>
+                <a:rPr lang="en-GB" sz="1050" dirty="0">
+                  <a:latin typeface="Abadi" panose="020B0604020104020204" pitchFamily="34" charset="0"/>
+                </a:rPr>
+                <a:t>element_counts.py</a:t>
+              </a:r>
+            </a:p>
+          </p:txBody>
+        </p:sp>
+        <p:sp>
+          <p:nvSpPr>
+            <p:cNvPr id="19" name="TextBox 18">
+              <a:extLst>
+                <a:ext uri="{FF2B5EF4-FFF2-40B4-BE49-F238E27FC236}">
+                  <a16:creationId xmlns:a16="http://schemas.microsoft.com/office/drawing/2014/main" id="{6849FE89-FE1A-4725-9119-1BF82E005FBD}"/>
+                </a:ext>
+              </a:extLst>
+            </p:cNvPr>
+            <p:cNvSpPr txBox="1"/>
+            <p:nvPr/>
+          </p:nvSpPr>
+          <p:spPr>
+            <a:xfrm>
+              <a:off x="1793982" y="3503579"/>
+              <a:ext cx="1582702" cy="261610"/>
+            </a:xfrm>
+            <a:prstGeom prst="rect">
+              <a:avLst/>
+            </a:prstGeom>
+            <a:noFill/>
+          </p:spPr>
+          <p:txBody>
+            <a:bodyPr wrap="square" rtlCol="0">
+              <a:spAutoFit/>
+            </a:bodyPr>
+            <a:lstStyle/>
+            <a:p>
+              <a:r>
+                <a:rPr lang="en-GB" sz="1050" dirty="0">
+                  <a:latin typeface="Abadi" panose="020B0604020104020204" pitchFamily="34" charset="0"/>
+                </a:rPr>
+                <a:t>calculate_mass.py</a:t>
+              </a:r>
+            </a:p>
+          </p:txBody>
+        </p:sp>
+        <p:sp>
+          <p:nvSpPr>
+            <p:cNvPr id="21" name="TextBox 20">
+              <a:extLst>
+                <a:ext uri="{FF2B5EF4-FFF2-40B4-BE49-F238E27FC236}">
+                  <a16:creationId xmlns:a16="http://schemas.microsoft.com/office/drawing/2014/main" id="{F9F23654-1617-4BC2-82D6-1DAF0244D0E8}"/>
+                </a:ext>
+              </a:extLst>
+            </p:cNvPr>
+            <p:cNvSpPr txBox="1"/>
+            <p:nvPr/>
+          </p:nvSpPr>
+          <p:spPr>
+            <a:xfrm>
+              <a:off x="1865591" y="3802696"/>
+              <a:ext cx="1113279" cy="415497"/>
+            </a:xfrm>
+            <a:prstGeom prst="rect">
+              <a:avLst/>
+            </a:prstGeom>
+            <a:noFill/>
+          </p:spPr>
+          <p:txBody>
+            <a:bodyPr wrap="square" rtlCol="0">
+              <a:spAutoFit/>
+            </a:bodyPr>
+            <a:lstStyle/>
+            <a:p>
+              <a:r>
+                <a:rPr lang="en-GB" sz="1050" dirty="0">
+                  <a:latin typeface="Abadi" panose="020B0604020104020204" pitchFamily="34" charset="0"/>
+                </a:rPr>
+                <a:t>kendrick_mass_defect.py</a:t>
+              </a:r>
+            </a:p>
+          </p:txBody>
+        </p:sp>
+        <p:sp>
+          <p:nvSpPr>
+            <p:cNvPr id="23" name="TextBox 22">
+              <a:extLst>
+                <a:ext uri="{FF2B5EF4-FFF2-40B4-BE49-F238E27FC236}">
+                  <a16:creationId xmlns:a16="http://schemas.microsoft.com/office/drawing/2014/main" id="{5720F916-A2E5-4FF6-97CA-1AA032FE75A5}"/>
+                </a:ext>
+              </a:extLst>
+            </p:cNvPr>
+            <p:cNvSpPr txBox="1"/>
+            <p:nvPr/>
+          </p:nvSpPr>
+          <p:spPr>
+            <a:xfrm>
+              <a:off x="3464417" y="3204674"/>
+              <a:ext cx="1582702" cy="276999"/>
+            </a:xfrm>
+            <a:prstGeom prst="rect">
+              <a:avLst/>
+            </a:prstGeom>
+            <a:noFill/>
+          </p:spPr>
+          <p:txBody>
+            <a:bodyPr wrap="square" rtlCol="0">
+              <a:spAutoFit/>
+            </a:bodyPr>
+            <a:lstStyle/>
+            <a:p>
+              <a:r>
+                <a:rPr lang="en-GB" sz="1200" u="sng" dirty="0">
+                  <a:latin typeface="Abadi" panose="020B0604020104020204" pitchFamily="34" charset="0"/>
+                </a:rPr>
+                <a:t>Set analysis</a:t>
+              </a:r>
+            </a:p>
+          </p:txBody>
+        </p:sp>
+        <p:sp>
+          <p:nvSpPr>
+            <p:cNvPr id="25" name="TextBox 24">
+              <a:extLst>
+                <a:ext uri="{FF2B5EF4-FFF2-40B4-BE49-F238E27FC236}">
+                  <a16:creationId xmlns:a16="http://schemas.microsoft.com/office/drawing/2014/main" id="{91C46627-0931-4840-B034-4F9566B3D21C}"/>
+                </a:ext>
+              </a:extLst>
+            </p:cNvPr>
+            <p:cNvSpPr txBox="1"/>
+            <p:nvPr/>
+          </p:nvSpPr>
+          <p:spPr>
+            <a:xfrm>
+              <a:off x="3279273" y="3499287"/>
+              <a:ext cx="1836722" cy="261610"/>
+            </a:xfrm>
+            <a:prstGeom prst="rect">
+              <a:avLst/>
+            </a:prstGeom>
+            <a:noFill/>
+          </p:spPr>
+          <p:txBody>
+            <a:bodyPr wrap="square" rtlCol="0">
+              <a:spAutoFit/>
+            </a:bodyPr>
+            <a:lstStyle/>
+            <a:p>
+              <a:r>
+                <a:rPr lang="en-GB" sz="1050" dirty="0">
+                  <a:latin typeface="Abadi" panose="020B0604020104020204" pitchFamily="34" charset="0"/>
+                </a:rPr>
+                <a:t>find_intersections.py</a:t>
+              </a:r>
+            </a:p>
+          </p:txBody>
+        </p:sp>
+        <p:sp>
+          <p:nvSpPr>
+            <p:cNvPr id="27" name="TextBox 26">
+              <a:extLst>
+                <a:ext uri="{FF2B5EF4-FFF2-40B4-BE49-F238E27FC236}">
+                  <a16:creationId xmlns:a16="http://schemas.microsoft.com/office/drawing/2014/main" id="{D76C5206-36B7-4F79-B701-E9935EDA533E}"/>
+                </a:ext>
+              </a:extLst>
+            </p:cNvPr>
+            <p:cNvSpPr txBox="1"/>
+            <p:nvPr/>
+          </p:nvSpPr>
+          <p:spPr>
+            <a:xfrm>
+              <a:off x="3279273" y="3735848"/>
+              <a:ext cx="1836722" cy="261610"/>
+            </a:xfrm>
+            <a:prstGeom prst="rect">
+              <a:avLst/>
+            </a:prstGeom>
+            <a:noFill/>
+          </p:spPr>
+          <p:txBody>
+            <a:bodyPr wrap="square" rtlCol="0">
+              <a:spAutoFit/>
+            </a:bodyPr>
+            <a:lstStyle/>
+            <a:p>
+              <a:r>
+                <a:rPr lang="en-GB" sz="1050" dirty="0">
+                  <a:latin typeface="Abadi" panose="020B0604020104020204" pitchFamily="34" charset="0"/>
+                </a:rPr>
+                <a:t>unique_groups.py</a:t>
+              </a:r>
+            </a:p>
+          </p:txBody>
+        </p:sp>
+        <p:sp>
+          <p:nvSpPr>
+            <p:cNvPr id="29" name="TextBox 28">
+              <a:extLst>
+                <a:ext uri="{FF2B5EF4-FFF2-40B4-BE49-F238E27FC236}">
+                  <a16:creationId xmlns:a16="http://schemas.microsoft.com/office/drawing/2014/main" id="{7C2C892A-12CE-4B2D-825D-3D8318E7BE40}"/>
+                </a:ext>
+              </a:extLst>
+            </p:cNvPr>
+            <p:cNvSpPr txBox="1"/>
+            <p:nvPr/>
+          </p:nvSpPr>
+          <p:spPr>
+            <a:xfrm>
+              <a:off x="3279273" y="3993611"/>
+              <a:ext cx="1836722" cy="261610"/>
+            </a:xfrm>
+            <a:prstGeom prst="rect">
+              <a:avLst/>
+            </a:prstGeom>
+            <a:noFill/>
+          </p:spPr>
+          <p:txBody>
+            <a:bodyPr wrap="square" rtlCol="0">
+              <a:spAutoFit/>
+            </a:bodyPr>
+            <a:lstStyle/>
+            <a:p>
+              <a:r>
+                <a:rPr lang="en-GB" sz="1050" dirty="0">
+                  <a:latin typeface="Abadi" panose="020B0604020104020204" pitchFamily="34" charset="0"/>
+                </a:rPr>
+                <a:t>missing_groups.py</a:t>
+              </a:r>
+            </a:p>
+          </p:txBody>
+        </p:sp>
+        <p:sp>
+          <p:nvSpPr>
+            <p:cNvPr id="31" name="TextBox 30">
+              <a:extLst>
+                <a:ext uri="{FF2B5EF4-FFF2-40B4-BE49-F238E27FC236}">
+                  <a16:creationId xmlns:a16="http://schemas.microsoft.com/office/drawing/2014/main" id="{1B90A93C-152D-4680-88A8-0F233EDD5513}"/>
+                </a:ext>
+              </a:extLst>
+            </p:cNvPr>
+            <p:cNvSpPr txBox="1"/>
+            <p:nvPr/>
+          </p:nvSpPr>
+          <p:spPr>
+            <a:xfrm>
+              <a:off x="123548" y="4019059"/>
+              <a:ext cx="1034059" cy="415497"/>
+            </a:xfrm>
+            <a:prstGeom prst="rect">
+              <a:avLst/>
+            </a:prstGeom>
+            <a:noFill/>
+          </p:spPr>
+          <p:txBody>
+            <a:bodyPr wrap="square" rtlCol="0">
+              <a:spAutoFit/>
+            </a:bodyPr>
+            <a:lstStyle/>
+            <a:p>
+              <a:r>
+                <a:rPr lang="en-GB" sz="1050" dirty="0">
+                  <a:latin typeface="Abadi" panose="020B0604020104020204" pitchFamily="34" charset="0"/>
+                </a:rPr>
+                <a:t>double_bond_equivalent.py</a:t>
+              </a:r>
+            </a:p>
+          </p:txBody>
+        </p:sp>
+        <p:sp>
+          <p:nvSpPr>
+            <p:cNvPr id="33" name="TextBox 32">
+              <a:extLst>
+                <a:ext uri="{FF2B5EF4-FFF2-40B4-BE49-F238E27FC236}">
+                  <a16:creationId xmlns:a16="http://schemas.microsoft.com/office/drawing/2014/main" id="{B36588A5-FF59-4957-875F-EBA2ECBCBD65}"/>
+                </a:ext>
+              </a:extLst>
+            </p:cNvPr>
+            <p:cNvSpPr txBox="1"/>
+            <p:nvPr/>
+          </p:nvSpPr>
+          <p:spPr>
+            <a:xfrm>
+              <a:off x="123548" y="4389583"/>
+              <a:ext cx="1836722" cy="253916"/>
+            </a:xfrm>
+            <a:prstGeom prst="rect">
+              <a:avLst/>
+            </a:prstGeom>
+            <a:noFill/>
+          </p:spPr>
+          <p:txBody>
+            <a:bodyPr wrap="square" rtlCol="0">
+              <a:spAutoFit/>
+            </a:bodyPr>
+            <a:lstStyle/>
+            <a:p>
+              <a:r>
+                <a:rPr lang="en-GB" sz="1050" dirty="0">
+                  <a:latin typeface="Abadi" panose="020B0604020104020204" pitchFamily="34" charset="0"/>
+                </a:rPr>
+                <a:t>aromaticity_index.py</a:t>
+              </a:r>
+            </a:p>
+          </p:txBody>
+        </p:sp>
+        <p:sp>
+          <p:nvSpPr>
+            <p:cNvPr id="35" name="TextBox 34">
+              <a:extLst>
+                <a:ext uri="{FF2B5EF4-FFF2-40B4-BE49-F238E27FC236}">
+                  <a16:creationId xmlns:a16="http://schemas.microsoft.com/office/drawing/2014/main" id="{4B9C0C85-4EF8-4491-B0EE-19C68CE97DD2}"/>
+                </a:ext>
+              </a:extLst>
+            </p:cNvPr>
+            <p:cNvSpPr txBox="1"/>
+            <p:nvPr/>
+          </p:nvSpPr>
+          <p:spPr>
+            <a:xfrm>
+              <a:off x="123548" y="4643499"/>
+              <a:ext cx="1836722" cy="253916"/>
+            </a:xfrm>
+            <a:prstGeom prst="rect">
+              <a:avLst/>
+            </a:prstGeom>
+            <a:noFill/>
+          </p:spPr>
+          <p:txBody>
+            <a:bodyPr wrap="square" rtlCol="0">
+              <a:spAutoFit/>
+            </a:bodyPr>
+            <a:lstStyle/>
+            <a:p>
+              <a:r>
+                <a:rPr lang="en-GB" sz="1050" dirty="0">
+                  <a:latin typeface="Abadi" panose="020B0604020104020204" pitchFamily="34" charset="0"/>
+                </a:rPr>
+                <a:t>nominal_oxidation_state.py</a:t>
+              </a:r>
+            </a:p>
+          </p:txBody>
+        </p:sp>
+        <p:sp>
+          <p:nvSpPr>
+            <p:cNvPr id="37" name="TextBox 36">
+              <a:extLst>
+                <a:ext uri="{FF2B5EF4-FFF2-40B4-BE49-F238E27FC236}">
+                  <a16:creationId xmlns:a16="http://schemas.microsoft.com/office/drawing/2014/main" id="{87235915-F6CF-4215-8602-DC452CCFD485}"/>
+                </a:ext>
+              </a:extLst>
+            </p:cNvPr>
+            <p:cNvSpPr txBox="1"/>
+            <p:nvPr/>
+          </p:nvSpPr>
+          <p:spPr>
+            <a:xfrm>
+              <a:off x="123548" y="3763898"/>
+              <a:ext cx="1836722" cy="261610"/>
+            </a:xfrm>
+            <a:prstGeom prst="rect">
+              <a:avLst/>
+            </a:prstGeom>
+            <a:noFill/>
+          </p:spPr>
+          <p:txBody>
+            <a:bodyPr wrap="square" rtlCol="0">
+              <a:spAutoFit/>
+            </a:bodyPr>
+            <a:lstStyle/>
+            <a:p>
+              <a:r>
+                <a:rPr lang="en-GB" sz="1050" dirty="0">
+                  <a:latin typeface="Abadi" panose="020B0604020104020204" pitchFamily="34" charset="0"/>
+                </a:rPr>
+                <a:t>element_ratios.py</a:t>
+              </a:r>
+            </a:p>
+          </p:txBody>
+        </p:sp>
+        <p:sp>
+          <p:nvSpPr>
+            <p:cNvPr id="40" name="TextBox 39">
+              <a:extLst>
+                <a:ext uri="{FF2B5EF4-FFF2-40B4-BE49-F238E27FC236}">
+                  <a16:creationId xmlns:a16="http://schemas.microsoft.com/office/drawing/2014/main" id="{62FFD0EF-8A37-4D98-A5F9-849FF2AD321E}"/>
+                </a:ext>
+              </a:extLst>
+            </p:cNvPr>
+            <p:cNvSpPr txBox="1"/>
+            <p:nvPr/>
+          </p:nvSpPr>
+          <p:spPr>
+            <a:xfrm>
+              <a:off x="1863704" y="3207462"/>
+              <a:ext cx="1582702" cy="276999"/>
+            </a:xfrm>
+            <a:prstGeom prst="rect">
+              <a:avLst/>
+            </a:prstGeom>
+            <a:noFill/>
+          </p:spPr>
+          <p:txBody>
+            <a:bodyPr wrap="square" rtlCol="0">
+              <a:spAutoFit/>
+            </a:bodyPr>
+            <a:lstStyle/>
+            <a:p>
+              <a:r>
+                <a:rPr lang="en-GB" sz="1200" u="sng" dirty="0">
+                  <a:latin typeface="Abadi" panose="020B0604020104020204" pitchFamily="34" charset="0"/>
+                </a:rPr>
+                <a:t>Mass analysis</a:t>
+              </a:r>
+            </a:p>
+          </p:txBody>
+        </p:sp>
+        <p:sp>
+          <p:nvSpPr>
+            <p:cNvPr id="42" name="TextBox 41">
+              <a:extLst>
+                <a:ext uri="{FF2B5EF4-FFF2-40B4-BE49-F238E27FC236}">
+                  <a16:creationId xmlns:a16="http://schemas.microsoft.com/office/drawing/2014/main" id="{246B4A45-DEF9-44C8-8671-380A03F6A3F0}"/>
+                </a:ext>
+              </a:extLst>
+            </p:cNvPr>
+            <p:cNvSpPr txBox="1"/>
+            <p:nvPr/>
+          </p:nvSpPr>
+          <p:spPr>
+            <a:xfrm>
+              <a:off x="293822" y="3022796"/>
+              <a:ext cx="1582702" cy="461665"/>
+            </a:xfrm>
+            <a:prstGeom prst="rect">
+              <a:avLst/>
+            </a:prstGeom>
+            <a:noFill/>
+          </p:spPr>
+          <p:txBody>
+            <a:bodyPr wrap="square" rtlCol="0">
+              <a:spAutoFit/>
+            </a:bodyPr>
+            <a:lstStyle/>
+            <a:p>
+              <a:r>
+                <a:rPr lang="en-GB" sz="1200" u="sng" dirty="0">
+                  <a:latin typeface="Abadi" panose="020B0604020104020204" pitchFamily="34" charset="0"/>
+                </a:rPr>
+                <a:t>Stoichiometric analysis</a:t>
+              </a:r>
+            </a:p>
+          </p:txBody>
+        </p:sp>
+        <p:sp>
+          <p:nvSpPr>
+            <p:cNvPr id="44" name="Left Brace 43">
+              <a:extLst>
+                <a:ext uri="{FF2B5EF4-FFF2-40B4-BE49-F238E27FC236}">
+                  <a16:creationId xmlns:a16="http://schemas.microsoft.com/office/drawing/2014/main" id="{B13BC78F-A9EA-4C6B-AC51-4DA8DD768EF3}"/>
+                </a:ext>
+              </a:extLst>
+            </p:cNvPr>
+            <p:cNvSpPr/>
+            <p:nvPr/>
+          </p:nvSpPr>
+          <p:spPr>
+            <a:xfrm rot="5400000">
+              <a:off x="5703472" y="1693154"/>
+              <a:ext cx="785054" cy="2686639"/>
+            </a:xfrm>
+            <a:prstGeom prst="leftBrace">
+              <a:avLst/>
+            </a:prstGeom>
             <a:solidFill>
               <a:schemeClr val="accent6">
                 <a:lumMod val="20000"/>
                 <a:lumOff val="80000"/>
               </a:schemeClr>
             </a:solidFill>
-          </a:ln>
-        </p:spPr>
-        <p:style>
-          <a:lnRef idx="1">
-            <a:schemeClr val="accent1"/>
-          </a:lnRef>
-          <a:fillRef idx="0">
-            <a:schemeClr val="accent1"/>
-          </a:fillRef>
-          <a:effectRef idx="0">
-            <a:schemeClr val="accent1"/>
-          </a:effectRef>
-          <a:fontRef idx="minor">
-            <a:schemeClr val="tx1"/>
-          </a:fontRef>
-        </p:style>
-        <p:txBody>
-          <a:bodyPr rtlCol="0" anchor="ctr"/>
-          <a:lstStyle/>
-          <a:p>
-            <a:pPr algn="ctr"/>
-            <a:endParaRPr lang="en-GB"/>
-          </a:p>
-        </p:txBody>
-      </p:sp>
-      <p:sp>
-        <p:nvSpPr>
-          <p:cNvPr id="46" name="Left Brace 45">
-            <a:extLst>
-              <a:ext uri="{FF2B5EF4-FFF2-40B4-BE49-F238E27FC236}">
-                <a16:creationId xmlns:a16="http://schemas.microsoft.com/office/drawing/2014/main" id="{268985DF-3936-4CAB-A180-45088E893897}"/>
-              </a:ext>
-            </a:extLst>
-          </p:cNvPr>
-          <p:cNvSpPr/>
-          <p:nvPr/>
-        </p:nvSpPr>
-        <p:spPr>
-          <a:xfrm rot="5400000">
-            <a:off x="9417795" y="843221"/>
-            <a:ext cx="785054" cy="4359150"/>
-          </a:xfrm>
-          <a:prstGeom prst="leftBrace">
-            <a:avLst/>
-          </a:prstGeom>
-          <a:solidFill>
-            <a:schemeClr val="accent5">
-              <a:lumMod val="20000"/>
-              <a:lumOff val="80000"/>
-            </a:schemeClr>
-          </a:solidFill>
-          <a:ln>
+            <a:ln>
+              <a:solidFill>
+                <a:schemeClr val="accent6">
+                  <a:lumMod val="20000"/>
+                  <a:lumOff val="80000"/>
+                </a:schemeClr>
+              </a:solidFill>
+            </a:ln>
+          </p:spPr>
+          <p:style>
+            <a:lnRef idx="1">
+              <a:schemeClr val="accent1"/>
+            </a:lnRef>
+            <a:fillRef idx="0">
+              <a:schemeClr val="accent1"/>
+            </a:fillRef>
+            <a:effectRef idx="0">
+              <a:schemeClr val="accent1"/>
+            </a:effectRef>
+            <a:fontRef idx="minor">
+              <a:schemeClr val="tx1"/>
+            </a:fontRef>
+          </p:style>
+          <p:txBody>
+            <a:bodyPr rtlCol="0" anchor="ctr"/>
+            <a:lstStyle/>
+            <a:p>
+              <a:pPr algn="ctr"/>
+              <a:endParaRPr lang="en-GB"/>
+            </a:p>
+          </p:txBody>
+        </p:sp>
+        <p:sp>
+          <p:nvSpPr>
+            <p:cNvPr id="46" name="Left Brace 45">
+              <a:extLst>
+                <a:ext uri="{FF2B5EF4-FFF2-40B4-BE49-F238E27FC236}">
+                  <a16:creationId xmlns:a16="http://schemas.microsoft.com/office/drawing/2014/main" id="{268985DF-3936-4CAB-A180-45088E893897}"/>
+                </a:ext>
+              </a:extLst>
+            </p:cNvPr>
+            <p:cNvSpPr/>
+            <p:nvPr/>
+          </p:nvSpPr>
+          <p:spPr>
+            <a:xfrm rot="5400000">
+              <a:off x="9417795" y="843221"/>
+              <a:ext cx="785054" cy="4359150"/>
+            </a:xfrm>
+            <a:prstGeom prst="leftBrace">
+              <a:avLst/>
+            </a:prstGeom>
             <a:solidFill>
               <a:schemeClr val="accent5">
                 <a:lumMod val="20000"/>
                 <a:lumOff val="80000"/>
               </a:schemeClr>
             </a:solidFill>
-          </a:ln>
-        </p:spPr>
-        <p:style>
-          <a:lnRef idx="1">
-            <a:schemeClr val="accent1"/>
-          </a:lnRef>
-          <a:fillRef idx="0">
-            <a:schemeClr val="accent1"/>
-          </a:fillRef>
-          <a:effectRef idx="0">
-            <a:schemeClr val="accent1"/>
-          </a:effectRef>
-          <a:fontRef idx="minor">
-            <a:schemeClr val="tx1"/>
-          </a:fontRef>
-        </p:style>
-        <p:txBody>
-          <a:bodyPr rtlCol="0" anchor="ctr"/>
-          <a:lstStyle/>
-          <a:p>
-            <a:pPr algn="ctr"/>
-            <a:endParaRPr lang="en-GB"/>
-          </a:p>
-        </p:txBody>
-      </p:sp>
-      <p:sp>
-        <p:nvSpPr>
-          <p:cNvPr id="52" name="TextBox 51">
-            <a:extLst>
-              <a:ext uri="{FF2B5EF4-FFF2-40B4-BE49-F238E27FC236}">
-                <a16:creationId xmlns:a16="http://schemas.microsoft.com/office/drawing/2014/main" id="{3F1A7E60-50DF-4992-951C-7F7E5C654219}"/>
-              </a:ext>
-            </a:extLst>
-          </p:cNvPr>
-          <p:cNvSpPr txBox="1"/>
-          <p:nvPr/>
-        </p:nvSpPr>
-        <p:spPr>
-          <a:xfrm>
-            <a:off x="6613973" y="3002479"/>
-            <a:ext cx="1013314" cy="461665"/>
-          </a:xfrm>
-          <a:prstGeom prst="rect">
-            <a:avLst/>
-          </a:prstGeom>
-          <a:noFill/>
-        </p:spPr>
-        <p:txBody>
-          <a:bodyPr wrap="square" rtlCol="0">
-            <a:spAutoFit/>
-          </a:bodyPr>
-          <a:lstStyle/>
-          <a:p>
-            <a:r>
-              <a:rPr lang="en-GB" sz="1200" u="sng" dirty="0">
+            <a:ln>
+              <a:solidFill>
+                <a:schemeClr val="accent5">
+                  <a:lumMod val="20000"/>
+                  <a:lumOff val="80000"/>
+                </a:schemeClr>
+              </a:solidFill>
+            </a:ln>
+          </p:spPr>
+          <p:style>
+            <a:lnRef idx="1">
+              <a:schemeClr val="accent1"/>
+            </a:lnRef>
+            <a:fillRef idx="0">
+              <a:schemeClr val="accent1"/>
+            </a:fillRef>
+            <a:effectRef idx="0">
+              <a:schemeClr val="accent1"/>
+            </a:effectRef>
+            <a:fontRef idx="minor">
+              <a:schemeClr val="tx1"/>
+            </a:fontRef>
+          </p:style>
+          <p:txBody>
+            <a:bodyPr rtlCol="0" anchor="ctr"/>
+            <a:lstStyle/>
+            <a:p>
+              <a:pPr algn="ctr"/>
+              <a:endParaRPr lang="en-GB"/>
+            </a:p>
+          </p:txBody>
+        </p:sp>
+        <p:sp>
+          <p:nvSpPr>
+            <p:cNvPr id="52" name="TextBox 51">
+              <a:extLst>
+                <a:ext uri="{FF2B5EF4-FFF2-40B4-BE49-F238E27FC236}">
+                  <a16:creationId xmlns:a16="http://schemas.microsoft.com/office/drawing/2014/main" id="{3F1A7E60-50DF-4992-951C-7F7E5C654219}"/>
+                </a:ext>
+              </a:extLst>
+            </p:cNvPr>
+            <p:cNvSpPr txBox="1"/>
+            <p:nvPr/>
+          </p:nvSpPr>
+          <p:spPr>
+            <a:xfrm>
+              <a:off x="6613973" y="3002479"/>
+              <a:ext cx="1013314" cy="461665"/>
+            </a:xfrm>
+            <a:prstGeom prst="rect">
+              <a:avLst/>
+            </a:prstGeom>
+            <a:noFill/>
+          </p:spPr>
+          <p:txBody>
+            <a:bodyPr wrap="square" rtlCol="0">
+              <a:spAutoFit/>
+            </a:bodyPr>
+            <a:lstStyle/>
+            <a:p>
+              <a:r>
+                <a:rPr lang="en-GB" sz="1200" u="sng" dirty="0">
+                  <a:latin typeface="Abadi" panose="020B0604020104020204" pitchFamily="34" charset="0"/>
+                </a:rPr>
+                <a:t>Diversity metrics</a:t>
+              </a:r>
+            </a:p>
+          </p:txBody>
+        </p:sp>
+        <p:sp>
+          <p:nvSpPr>
+            <p:cNvPr id="54" name="TextBox 53">
+              <a:extLst>
+                <a:ext uri="{FF2B5EF4-FFF2-40B4-BE49-F238E27FC236}">
+                  <a16:creationId xmlns:a16="http://schemas.microsoft.com/office/drawing/2014/main" id="{481314B8-CBC0-4BE8-8582-39833513FECF}"/>
+                </a:ext>
+              </a:extLst>
+            </p:cNvPr>
+            <p:cNvSpPr txBox="1"/>
+            <p:nvPr/>
+          </p:nvSpPr>
+          <p:spPr>
+            <a:xfrm>
+              <a:off x="4848542" y="3189609"/>
+              <a:ext cx="1013314" cy="276999"/>
+            </a:xfrm>
+            <a:prstGeom prst="rect">
+              <a:avLst/>
+            </a:prstGeom>
+            <a:noFill/>
+          </p:spPr>
+          <p:txBody>
+            <a:bodyPr wrap="square" rtlCol="0">
+              <a:spAutoFit/>
+            </a:bodyPr>
+            <a:lstStyle/>
+            <a:p>
+              <a:r>
+                <a:rPr lang="en-GB" sz="1200" u="sng" dirty="0">
+                  <a:latin typeface="Abadi" panose="020B0604020104020204" pitchFamily="34" charset="0"/>
+                </a:rPr>
+                <a:t>Ordination</a:t>
+              </a:r>
+            </a:p>
+          </p:txBody>
+        </p:sp>
+        <p:sp>
+          <p:nvSpPr>
+            <p:cNvPr id="56" name="TextBox 55">
+              <a:extLst>
+                <a:ext uri="{FF2B5EF4-FFF2-40B4-BE49-F238E27FC236}">
+                  <a16:creationId xmlns:a16="http://schemas.microsoft.com/office/drawing/2014/main" id="{008E72D4-9286-4520-AC36-3D425B39EFCF}"/>
+                </a:ext>
+              </a:extLst>
+            </p:cNvPr>
+            <p:cNvSpPr txBox="1"/>
+            <p:nvPr/>
+          </p:nvSpPr>
+          <p:spPr>
+            <a:xfrm>
+              <a:off x="6091878" y="3519940"/>
+              <a:ext cx="1535409" cy="253916"/>
+            </a:xfrm>
+            <a:prstGeom prst="rect">
+              <a:avLst/>
+            </a:prstGeom>
+            <a:noFill/>
+          </p:spPr>
+          <p:txBody>
+            <a:bodyPr wrap="square" rtlCol="0">
+              <a:spAutoFit/>
+            </a:bodyPr>
+            <a:lstStyle/>
+            <a:p>
+              <a:r>
+                <a:rPr lang="en-GB" sz="1050" dirty="0">
+                  <a:latin typeface="Abadi" panose="020B0604020104020204" pitchFamily="34" charset="0"/>
+                </a:rPr>
+                <a:t>relative_intensities.py</a:t>
+              </a:r>
+            </a:p>
+          </p:txBody>
+        </p:sp>
+        <p:sp>
+          <p:nvSpPr>
+            <p:cNvPr id="58" name="TextBox 57">
+              <a:extLst>
+                <a:ext uri="{FF2B5EF4-FFF2-40B4-BE49-F238E27FC236}">
+                  <a16:creationId xmlns:a16="http://schemas.microsoft.com/office/drawing/2014/main" id="{EA5EC986-6336-4D63-83DC-CC254A457880}"/>
+                </a:ext>
+              </a:extLst>
+            </p:cNvPr>
+            <p:cNvSpPr txBox="1"/>
+            <p:nvPr/>
+          </p:nvSpPr>
+          <p:spPr>
+            <a:xfrm>
+              <a:off x="6091877" y="3757486"/>
+              <a:ext cx="1535409" cy="253916"/>
+            </a:xfrm>
+            <a:prstGeom prst="rect">
+              <a:avLst/>
+            </a:prstGeom>
+            <a:noFill/>
+          </p:spPr>
+          <p:txBody>
+            <a:bodyPr wrap="square" rtlCol="0">
+              <a:spAutoFit/>
+            </a:bodyPr>
+            <a:lstStyle/>
+            <a:p>
+              <a:r>
+                <a:rPr lang="en-GB" sz="1050" dirty="0">
+                  <a:latin typeface="Abadi" panose="020B0604020104020204" pitchFamily="34" charset="0"/>
+                </a:rPr>
+                <a:t>diversity_indices.py</a:t>
+              </a:r>
+            </a:p>
+          </p:txBody>
+        </p:sp>
+        <p:sp>
+          <p:nvSpPr>
+            <p:cNvPr id="60" name="TextBox 59">
+              <a:extLst>
+                <a:ext uri="{FF2B5EF4-FFF2-40B4-BE49-F238E27FC236}">
+                  <a16:creationId xmlns:a16="http://schemas.microsoft.com/office/drawing/2014/main" id="{DDFDE051-31F4-493F-BAD0-86437A5CFE17}"/>
+                </a:ext>
+              </a:extLst>
+            </p:cNvPr>
+            <p:cNvSpPr txBox="1"/>
+            <p:nvPr/>
+          </p:nvSpPr>
+          <p:spPr>
+            <a:xfrm>
+              <a:off x="4695687" y="3514352"/>
+              <a:ext cx="1535409" cy="253916"/>
+            </a:xfrm>
+            <a:prstGeom prst="rect">
+              <a:avLst/>
+            </a:prstGeom>
+            <a:noFill/>
+          </p:spPr>
+          <p:txBody>
+            <a:bodyPr wrap="square" rtlCol="0">
+              <a:spAutoFit/>
+            </a:bodyPr>
+            <a:lstStyle/>
+            <a:p>
+              <a:r>
+                <a:rPr lang="en-GB" sz="1050" dirty="0">
+                  <a:latin typeface="Abadi" panose="020B0604020104020204" pitchFamily="34" charset="0"/>
+                </a:rPr>
+                <a:t>ordination_matrix.py</a:t>
+              </a:r>
+            </a:p>
+          </p:txBody>
+        </p:sp>
+        <p:sp>
+          <p:nvSpPr>
+            <p:cNvPr id="62" name="TextBox 61">
+              <a:extLst>
+                <a:ext uri="{FF2B5EF4-FFF2-40B4-BE49-F238E27FC236}">
+                  <a16:creationId xmlns:a16="http://schemas.microsoft.com/office/drawing/2014/main" id="{C6FA2430-BB3D-4884-ACDC-DF3D12148676}"/>
+                </a:ext>
+              </a:extLst>
+            </p:cNvPr>
+            <p:cNvSpPr txBox="1"/>
+            <p:nvPr/>
+          </p:nvSpPr>
+          <p:spPr>
+            <a:xfrm>
+              <a:off x="6091877" y="3985737"/>
+              <a:ext cx="1535409" cy="253916"/>
+            </a:xfrm>
+            <a:prstGeom prst="rect">
+              <a:avLst/>
+            </a:prstGeom>
+            <a:noFill/>
+          </p:spPr>
+          <p:txBody>
+            <a:bodyPr wrap="square" rtlCol="0">
+              <a:spAutoFit/>
+            </a:bodyPr>
+            <a:lstStyle/>
+            <a:p>
+              <a:r>
+                <a:rPr lang="en-GB" sz="1050" dirty="0">
+                  <a:latin typeface="Abadi" panose="020B0604020104020204" pitchFamily="34" charset="0"/>
+                </a:rPr>
+                <a:t>compound_class.py</a:t>
+              </a:r>
+            </a:p>
+          </p:txBody>
+        </p:sp>
+        <p:sp>
+          <p:nvSpPr>
+            <p:cNvPr id="64" name="TextBox 63">
+              <a:extLst>
+                <a:ext uri="{FF2B5EF4-FFF2-40B4-BE49-F238E27FC236}">
+                  <a16:creationId xmlns:a16="http://schemas.microsoft.com/office/drawing/2014/main" id="{4468D425-F4E5-4B34-8FB2-9D3E65817AA6}"/>
+                </a:ext>
+              </a:extLst>
+            </p:cNvPr>
+            <p:cNvSpPr txBox="1"/>
+            <p:nvPr/>
+          </p:nvSpPr>
+          <p:spPr>
+            <a:xfrm>
+              <a:off x="4695687" y="3761759"/>
+              <a:ext cx="1535409" cy="253916"/>
+            </a:xfrm>
+            <a:prstGeom prst="rect">
+              <a:avLst/>
+            </a:prstGeom>
+            <a:noFill/>
+          </p:spPr>
+          <p:txBody>
+            <a:bodyPr wrap="square" rtlCol="0">
+              <a:spAutoFit/>
+            </a:bodyPr>
+            <a:lstStyle/>
+            <a:p>
+              <a:r>
+                <a:rPr lang="en-GB" sz="1050" dirty="0">
+                  <a:latin typeface="Abadi" panose="020B0604020104020204" pitchFamily="34" charset="0"/>
+                </a:rPr>
+                <a:t>bray_curtis_matrix.py</a:t>
+              </a:r>
+            </a:p>
+          </p:txBody>
+        </p:sp>
+        <p:sp>
+          <p:nvSpPr>
+            <p:cNvPr id="68" name="TextBox 67">
+              <a:extLst>
+                <a:ext uri="{FF2B5EF4-FFF2-40B4-BE49-F238E27FC236}">
+                  <a16:creationId xmlns:a16="http://schemas.microsoft.com/office/drawing/2014/main" id="{5DB46D51-913D-4103-9E6E-F19D3ECAAA0A}"/>
+                </a:ext>
+              </a:extLst>
+            </p:cNvPr>
+            <p:cNvSpPr txBox="1"/>
+            <p:nvPr/>
+          </p:nvSpPr>
+          <p:spPr>
+            <a:xfrm>
+              <a:off x="10753342" y="3094810"/>
+              <a:ext cx="1013314" cy="276999"/>
+            </a:xfrm>
+            <a:prstGeom prst="rect">
+              <a:avLst/>
+            </a:prstGeom>
+            <a:noFill/>
+          </p:spPr>
+          <p:txBody>
+            <a:bodyPr wrap="square" rtlCol="0">
+              <a:spAutoFit/>
+            </a:bodyPr>
+            <a:lstStyle/>
+            <a:p>
+              <a:r>
+                <a:rPr lang="en-GB" sz="1200" u="sng" dirty="0">
+                  <a:latin typeface="Abadi" panose="020B0604020104020204" pitchFamily="34" charset="0"/>
+                </a:rPr>
+                <a:t>van </a:t>
+              </a:r>
+              <a:r>
+                <a:rPr lang="en-GB" sz="1200" u="sng" dirty="0" err="1">
+                  <a:latin typeface="Abadi" panose="020B0604020104020204" pitchFamily="34" charset="0"/>
+                </a:rPr>
+                <a:t>Krevelen</a:t>
+              </a:r>
+              <a:endParaRPr lang="en-GB" sz="1200" u="sng" dirty="0">
                 <a:latin typeface="Abadi" panose="020B0604020104020204" pitchFamily="34" charset="0"/>
-              </a:rPr>
-              <a:t>Diversity metrics</a:t>
-            </a:r>
-          </a:p>
-        </p:txBody>
-      </p:sp>
-      <p:sp>
-        <p:nvSpPr>
-          <p:cNvPr id="54" name="TextBox 53">
-            <a:extLst>
-              <a:ext uri="{FF2B5EF4-FFF2-40B4-BE49-F238E27FC236}">
-                <a16:creationId xmlns:a16="http://schemas.microsoft.com/office/drawing/2014/main" id="{481314B8-CBC0-4BE8-8582-39833513FECF}"/>
-              </a:ext>
-            </a:extLst>
-          </p:cNvPr>
-          <p:cNvSpPr txBox="1"/>
-          <p:nvPr/>
-        </p:nvSpPr>
-        <p:spPr>
-          <a:xfrm>
-            <a:off x="4848542" y="3189609"/>
-            <a:ext cx="1013314" cy="276999"/>
-          </a:xfrm>
-          <a:prstGeom prst="rect">
-            <a:avLst/>
-          </a:prstGeom>
-          <a:noFill/>
-        </p:spPr>
-        <p:txBody>
-          <a:bodyPr wrap="square" rtlCol="0">
-            <a:spAutoFit/>
-          </a:bodyPr>
-          <a:lstStyle/>
-          <a:p>
-            <a:r>
-              <a:rPr lang="en-GB" sz="1200" u="sng" dirty="0">
+              </a:endParaRPr>
+            </a:p>
+          </p:txBody>
+        </p:sp>
+        <p:sp>
+          <p:nvSpPr>
+            <p:cNvPr id="70" name="TextBox 69">
+              <a:extLst>
+                <a:ext uri="{FF2B5EF4-FFF2-40B4-BE49-F238E27FC236}">
+                  <a16:creationId xmlns:a16="http://schemas.microsoft.com/office/drawing/2014/main" id="{49726771-81C9-4851-8F35-E130C7216F17}"/>
+                </a:ext>
+              </a:extLst>
+            </p:cNvPr>
+            <p:cNvSpPr txBox="1"/>
+            <p:nvPr/>
+          </p:nvSpPr>
+          <p:spPr>
+            <a:xfrm>
+              <a:off x="9212690" y="3094810"/>
+              <a:ext cx="1195264" cy="276999"/>
+            </a:xfrm>
+            <a:prstGeom prst="rect">
+              <a:avLst/>
+            </a:prstGeom>
+            <a:noFill/>
+          </p:spPr>
+          <p:txBody>
+            <a:bodyPr wrap="square" rtlCol="0">
+              <a:spAutoFit/>
+            </a:bodyPr>
+            <a:lstStyle/>
+            <a:p>
+              <a:r>
+                <a:rPr lang="en-GB" sz="1200" u="sng" dirty="0">
+                  <a:latin typeface="Abadi" panose="020B0604020104020204" pitchFamily="34" charset="0"/>
+                </a:rPr>
+                <a:t>Kendrick mass</a:t>
+              </a:r>
+            </a:p>
+          </p:txBody>
+        </p:sp>
+        <p:sp>
+          <p:nvSpPr>
+            <p:cNvPr id="72" name="TextBox 71">
+              <a:extLst>
+                <a:ext uri="{FF2B5EF4-FFF2-40B4-BE49-F238E27FC236}">
+                  <a16:creationId xmlns:a16="http://schemas.microsoft.com/office/drawing/2014/main" id="{A6F91E70-E852-4E96-A7BB-77DD23D566D9}"/>
+                </a:ext>
+              </a:extLst>
+            </p:cNvPr>
+            <p:cNvSpPr txBox="1"/>
+            <p:nvPr/>
+          </p:nvSpPr>
+          <p:spPr>
+            <a:xfrm>
+              <a:off x="7758600" y="2981013"/>
+              <a:ext cx="1013314" cy="461665"/>
+            </a:xfrm>
+            <a:prstGeom prst="rect">
+              <a:avLst/>
+            </a:prstGeom>
+            <a:noFill/>
+          </p:spPr>
+          <p:txBody>
+            <a:bodyPr wrap="square" rtlCol="0">
+              <a:spAutoFit/>
+            </a:bodyPr>
+            <a:lstStyle/>
+            <a:p>
+              <a:r>
+                <a:rPr lang="en-GB" sz="1200" u="sng" dirty="0">
+                  <a:latin typeface="Abadi" panose="020B0604020104020204" pitchFamily="34" charset="0"/>
+                </a:rPr>
+                <a:t>Intersection plots</a:t>
+              </a:r>
+            </a:p>
+          </p:txBody>
+        </p:sp>
+        <p:sp>
+          <p:nvSpPr>
+            <p:cNvPr id="74" name="TextBox 73">
+              <a:extLst>
+                <a:ext uri="{FF2B5EF4-FFF2-40B4-BE49-F238E27FC236}">
+                  <a16:creationId xmlns:a16="http://schemas.microsoft.com/office/drawing/2014/main" id="{A78937DD-E267-42B1-95C4-7750CEDB8AC6}"/>
+                </a:ext>
+              </a:extLst>
+            </p:cNvPr>
+            <p:cNvSpPr txBox="1"/>
+            <p:nvPr/>
+          </p:nvSpPr>
+          <p:spPr>
+            <a:xfrm>
+              <a:off x="7623109" y="4031904"/>
+              <a:ext cx="1535409" cy="415498"/>
+            </a:xfrm>
+            <a:prstGeom prst="rect">
+              <a:avLst/>
+            </a:prstGeom>
+            <a:noFill/>
+          </p:spPr>
+          <p:txBody>
+            <a:bodyPr wrap="square" rtlCol="0">
+              <a:spAutoFit/>
+            </a:bodyPr>
+            <a:lstStyle/>
+            <a:p>
+              <a:r>
+                <a:rPr lang="en-GB" sz="1050" dirty="0">
+                  <a:latin typeface="Abadi" panose="020B0604020104020204" pitchFamily="34" charset="0"/>
+                </a:rPr>
+                <a:t>+ Upset plots using </a:t>
+              </a:r>
+              <a:r>
+                <a:rPr lang="en-GB" sz="1050" dirty="0" err="1">
+                  <a:latin typeface="Abadi" panose="020B0604020104020204" pitchFamily="34" charset="0"/>
+                </a:rPr>
+                <a:t>UpSetPlot</a:t>
+              </a:r>
+              <a:endParaRPr lang="en-GB" sz="1050" dirty="0">
                 <a:latin typeface="Abadi" panose="020B0604020104020204" pitchFamily="34" charset="0"/>
-              </a:rPr>
-              <a:t>Ordination</a:t>
-            </a:r>
-          </a:p>
-        </p:txBody>
-      </p:sp>
-      <p:sp>
-        <p:nvSpPr>
-          <p:cNvPr id="56" name="TextBox 55">
-            <a:extLst>
-              <a:ext uri="{FF2B5EF4-FFF2-40B4-BE49-F238E27FC236}">
-                <a16:creationId xmlns:a16="http://schemas.microsoft.com/office/drawing/2014/main" id="{008E72D4-9286-4520-AC36-3D425B39EFCF}"/>
-              </a:ext>
-            </a:extLst>
-          </p:cNvPr>
-          <p:cNvSpPr txBox="1"/>
-          <p:nvPr/>
-        </p:nvSpPr>
-        <p:spPr>
-          <a:xfrm>
-            <a:off x="6091878" y="3519940"/>
-            <a:ext cx="1535409" cy="253916"/>
-          </a:xfrm>
-          <a:prstGeom prst="rect">
-            <a:avLst/>
-          </a:prstGeom>
-          <a:noFill/>
-        </p:spPr>
-        <p:txBody>
-          <a:bodyPr wrap="square" rtlCol="0">
-            <a:spAutoFit/>
-          </a:bodyPr>
-          <a:lstStyle/>
-          <a:p>
-            <a:r>
-              <a:rPr lang="en-GB" sz="1050" dirty="0">
-                <a:latin typeface="Abadi" panose="020B0604020104020204" pitchFamily="34" charset="0"/>
-              </a:rPr>
-              <a:t>relative_intensities.py</a:t>
-            </a:r>
-          </a:p>
-        </p:txBody>
-      </p:sp>
-      <p:sp>
-        <p:nvSpPr>
-          <p:cNvPr id="58" name="TextBox 57">
-            <a:extLst>
-              <a:ext uri="{FF2B5EF4-FFF2-40B4-BE49-F238E27FC236}">
-                <a16:creationId xmlns:a16="http://schemas.microsoft.com/office/drawing/2014/main" id="{EA5EC986-6336-4D63-83DC-CC254A457880}"/>
-              </a:ext>
-            </a:extLst>
-          </p:cNvPr>
-          <p:cNvSpPr txBox="1"/>
-          <p:nvPr/>
-        </p:nvSpPr>
-        <p:spPr>
-          <a:xfrm>
-            <a:off x="6091877" y="3757486"/>
-            <a:ext cx="1535409" cy="253916"/>
-          </a:xfrm>
-          <a:prstGeom prst="rect">
-            <a:avLst/>
-          </a:prstGeom>
-          <a:noFill/>
-        </p:spPr>
-        <p:txBody>
-          <a:bodyPr wrap="square" rtlCol="0">
-            <a:spAutoFit/>
-          </a:bodyPr>
-          <a:lstStyle/>
-          <a:p>
-            <a:r>
-              <a:rPr lang="en-GB" sz="1050" dirty="0">
-                <a:latin typeface="Abadi" panose="020B0604020104020204" pitchFamily="34" charset="0"/>
-              </a:rPr>
-              <a:t>diversity_indices.py</a:t>
-            </a:r>
-          </a:p>
-        </p:txBody>
-      </p:sp>
-      <p:sp>
-        <p:nvSpPr>
-          <p:cNvPr id="60" name="TextBox 59">
-            <a:extLst>
-              <a:ext uri="{FF2B5EF4-FFF2-40B4-BE49-F238E27FC236}">
-                <a16:creationId xmlns:a16="http://schemas.microsoft.com/office/drawing/2014/main" id="{DDFDE051-31F4-493F-BAD0-86437A5CFE17}"/>
-              </a:ext>
-            </a:extLst>
-          </p:cNvPr>
-          <p:cNvSpPr txBox="1"/>
-          <p:nvPr/>
-        </p:nvSpPr>
-        <p:spPr>
-          <a:xfrm>
-            <a:off x="4695687" y="3514352"/>
-            <a:ext cx="1535409" cy="253916"/>
-          </a:xfrm>
-          <a:prstGeom prst="rect">
-            <a:avLst/>
-          </a:prstGeom>
-          <a:noFill/>
-        </p:spPr>
-        <p:txBody>
-          <a:bodyPr wrap="square" rtlCol="0">
-            <a:spAutoFit/>
-          </a:bodyPr>
-          <a:lstStyle/>
-          <a:p>
-            <a:r>
-              <a:rPr lang="en-GB" sz="1050" dirty="0">
-                <a:latin typeface="Abadi" panose="020B0604020104020204" pitchFamily="34" charset="0"/>
-              </a:rPr>
-              <a:t>ordination_matrix.py</a:t>
-            </a:r>
-          </a:p>
-        </p:txBody>
-      </p:sp>
-      <p:sp>
-        <p:nvSpPr>
-          <p:cNvPr id="62" name="TextBox 61">
-            <a:extLst>
-              <a:ext uri="{FF2B5EF4-FFF2-40B4-BE49-F238E27FC236}">
-                <a16:creationId xmlns:a16="http://schemas.microsoft.com/office/drawing/2014/main" id="{C6FA2430-BB3D-4884-ACDC-DF3D12148676}"/>
-              </a:ext>
-            </a:extLst>
-          </p:cNvPr>
-          <p:cNvSpPr txBox="1"/>
-          <p:nvPr/>
-        </p:nvSpPr>
-        <p:spPr>
-          <a:xfrm>
-            <a:off x="6091877" y="3985737"/>
-            <a:ext cx="1535409" cy="253916"/>
-          </a:xfrm>
-          <a:prstGeom prst="rect">
-            <a:avLst/>
-          </a:prstGeom>
-          <a:noFill/>
-        </p:spPr>
-        <p:txBody>
-          <a:bodyPr wrap="square" rtlCol="0">
-            <a:spAutoFit/>
-          </a:bodyPr>
-          <a:lstStyle/>
-          <a:p>
-            <a:r>
-              <a:rPr lang="en-GB" sz="1050" dirty="0">
-                <a:latin typeface="Abadi" panose="020B0604020104020204" pitchFamily="34" charset="0"/>
-              </a:rPr>
-              <a:t>compound_class.py</a:t>
-            </a:r>
-          </a:p>
-        </p:txBody>
-      </p:sp>
-      <p:sp>
-        <p:nvSpPr>
-          <p:cNvPr id="64" name="TextBox 63">
-            <a:extLst>
-              <a:ext uri="{FF2B5EF4-FFF2-40B4-BE49-F238E27FC236}">
-                <a16:creationId xmlns:a16="http://schemas.microsoft.com/office/drawing/2014/main" id="{4468D425-F4E5-4B34-8FB2-9D3E65817AA6}"/>
-              </a:ext>
-            </a:extLst>
-          </p:cNvPr>
-          <p:cNvSpPr txBox="1"/>
-          <p:nvPr/>
-        </p:nvSpPr>
-        <p:spPr>
-          <a:xfrm>
-            <a:off x="4695687" y="3761759"/>
-            <a:ext cx="1535409" cy="253916"/>
-          </a:xfrm>
-          <a:prstGeom prst="rect">
-            <a:avLst/>
-          </a:prstGeom>
-          <a:noFill/>
-        </p:spPr>
-        <p:txBody>
-          <a:bodyPr wrap="square" rtlCol="0">
-            <a:spAutoFit/>
-          </a:bodyPr>
-          <a:lstStyle/>
-          <a:p>
-            <a:r>
-              <a:rPr lang="en-GB" sz="1050" dirty="0">
-                <a:latin typeface="Abadi" panose="020B0604020104020204" pitchFamily="34" charset="0"/>
-              </a:rPr>
-              <a:t>bray_curtis_matrix.py</a:t>
-            </a:r>
-          </a:p>
-        </p:txBody>
-      </p:sp>
-      <p:sp>
-        <p:nvSpPr>
-          <p:cNvPr id="68" name="TextBox 67">
-            <a:extLst>
-              <a:ext uri="{FF2B5EF4-FFF2-40B4-BE49-F238E27FC236}">
-                <a16:creationId xmlns:a16="http://schemas.microsoft.com/office/drawing/2014/main" id="{5DB46D51-913D-4103-9E6E-F19D3ECAAA0A}"/>
-              </a:ext>
-            </a:extLst>
-          </p:cNvPr>
-          <p:cNvSpPr txBox="1"/>
-          <p:nvPr/>
-        </p:nvSpPr>
-        <p:spPr>
-          <a:xfrm>
-            <a:off x="10753342" y="3094810"/>
-            <a:ext cx="1013314" cy="276999"/>
-          </a:xfrm>
-          <a:prstGeom prst="rect">
-            <a:avLst/>
-          </a:prstGeom>
-          <a:noFill/>
-        </p:spPr>
-        <p:txBody>
-          <a:bodyPr wrap="square" rtlCol="0">
-            <a:spAutoFit/>
-          </a:bodyPr>
-          <a:lstStyle/>
-          <a:p>
-            <a:r>
-              <a:rPr lang="en-GB" sz="1200" u="sng" dirty="0">
-                <a:latin typeface="Abadi" panose="020B0604020104020204" pitchFamily="34" charset="0"/>
-              </a:rPr>
-              <a:t>van </a:t>
-            </a:r>
-            <a:r>
-              <a:rPr lang="en-GB" sz="1200" u="sng" dirty="0" err="1">
-                <a:latin typeface="Abadi" panose="020B0604020104020204" pitchFamily="34" charset="0"/>
-              </a:rPr>
-              <a:t>Krevelen</a:t>
-            </a:r>
-            <a:endParaRPr lang="en-GB" sz="1200" u="sng" dirty="0">
-              <a:latin typeface="Abadi" panose="020B0604020104020204" pitchFamily="34" charset="0"/>
-            </a:endParaRPr>
-          </a:p>
-        </p:txBody>
-      </p:sp>
-      <p:sp>
-        <p:nvSpPr>
-          <p:cNvPr id="70" name="TextBox 69">
-            <a:extLst>
-              <a:ext uri="{FF2B5EF4-FFF2-40B4-BE49-F238E27FC236}">
-                <a16:creationId xmlns:a16="http://schemas.microsoft.com/office/drawing/2014/main" id="{49726771-81C9-4851-8F35-E130C7216F17}"/>
-              </a:ext>
-            </a:extLst>
-          </p:cNvPr>
-          <p:cNvSpPr txBox="1"/>
-          <p:nvPr/>
-        </p:nvSpPr>
-        <p:spPr>
-          <a:xfrm>
-            <a:off x="9212690" y="3094810"/>
-            <a:ext cx="1195264" cy="276999"/>
-          </a:xfrm>
-          <a:prstGeom prst="rect">
-            <a:avLst/>
-          </a:prstGeom>
-          <a:noFill/>
-        </p:spPr>
-        <p:txBody>
-          <a:bodyPr wrap="square" rtlCol="0">
-            <a:spAutoFit/>
-          </a:bodyPr>
-          <a:lstStyle/>
-          <a:p>
-            <a:r>
-              <a:rPr lang="en-GB" sz="1200" u="sng" dirty="0">
-                <a:latin typeface="Abadi" panose="020B0604020104020204" pitchFamily="34" charset="0"/>
-              </a:rPr>
-              <a:t>Kendrick mass</a:t>
-            </a:r>
-          </a:p>
-        </p:txBody>
-      </p:sp>
-      <p:sp>
-        <p:nvSpPr>
-          <p:cNvPr id="72" name="TextBox 71">
-            <a:extLst>
-              <a:ext uri="{FF2B5EF4-FFF2-40B4-BE49-F238E27FC236}">
-                <a16:creationId xmlns:a16="http://schemas.microsoft.com/office/drawing/2014/main" id="{A6F91E70-E852-4E96-A7BB-77DD23D566D9}"/>
-              </a:ext>
-            </a:extLst>
-          </p:cNvPr>
-          <p:cNvSpPr txBox="1"/>
-          <p:nvPr/>
-        </p:nvSpPr>
-        <p:spPr>
-          <a:xfrm>
-            <a:off x="7758600" y="2981013"/>
-            <a:ext cx="1013314" cy="461665"/>
-          </a:xfrm>
-          <a:prstGeom prst="rect">
-            <a:avLst/>
-          </a:prstGeom>
-          <a:noFill/>
-        </p:spPr>
-        <p:txBody>
-          <a:bodyPr wrap="square" rtlCol="0">
-            <a:spAutoFit/>
-          </a:bodyPr>
-          <a:lstStyle/>
-          <a:p>
-            <a:r>
-              <a:rPr lang="en-GB" sz="1200" u="sng" dirty="0">
-                <a:latin typeface="Abadi" panose="020B0604020104020204" pitchFamily="34" charset="0"/>
-              </a:rPr>
-              <a:t>Intersection plots</a:t>
-            </a:r>
-          </a:p>
-        </p:txBody>
-      </p:sp>
-      <p:sp>
-        <p:nvSpPr>
-          <p:cNvPr id="74" name="TextBox 73">
-            <a:extLst>
-              <a:ext uri="{FF2B5EF4-FFF2-40B4-BE49-F238E27FC236}">
-                <a16:creationId xmlns:a16="http://schemas.microsoft.com/office/drawing/2014/main" id="{A78937DD-E267-42B1-95C4-7750CEDB8AC6}"/>
-              </a:ext>
-            </a:extLst>
-          </p:cNvPr>
-          <p:cNvSpPr txBox="1"/>
-          <p:nvPr/>
-        </p:nvSpPr>
-        <p:spPr>
-          <a:xfrm>
-            <a:off x="7623109" y="4031904"/>
-            <a:ext cx="1535409" cy="415498"/>
-          </a:xfrm>
-          <a:prstGeom prst="rect">
-            <a:avLst/>
-          </a:prstGeom>
-          <a:noFill/>
-        </p:spPr>
-        <p:txBody>
-          <a:bodyPr wrap="square" rtlCol="0">
-            <a:spAutoFit/>
-          </a:bodyPr>
-          <a:lstStyle/>
-          <a:p>
-            <a:r>
-              <a:rPr lang="en-GB" sz="1050" dirty="0">
-                <a:latin typeface="Abadi" panose="020B0604020104020204" pitchFamily="34" charset="0"/>
-              </a:rPr>
-              <a:t>+ Upset plots using </a:t>
-            </a:r>
-            <a:r>
-              <a:rPr lang="en-GB" sz="1050" dirty="0" err="1">
-                <a:latin typeface="Abadi" panose="020B0604020104020204" pitchFamily="34" charset="0"/>
-              </a:rPr>
-              <a:t>UpSetPlot</a:t>
-            </a:r>
-            <a:endParaRPr lang="en-GB" sz="1050" dirty="0">
-              <a:latin typeface="Abadi" panose="020B0604020104020204" pitchFamily="34" charset="0"/>
-            </a:endParaRPr>
-          </a:p>
-        </p:txBody>
-      </p:sp>
-      <p:sp>
-        <p:nvSpPr>
-          <p:cNvPr id="76" name="TextBox 75">
-            <a:extLst>
-              <a:ext uri="{FF2B5EF4-FFF2-40B4-BE49-F238E27FC236}">
-                <a16:creationId xmlns:a16="http://schemas.microsoft.com/office/drawing/2014/main" id="{8A211461-06CE-4714-9FCB-52F0E802F4E0}"/>
-              </a:ext>
-            </a:extLst>
-          </p:cNvPr>
-          <p:cNvSpPr txBox="1"/>
-          <p:nvPr/>
-        </p:nvSpPr>
-        <p:spPr>
-          <a:xfrm>
-            <a:off x="9212690" y="3464144"/>
-            <a:ext cx="1113719" cy="415498"/>
-          </a:xfrm>
-          <a:prstGeom prst="rect">
-            <a:avLst/>
-          </a:prstGeom>
-          <a:noFill/>
-        </p:spPr>
-        <p:txBody>
-          <a:bodyPr wrap="square" rtlCol="0">
-            <a:spAutoFit/>
-          </a:bodyPr>
-          <a:lstStyle/>
-          <a:p>
-            <a:r>
-              <a:rPr lang="en-GB" sz="1050" dirty="0">
-                <a:latin typeface="Abadi" panose="020B0604020104020204" pitchFamily="34" charset="0"/>
-              </a:rPr>
-              <a:t>kendrick_mass_defect_plot.py</a:t>
-            </a:r>
-          </a:p>
-        </p:txBody>
-      </p:sp>
-      <p:sp>
-        <p:nvSpPr>
-          <p:cNvPr id="78" name="TextBox 77">
-            <a:extLst>
-              <a:ext uri="{FF2B5EF4-FFF2-40B4-BE49-F238E27FC236}">
-                <a16:creationId xmlns:a16="http://schemas.microsoft.com/office/drawing/2014/main" id="{4E099D9F-6E90-4F64-BE60-904DE321CE4F}"/>
-              </a:ext>
-            </a:extLst>
-          </p:cNvPr>
-          <p:cNvSpPr txBox="1"/>
-          <p:nvPr/>
-        </p:nvSpPr>
-        <p:spPr>
-          <a:xfrm>
-            <a:off x="10703140" y="3481673"/>
-            <a:ext cx="1020842" cy="415498"/>
-          </a:xfrm>
-          <a:prstGeom prst="rect">
-            <a:avLst/>
-          </a:prstGeom>
-          <a:noFill/>
-        </p:spPr>
-        <p:txBody>
-          <a:bodyPr wrap="square" rtlCol="0">
-            <a:spAutoFit/>
-          </a:bodyPr>
-          <a:lstStyle/>
-          <a:p>
-            <a:r>
-              <a:rPr lang="en-GB" sz="1050" dirty="0">
-                <a:latin typeface="Abadi" panose="020B0604020104020204" pitchFamily="34" charset="0"/>
-              </a:rPr>
-              <a:t>van_krevelen_plot.py</a:t>
-            </a:r>
-          </a:p>
-        </p:txBody>
-      </p:sp>
-      <p:sp>
-        <p:nvSpPr>
-          <p:cNvPr id="80" name="TextBox 79">
-            <a:extLst>
-              <a:ext uri="{FF2B5EF4-FFF2-40B4-BE49-F238E27FC236}">
-                <a16:creationId xmlns:a16="http://schemas.microsoft.com/office/drawing/2014/main" id="{CB4CBEE0-5705-450B-A8E6-8D9F1DF37FB1}"/>
-              </a:ext>
-            </a:extLst>
-          </p:cNvPr>
-          <p:cNvSpPr txBox="1"/>
-          <p:nvPr/>
-        </p:nvSpPr>
-        <p:spPr>
-          <a:xfrm>
-            <a:off x="10703140" y="3957943"/>
-            <a:ext cx="1365312" cy="415498"/>
-          </a:xfrm>
-          <a:prstGeom prst="rect">
-            <a:avLst/>
-          </a:prstGeom>
-          <a:noFill/>
-        </p:spPr>
-        <p:txBody>
-          <a:bodyPr wrap="square" rtlCol="0">
-            <a:spAutoFit/>
-          </a:bodyPr>
-          <a:lstStyle/>
-          <a:p>
-            <a:r>
-              <a:rPr lang="en-GB" sz="1050" dirty="0">
-                <a:latin typeface="Abadi" panose="020B0604020104020204" pitchFamily="34" charset="0"/>
-              </a:rPr>
-              <a:t>multi_van_krevelen_plot.py</a:t>
-            </a:r>
-          </a:p>
-        </p:txBody>
-      </p:sp>
-      <p:sp>
-        <p:nvSpPr>
-          <p:cNvPr id="82" name="TextBox 81">
-            <a:extLst>
-              <a:ext uri="{FF2B5EF4-FFF2-40B4-BE49-F238E27FC236}">
-                <a16:creationId xmlns:a16="http://schemas.microsoft.com/office/drawing/2014/main" id="{584728CF-8A75-4441-9082-0A89D04525F9}"/>
-              </a:ext>
-            </a:extLst>
-          </p:cNvPr>
-          <p:cNvSpPr txBox="1"/>
-          <p:nvPr/>
-        </p:nvSpPr>
-        <p:spPr>
-          <a:xfrm>
-            <a:off x="10703140" y="4373441"/>
-            <a:ext cx="1020842" cy="415498"/>
-          </a:xfrm>
-          <a:prstGeom prst="rect">
-            <a:avLst/>
-          </a:prstGeom>
-          <a:noFill/>
-        </p:spPr>
-        <p:txBody>
-          <a:bodyPr wrap="square" rtlCol="0">
-            <a:spAutoFit/>
-          </a:bodyPr>
-          <a:lstStyle/>
-          <a:p>
-            <a:r>
-              <a:rPr lang="en-GB" sz="1050" dirty="0">
-                <a:latin typeface="Abadi" panose="020B0604020104020204" pitchFamily="34" charset="0"/>
-              </a:rPr>
-              <a:t>van_krevelen_histogram.py</a:t>
-            </a:r>
-          </a:p>
-        </p:txBody>
-      </p:sp>
-      <p:sp>
-        <p:nvSpPr>
-          <p:cNvPr id="84" name="TextBox 83">
-            <a:extLst>
-              <a:ext uri="{FF2B5EF4-FFF2-40B4-BE49-F238E27FC236}">
-                <a16:creationId xmlns:a16="http://schemas.microsoft.com/office/drawing/2014/main" id="{A9A9C561-562D-430E-811C-FE6C3E8F780C}"/>
-              </a:ext>
-            </a:extLst>
-          </p:cNvPr>
-          <p:cNvSpPr txBox="1"/>
-          <p:nvPr/>
-        </p:nvSpPr>
-        <p:spPr>
-          <a:xfrm>
-            <a:off x="5158520" y="2095348"/>
-            <a:ext cx="1866714" cy="369332"/>
-          </a:xfrm>
-          <a:prstGeom prst="rect">
-            <a:avLst/>
-          </a:prstGeom>
-          <a:noFill/>
-        </p:spPr>
-        <p:txBody>
-          <a:bodyPr wrap="square" rtlCol="0">
-            <a:spAutoFit/>
-          </a:bodyPr>
-          <a:lstStyle/>
-          <a:p>
-            <a:r>
-              <a:rPr lang="en-GB" u="sng" dirty="0">
-                <a:latin typeface="Abadi" panose="020B0604020104020204" pitchFamily="34" charset="0"/>
-              </a:rPr>
-              <a:t>.</a:t>
-            </a:r>
-            <a:r>
-              <a:rPr lang="en-GB" u="sng" dirty="0" err="1">
-                <a:latin typeface="Abadi" panose="020B0604020104020204" pitchFamily="34" charset="0"/>
-              </a:rPr>
-              <a:t>pykrev</a:t>
-            </a:r>
-            <a:r>
-              <a:rPr lang="en-GB" u="sng" dirty="0">
-                <a:latin typeface="Abadi" panose="020B0604020104020204" pitchFamily="34" charset="0"/>
-              </a:rPr>
-              <a:t>/diversity</a:t>
-            </a:r>
-          </a:p>
-        </p:txBody>
-      </p:sp>
-      <p:sp>
-        <p:nvSpPr>
-          <p:cNvPr id="86" name="TextBox 85">
-            <a:extLst>
-              <a:ext uri="{FF2B5EF4-FFF2-40B4-BE49-F238E27FC236}">
-                <a16:creationId xmlns:a16="http://schemas.microsoft.com/office/drawing/2014/main" id="{F94979BA-8023-4E93-98C1-ECE967BFB36B}"/>
-              </a:ext>
-            </a:extLst>
-          </p:cNvPr>
-          <p:cNvSpPr txBox="1"/>
-          <p:nvPr/>
-        </p:nvSpPr>
-        <p:spPr>
-          <a:xfrm>
-            <a:off x="8758944" y="2107508"/>
-            <a:ext cx="1866714" cy="369332"/>
-          </a:xfrm>
-          <a:prstGeom prst="rect">
-            <a:avLst/>
-          </a:prstGeom>
-          <a:noFill/>
-        </p:spPr>
-        <p:txBody>
-          <a:bodyPr wrap="square" rtlCol="0">
-            <a:spAutoFit/>
-          </a:bodyPr>
-          <a:lstStyle/>
-          <a:p>
-            <a:r>
-              <a:rPr lang="en-GB" u="sng" dirty="0">
-                <a:latin typeface="Abadi" panose="020B0604020104020204" pitchFamily="34" charset="0"/>
-              </a:rPr>
-              <a:t>.</a:t>
-            </a:r>
-            <a:r>
-              <a:rPr lang="en-GB" u="sng" dirty="0" err="1">
-                <a:latin typeface="Abadi" panose="020B0604020104020204" pitchFamily="34" charset="0"/>
-              </a:rPr>
-              <a:t>pykrev</a:t>
-            </a:r>
-            <a:r>
-              <a:rPr lang="en-GB" u="sng" dirty="0">
-                <a:latin typeface="Abadi" panose="020B0604020104020204" pitchFamily="34" charset="0"/>
-              </a:rPr>
-              <a:t>/plotting</a:t>
-            </a:r>
-          </a:p>
-        </p:txBody>
-      </p:sp>
-      <p:sp>
-        <p:nvSpPr>
-          <p:cNvPr id="88" name="TextBox 87">
-            <a:extLst>
-              <a:ext uri="{FF2B5EF4-FFF2-40B4-BE49-F238E27FC236}">
-                <a16:creationId xmlns:a16="http://schemas.microsoft.com/office/drawing/2014/main" id="{D22C270C-24C8-4AFA-ADA0-1AFF3D13B442}"/>
-              </a:ext>
-            </a:extLst>
-          </p:cNvPr>
-          <p:cNvSpPr txBox="1"/>
-          <p:nvPr/>
-        </p:nvSpPr>
-        <p:spPr>
-          <a:xfrm>
-            <a:off x="7599906" y="3773856"/>
-            <a:ext cx="1124994" cy="253916"/>
-          </a:xfrm>
-          <a:prstGeom prst="rect">
-            <a:avLst/>
-          </a:prstGeom>
-          <a:noFill/>
-        </p:spPr>
-        <p:txBody>
-          <a:bodyPr wrap="square" rtlCol="0">
-            <a:spAutoFit/>
-          </a:bodyPr>
-          <a:lstStyle/>
-          <a:p>
-            <a:r>
-              <a:rPr lang="en-GB" sz="1050" dirty="0">
-                <a:latin typeface="Abadi" panose="020B0604020104020204" pitchFamily="34" charset="0"/>
-              </a:rPr>
-              <a:t>missing_plot.py</a:t>
-            </a:r>
-          </a:p>
-        </p:txBody>
-      </p:sp>
-      <p:sp>
-        <p:nvSpPr>
-          <p:cNvPr id="90" name="TextBox 89">
-            <a:extLst>
-              <a:ext uri="{FF2B5EF4-FFF2-40B4-BE49-F238E27FC236}">
-                <a16:creationId xmlns:a16="http://schemas.microsoft.com/office/drawing/2014/main" id="{B954979D-B3A5-4875-AB54-93E4446F0FB6}"/>
-              </a:ext>
-            </a:extLst>
-          </p:cNvPr>
-          <p:cNvSpPr txBox="1"/>
-          <p:nvPr/>
-        </p:nvSpPr>
-        <p:spPr>
-          <a:xfrm>
-            <a:off x="7623109" y="3498923"/>
-            <a:ext cx="1124994" cy="253916"/>
-          </a:xfrm>
-          <a:prstGeom prst="rect">
-            <a:avLst/>
-          </a:prstGeom>
-          <a:noFill/>
-        </p:spPr>
-        <p:txBody>
-          <a:bodyPr wrap="square" rtlCol="0">
-            <a:spAutoFit/>
-          </a:bodyPr>
-          <a:lstStyle/>
-          <a:p>
-            <a:r>
-              <a:rPr lang="en-GB" sz="1050" dirty="0">
-                <a:latin typeface="Abadi" panose="020B0604020104020204" pitchFamily="34" charset="0"/>
-              </a:rPr>
-              <a:t>unique_plot.py</a:t>
-            </a:r>
-          </a:p>
-        </p:txBody>
-      </p:sp>
+              </a:endParaRPr>
+            </a:p>
+          </p:txBody>
+        </p:sp>
+        <p:sp>
+          <p:nvSpPr>
+            <p:cNvPr id="76" name="TextBox 75">
+              <a:extLst>
+                <a:ext uri="{FF2B5EF4-FFF2-40B4-BE49-F238E27FC236}">
+                  <a16:creationId xmlns:a16="http://schemas.microsoft.com/office/drawing/2014/main" id="{8A211461-06CE-4714-9FCB-52F0E802F4E0}"/>
+                </a:ext>
+              </a:extLst>
+            </p:cNvPr>
+            <p:cNvSpPr txBox="1"/>
+            <p:nvPr/>
+          </p:nvSpPr>
+          <p:spPr>
+            <a:xfrm>
+              <a:off x="9212690" y="3464144"/>
+              <a:ext cx="1113719" cy="415498"/>
+            </a:xfrm>
+            <a:prstGeom prst="rect">
+              <a:avLst/>
+            </a:prstGeom>
+            <a:noFill/>
+          </p:spPr>
+          <p:txBody>
+            <a:bodyPr wrap="square" rtlCol="0">
+              <a:spAutoFit/>
+            </a:bodyPr>
+            <a:lstStyle/>
+            <a:p>
+              <a:r>
+                <a:rPr lang="en-GB" sz="1050" dirty="0">
+                  <a:latin typeface="Abadi" panose="020B0604020104020204" pitchFamily="34" charset="0"/>
+                </a:rPr>
+                <a:t>kendrick_mass_defect_plot.py</a:t>
+              </a:r>
+            </a:p>
+          </p:txBody>
+        </p:sp>
+        <p:sp>
+          <p:nvSpPr>
+            <p:cNvPr id="78" name="TextBox 77">
+              <a:extLst>
+                <a:ext uri="{FF2B5EF4-FFF2-40B4-BE49-F238E27FC236}">
+                  <a16:creationId xmlns:a16="http://schemas.microsoft.com/office/drawing/2014/main" id="{4E099D9F-6E90-4F64-BE60-904DE321CE4F}"/>
+                </a:ext>
+              </a:extLst>
+            </p:cNvPr>
+            <p:cNvSpPr txBox="1"/>
+            <p:nvPr/>
+          </p:nvSpPr>
+          <p:spPr>
+            <a:xfrm>
+              <a:off x="10703140" y="3481673"/>
+              <a:ext cx="1020842" cy="415498"/>
+            </a:xfrm>
+            <a:prstGeom prst="rect">
+              <a:avLst/>
+            </a:prstGeom>
+            <a:noFill/>
+          </p:spPr>
+          <p:txBody>
+            <a:bodyPr wrap="square" rtlCol="0">
+              <a:spAutoFit/>
+            </a:bodyPr>
+            <a:lstStyle/>
+            <a:p>
+              <a:r>
+                <a:rPr lang="en-GB" sz="1050" dirty="0">
+                  <a:latin typeface="Abadi" panose="020B0604020104020204" pitchFamily="34" charset="0"/>
+                </a:rPr>
+                <a:t>van_krevelen_plot.py</a:t>
+              </a:r>
+            </a:p>
+          </p:txBody>
+        </p:sp>
+        <p:sp>
+          <p:nvSpPr>
+            <p:cNvPr id="80" name="TextBox 79">
+              <a:extLst>
+                <a:ext uri="{FF2B5EF4-FFF2-40B4-BE49-F238E27FC236}">
+                  <a16:creationId xmlns:a16="http://schemas.microsoft.com/office/drawing/2014/main" id="{CB4CBEE0-5705-450B-A8E6-8D9F1DF37FB1}"/>
+                </a:ext>
+              </a:extLst>
+            </p:cNvPr>
+            <p:cNvSpPr txBox="1"/>
+            <p:nvPr/>
+          </p:nvSpPr>
+          <p:spPr>
+            <a:xfrm>
+              <a:off x="10703140" y="3957943"/>
+              <a:ext cx="1365312" cy="415498"/>
+            </a:xfrm>
+            <a:prstGeom prst="rect">
+              <a:avLst/>
+            </a:prstGeom>
+            <a:noFill/>
+          </p:spPr>
+          <p:txBody>
+            <a:bodyPr wrap="square" rtlCol="0">
+              <a:spAutoFit/>
+            </a:bodyPr>
+            <a:lstStyle/>
+            <a:p>
+              <a:r>
+                <a:rPr lang="en-GB" sz="1050" dirty="0">
+                  <a:latin typeface="Abadi" panose="020B0604020104020204" pitchFamily="34" charset="0"/>
+                </a:rPr>
+                <a:t>multi_van_krevelen_plot.py</a:t>
+              </a:r>
+            </a:p>
+          </p:txBody>
+        </p:sp>
+        <p:sp>
+          <p:nvSpPr>
+            <p:cNvPr id="82" name="TextBox 81">
+              <a:extLst>
+                <a:ext uri="{FF2B5EF4-FFF2-40B4-BE49-F238E27FC236}">
+                  <a16:creationId xmlns:a16="http://schemas.microsoft.com/office/drawing/2014/main" id="{584728CF-8A75-4441-9082-0A89D04525F9}"/>
+                </a:ext>
+              </a:extLst>
+            </p:cNvPr>
+            <p:cNvSpPr txBox="1"/>
+            <p:nvPr/>
+          </p:nvSpPr>
+          <p:spPr>
+            <a:xfrm>
+              <a:off x="10703140" y="4373441"/>
+              <a:ext cx="1020842" cy="415498"/>
+            </a:xfrm>
+            <a:prstGeom prst="rect">
+              <a:avLst/>
+            </a:prstGeom>
+            <a:noFill/>
+          </p:spPr>
+          <p:txBody>
+            <a:bodyPr wrap="square" rtlCol="0">
+              <a:spAutoFit/>
+            </a:bodyPr>
+            <a:lstStyle/>
+            <a:p>
+              <a:r>
+                <a:rPr lang="en-GB" sz="1050" dirty="0">
+                  <a:latin typeface="Abadi" panose="020B0604020104020204" pitchFamily="34" charset="0"/>
+                </a:rPr>
+                <a:t>van_krevelen_histogram.py</a:t>
+              </a:r>
+            </a:p>
+          </p:txBody>
+        </p:sp>
+        <p:sp>
+          <p:nvSpPr>
+            <p:cNvPr id="84" name="TextBox 83">
+              <a:extLst>
+                <a:ext uri="{FF2B5EF4-FFF2-40B4-BE49-F238E27FC236}">
+                  <a16:creationId xmlns:a16="http://schemas.microsoft.com/office/drawing/2014/main" id="{A9A9C561-562D-430E-811C-FE6C3E8F780C}"/>
+                </a:ext>
+              </a:extLst>
+            </p:cNvPr>
+            <p:cNvSpPr txBox="1"/>
+            <p:nvPr/>
+          </p:nvSpPr>
+          <p:spPr>
+            <a:xfrm>
+              <a:off x="5158520" y="2095348"/>
+              <a:ext cx="1866714" cy="369332"/>
+            </a:xfrm>
+            <a:prstGeom prst="rect">
+              <a:avLst/>
+            </a:prstGeom>
+            <a:noFill/>
+          </p:spPr>
+          <p:txBody>
+            <a:bodyPr wrap="square" rtlCol="0">
+              <a:spAutoFit/>
+            </a:bodyPr>
+            <a:lstStyle/>
+            <a:p>
+              <a:r>
+                <a:rPr lang="en-GB" u="sng" dirty="0">
+                  <a:latin typeface="Abadi" panose="020B0604020104020204" pitchFamily="34" charset="0"/>
+                </a:rPr>
+                <a:t>.</a:t>
+              </a:r>
+              <a:r>
+                <a:rPr lang="en-GB" u="sng" dirty="0" err="1">
+                  <a:latin typeface="Abadi" panose="020B0604020104020204" pitchFamily="34" charset="0"/>
+                </a:rPr>
+                <a:t>pykrev</a:t>
+              </a:r>
+              <a:r>
+                <a:rPr lang="en-GB" u="sng" dirty="0">
+                  <a:latin typeface="Abadi" panose="020B0604020104020204" pitchFamily="34" charset="0"/>
+                </a:rPr>
+                <a:t>/diversity</a:t>
+              </a:r>
+            </a:p>
+          </p:txBody>
+        </p:sp>
+        <p:sp>
+          <p:nvSpPr>
+            <p:cNvPr id="86" name="TextBox 85">
+              <a:extLst>
+                <a:ext uri="{FF2B5EF4-FFF2-40B4-BE49-F238E27FC236}">
+                  <a16:creationId xmlns:a16="http://schemas.microsoft.com/office/drawing/2014/main" id="{F94979BA-8023-4E93-98C1-ECE967BFB36B}"/>
+                </a:ext>
+              </a:extLst>
+            </p:cNvPr>
+            <p:cNvSpPr txBox="1"/>
+            <p:nvPr/>
+          </p:nvSpPr>
+          <p:spPr>
+            <a:xfrm>
+              <a:off x="8758944" y="2107508"/>
+              <a:ext cx="1866714" cy="369332"/>
+            </a:xfrm>
+            <a:prstGeom prst="rect">
+              <a:avLst/>
+            </a:prstGeom>
+            <a:noFill/>
+          </p:spPr>
+          <p:txBody>
+            <a:bodyPr wrap="square" rtlCol="0">
+              <a:spAutoFit/>
+            </a:bodyPr>
+            <a:lstStyle/>
+            <a:p>
+              <a:r>
+                <a:rPr lang="en-GB" u="sng" dirty="0">
+                  <a:latin typeface="Abadi" panose="020B0604020104020204" pitchFamily="34" charset="0"/>
+                </a:rPr>
+                <a:t>.</a:t>
+              </a:r>
+              <a:r>
+                <a:rPr lang="en-GB" u="sng" dirty="0" err="1">
+                  <a:latin typeface="Abadi" panose="020B0604020104020204" pitchFamily="34" charset="0"/>
+                </a:rPr>
+                <a:t>pykrev</a:t>
+              </a:r>
+              <a:r>
+                <a:rPr lang="en-GB" u="sng" dirty="0">
+                  <a:latin typeface="Abadi" panose="020B0604020104020204" pitchFamily="34" charset="0"/>
+                </a:rPr>
+                <a:t>/plotting</a:t>
+              </a:r>
+            </a:p>
+          </p:txBody>
+        </p:sp>
+        <p:sp>
+          <p:nvSpPr>
+            <p:cNvPr id="88" name="TextBox 87">
+              <a:extLst>
+                <a:ext uri="{FF2B5EF4-FFF2-40B4-BE49-F238E27FC236}">
+                  <a16:creationId xmlns:a16="http://schemas.microsoft.com/office/drawing/2014/main" id="{D22C270C-24C8-4AFA-ADA0-1AFF3D13B442}"/>
+                </a:ext>
+              </a:extLst>
+            </p:cNvPr>
+            <p:cNvSpPr txBox="1"/>
+            <p:nvPr/>
+          </p:nvSpPr>
+          <p:spPr>
+            <a:xfrm>
+              <a:off x="7599906" y="3773856"/>
+              <a:ext cx="1124994" cy="253916"/>
+            </a:xfrm>
+            <a:prstGeom prst="rect">
+              <a:avLst/>
+            </a:prstGeom>
+            <a:noFill/>
+          </p:spPr>
+          <p:txBody>
+            <a:bodyPr wrap="square" rtlCol="0">
+              <a:spAutoFit/>
+            </a:bodyPr>
+            <a:lstStyle/>
+            <a:p>
+              <a:r>
+                <a:rPr lang="en-GB" sz="1050" dirty="0">
+                  <a:latin typeface="Abadi" panose="020B0604020104020204" pitchFamily="34" charset="0"/>
+                </a:rPr>
+                <a:t>missing_plot.py</a:t>
+              </a:r>
+            </a:p>
+          </p:txBody>
+        </p:sp>
+        <p:sp>
+          <p:nvSpPr>
+            <p:cNvPr id="90" name="TextBox 89">
+              <a:extLst>
+                <a:ext uri="{FF2B5EF4-FFF2-40B4-BE49-F238E27FC236}">
+                  <a16:creationId xmlns:a16="http://schemas.microsoft.com/office/drawing/2014/main" id="{B954979D-B3A5-4875-AB54-93E4446F0FB6}"/>
+                </a:ext>
+              </a:extLst>
+            </p:cNvPr>
+            <p:cNvSpPr txBox="1"/>
+            <p:nvPr/>
+          </p:nvSpPr>
+          <p:spPr>
+            <a:xfrm>
+              <a:off x="7623109" y="3498923"/>
+              <a:ext cx="1124994" cy="253916"/>
+            </a:xfrm>
+            <a:prstGeom prst="rect">
+              <a:avLst/>
+            </a:prstGeom>
+            <a:noFill/>
+          </p:spPr>
+          <p:txBody>
+            <a:bodyPr wrap="square" rtlCol="0">
+              <a:spAutoFit/>
+            </a:bodyPr>
+            <a:lstStyle/>
+            <a:p>
+              <a:r>
+                <a:rPr lang="en-GB" sz="1050" dirty="0">
+                  <a:latin typeface="Abadi" panose="020B0604020104020204" pitchFamily="34" charset="0"/>
+                </a:rPr>
+                <a:t>unique_plot.py</a:t>
+              </a:r>
+            </a:p>
+          </p:txBody>
+        </p:sp>
+      </p:grpSp>
     </p:spTree>
     <p:extLst>
       <p:ext uri="{BB962C8B-B14F-4D97-AF65-F5344CB8AC3E}">

</xml_diff>

<commit_message>
Small changes to docs.
</commit_message>
<xml_diff>
--- a/docs/PyKrev Interface.pptx
+++ b/docs/PyKrev Interface.pptx
@@ -197,7 +197,7 @@
           <a:p>
             <a:fld id="{9740D62B-E2DD-4F8E-B5D8-976E68D9A4FC}" type="datetimeFigureOut">
               <a:rPr lang="en-GB" smtClean="0"/>
-              <a:t>18/11/2020</a:t>
+              <a:t>20/11/2020</a:t>
             </a:fld>
             <a:endParaRPr lang="en-GB"/>
           </a:p>
@@ -698,7 +698,7 @@
           <a:p>
             <a:fld id="{2E13BE49-2C18-44EC-B643-1287673AC118}" type="datetimeFigureOut">
               <a:rPr lang="en-GB" smtClean="0"/>
-              <a:t>18/11/2020</a:t>
+              <a:t>20/11/2020</a:t>
             </a:fld>
             <a:endParaRPr lang="en-GB"/>
           </a:p>
@@ -898,7 +898,7 @@
           <a:p>
             <a:fld id="{2E13BE49-2C18-44EC-B643-1287673AC118}" type="datetimeFigureOut">
               <a:rPr lang="en-GB" smtClean="0"/>
-              <a:t>18/11/2020</a:t>
+              <a:t>20/11/2020</a:t>
             </a:fld>
             <a:endParaRPr lang="en-GB"/>
           </a:p>
@@ -1108,7 +1108,7 @@
           <a:p>
             <a:fld id="{2E13BE49-2C18-44EC-B643-1287673AC118}" type="datetimeFigureOut">
               <a:rPr lang="en-GB" smtClean="0"/>
-              <a:t>18/11/2020</a:t>
+              <a:t>20/11/2020</a:t>
             </a:fld>
             <a:endParaRPr lang="en-GB"/>
           </a:p>
@@ -1308,7 +1308,7 @@
           <a:p>
             <a:fld id="{2E13BE49-2C18-44EC-B643-1287673AC118}" type="datetimeFigureOut">
               <a:rPr lang="en-GB" smtClean="0"/>
-              <a:t>18/11/2020</a:t>
+              <a:t>20/11/2020</a:t>
             </a:fld>
             <a:endParaRPr lang="en-GB"/>
           </a:p>
@@ -1584,7 +1584,7 @@
           <a:p>
             <a:fld id="{2E13BE49-2C18-44EC-B643-1287673AC118}" type="datetimeFigureOut">
               <a:rPr lang="en-GB" smtClean="0"/>
-              <a:t>18/11/2020</a:t>
+              <a:t>20/11/2020</a:t>
             </a:fld>
             <a:endParaRPr lang="en-GB"/>
           </a:p>
@@ -1852,7 +1852,7 @@
           <a:p>
             <a:fld id="{2E13BE49-2C18-44EC-B643-1287673AC118}" type="datetimeFigureOut">
               <a:rPr lang="en-GB" smtClean="0"/>
-              <a:t>18/11/2020</a:t>
+              <a:t>20/11/2020</a:t>
             </a:fld>
             <a:endParaRPr lang="en-GB"/>
           </a:p>
@@ -2267,7 +2267,7 @@
           <a:p>
             <a:fld id="{2E13BE49-2C18-44EC-B643-1287673AC118}" type="datetimeFigureOut">
               <a:rPr lang="en-GB" smtClean="0"/>
-              <a:t>18/11/2020</a:t>
+              <a:t>20/11/2020</a:t>
             </a:fld>
             <a:endParaRPr lang="en-GB"/>
           </a:p>
@@ -2409,7 +2409,7 @@
           <a:p>
             <a:fld id="{2E13BE49-2C18-44EC-B643-1287673AC118}" type="datetimeFigureOut">
               <a:rPr lang="en-GB" smtClean="0"/>
-              <a:t>18/11/2020</a:t>
+              <a:t>20/11/2020</a:t>
             </a:fld>
             <a:endParaRPr lang="en-GB"/>
           </a:p>
@@ -2522,7 +2522,7 @@
           <a:p>
             <a:fld id="{2E13BE49-2C18-44EC-B643-1287673AC118}" type="datetimeFigureOut">
               <a:rPr lang="en-GB" smtClean="0"/>
-              <a:t>18/11/2020</a:t>
+              <a:t>20/11/2020</a:t>
             </a:fld>
             <a:endParaRPr lang="en-GB"/>
           </a:p>
@@ -2835,7 +2835,7 @@
           <a:p>
             <a:fld id="{2E13BE49-2C18-44EC-B643-1287673AC118}" type="datetimeFigureOut">
               <a:rPr lang="en-GB" smtClean="0"/>
-              <a:t>18/11/2020</a:t>
+              <a:t>20/11/2020</a:t>
             </a:fld>
             <a:endParaRPr lang="en-GB"/>
           </a:p>
@@ -3124,7 +3124,7 @@
           <a:p>
             <a:fld id="{2E13BE49-2C18-44EC-B643-1287673AC118}" type="datetimeFigureOut">
               <a:rPr lang="en-GB" smtClean="0"/>
-              <a:t>18/11/2020</a:t>
+              <a:t>20/11/2020</a:t>
             </a:fld>
             <a:endParaRPr lang="en-GB"/>
           </a:p>
@@ -3367,7 +3367,7 @@
           <a:p>
             <a:fld id="{2E13BE49-2C18-44EC-B643-1287673AC118}" type="datetimeFigureOut">
               <a:rPr lang="en-GB" smtClean="0"/>
-              <a:t>18/11/2020</a:t>
+              <a:t>20/11/2020</a:t>
             </a:fld>
             <a:endParaRPr lang="en-GB"/>
           </a:p>
@@ -4932,7 +4932,7 @@
                 <a:rPr lang="en-GB" sz="1200" u="sng" dirty="0">
                   <a:latin typeface="Abadi" panose="020B0604020104020204" pitchFamily="34" charset="0"/>
                 </a:rPr>
-                <a:t>Kendrick mass</a:t>
+                <a:t>Formula class</a:t>
               </a:r>
             </a:p>
           </p:txBody>
@@ -5341,6 +5341,80 @@
           </p:txBody>
         </p:sp>
       </p:grpSp>
+      <p:sp>
+        <p:nvSpPr>
+          <p:cNvPr id="41" name="TextBox 40">
+            <a:extLst>
+              <a:ext uri="{FF2B5EF4-FFF2-40B4-BE49-F238E27FC236}">
+                <a16:creationId xmlns:a16="http://schemas.microsoft.com/office/drawing/2014/main" id="{B518140A-1821-44F9-8E9D-D1D150307634}"/>
+              </a:ext>
+            </a:extLst>
+          </p:cNvPr>
+          <p:cNvSpPr txBox="1"/>
+          <p:nvPr/>
+        </p:nvSpPr>
+        <p:spPr>
+          <a:xfrm>
+            <a:off x="9212691" y="4131954"/>
+            <a:ext cx="1018600" cy="415498"/>
+          </a:xfrm>
+          <a:prstGeom prst="rect">
+            <a:avLst/>
+          </a:prstGeom>
+          <a:noFill/>
+        </p:spPr>
+        <p:txBody>
+          <a:bodyPr wrap="square" rtlCol="0">
+            <a:spAutoFit/>
+          </a:bodyPr>
+          <a:lstStyle/>
+          <a:p>
+            <a:r>
+              <a:rPr lang="en-GB" sz="1050" dirty="0">
+                <a:latin typeface="Abadi" panose="020B0604020104020204" pitchFamily="34" charset="0"/>
+              </a:rPr>
+              <a:t>atomic_class_plot.py</a:t>
+            </a:r>
+          </a:p>
+        </p:txBody>
+      </p:sp>
+      <p:sp>
+        <p:nvSpPr>
+          <p:cNvPr id="43" name="TextBox 42">
+            <a:extLst>
+              <a:ext uri="{FF2B5EF4-FFF2-40B4-BE49-F238E27FC236}">
+                <a16:creationId xmlns:a16="http://schemas.microsoft.com/office/drawing/2014/main" id="{5B2FD2C5-4A9B-445D-BBB3-2E128EC92706}"/>
+              </a:ext>
+            </a:extLst>
+          </p:cNvPr>
+          <p:cNvSpPr txBox="1"/>
+          <p:nvPr/>
+        </p:nvSpPr>
+        <p:spPr>
+          <a:xfrm>
+            <a:off x="9212691" y="4520232"/>
+            <a:ext cx="1195263" cy="415498"/>
+          </a:xfrm>
+          <a:prstGeom prst="rect">
+            <a:avLst/>
+          </a:prstGeom>
+          <a:noFill/>
+        </p:spPr>
+        <p:txBody>
+          <a:bodyPr wrap="square" rtlCol="0">
+            <a:spAutoFit/>
+          </a:bodyPr>
+          <a:lstStyle/>
+          <a:p>
+            <a:r>
+              <a:rPr lang="en-GB" sz="1050" dirty="0">
+                <a:latin typeface="Abadi" panose="020B0604020104020204" pitchFamily="34" charset="0"/>
+              </a:rPr>
+              <a:t>compound_class_plot.py</a:t>
+            </a:r>
+          </a:p>
+        </p:txBody>
+      </p:sp>
     </p:spTree>
     <p:extLst>
       <p:ext uri="{BB962C8B-B14F-4D97-AF65-F5344CB8AC3E}">

</xml_diff>

<commit_message>
Added mass spectrum and hist, updated docs
</commit_message>
<xml_diff>
--- a/docs/PyKrev Interface.pptx
+++ b/docs/PyKrev Interface.pptx
@@ -197,7 +197,7 @@
           <a:p>
             <a:fld id="{9740D62B-E2DD-4F8E-B5D8-976E68D9A4FC}" type="datetimeFigureOut">
               <a:rPr lang="en-GB" smtClean="0"/>
-              <a:t>20/11/2020</a:t>
+              <a:t>26/11/2020</a:t>
             </a:fld>
             <a:endParaRPr lang="en-GB"/>
           </a:p>
@@ -698,7 +698,7 @@
           <a:p>
             <a:fld id="{2E13BE49-2C18-44EC-B643-1287673AC118}" type="datetimeFigureOut">
               <a:rPr lang="en-GB" smtClean="0"/>
-              <a:t>20/11/2020</a:t>
+              <a:t>26/11/2020</a:t>
             </a:fld>
             <a:endParaRPr lang="en-GB"/>
           </a:p>
@@ -898,7 +898,7 @@
           <a:p>
             <a:fld id="{2E13BE49-2C18-44EC-B643-1287673AC118}" type="datetimeFigureOut">
               <a:rPr lang="en-GB" smtClean="0"/>
-              <a:t>20/11/2020</a:t>
+              <a:t>26/11/2020</a:t>
             </a:fld>
             <a:endParaRPr lang="en-GB"/>
           </a:p>
@@ -1108,7 +1108,7 @@
           <a:p>
             <a:fld id="{2E13BE49-2C18-44EC-B643-1287673AC118}" type="datetimeFigureOut">
               <a:rPr lang="en-GB" smtClean="0"/>
-              <a:t>20/11/2020</a:t>
+              <a:t>26/11/2020</a:t>
             </a:fld>
             <a:endParaRPr lang="en-GB"/>
           </a:p>
@@ -1308,7 +1308,7 @@
           <a:p>
             <a:fld id="{2E13BE49-2C18-44EC-B643-1287673AC118}" type="datetimeFigureOut">
               <a:rPr lang="en-GB" smtClean="0"/>
-              <a:t>20/11/2020</a:t>
+              <a:t>26/11/2020</a:t>
             </a:fld>
             <a:endParaRPr lang="en-GB"/>
           </a:p>
@@ -1584,7 +1584,7 @@
           <a:p>
             <a:fld id="{2E13BE49-2C18-44EC-B643-1287673AC118}" type="datetimeFigureOut">
               <a:rPr lang="en-GB" smtClean="0"/>
-              <a:t>20/11/2020</a:t>
+              <a:t>26/11/2020</a:t>
             </a:fld>
             <a:endParaRPr lang="en-GB"/>
           </a:p>
@@ -1852,7 +1852,7 @@
           <a:p>
             <a:fld id="{2E13BE49-2C18-44EC-B643-1287673AC118}" type="datetimeFigureOut">
               <a:rPr lang="en-GB" smtClean="0"/>
-              <a:t>20/11/2020</a:t>
+              <a:t>26/11/2020</a:t>
             </a:fld>
             <a:endParaRPr lang="en-GB"/>
           </a:p>
@@ -2267,7 +2267,7 @@
           <a:p>
             <a:fld id="{2E13BE49-2C18-44EC-B643-1287673AC118}" type="datetimeFigureOut">
               <a:rPr lang="en-GB" smtClean="0"/>
-              <a:t>20/11/2020</a:t>
+              <a:t>26/11/2020</a:t>
             </a:fld>
             <a:endParaRPr lang="en-GB"/>
           </a:p>
@@ -2409,7 +2409,7 @@
           <a:p>
             <a:fld id="{2E13BE49-2C18-44EC-B643-1287673AC118}" type="datetimeFigureOut">
               <a:rPr lang="en-GB" smtClean="0"/>
-              <a:t>20/11/2020</a:t>
+              <a:t>26/11/2020</a:t>
             </a:fld>
             <a:endParaRPr lang="en-GB"/>
           </a:p>
@@ -2522,7 +2522,7 @@
           <a:p>
             <a:fld id="{2E13BE49-2C18-44EC-B643-1287673AC118}" type="datetimeFigureOut">
               <a:rPr lang="en-GB" smtClean="0"/>
-              <a:t>20/11/2020</a:t>
+              <a:t>26/11/2020</a:t>
             </a:fld>
             <a:endParaRPr lang="en-GB"/>
           </a:p>
@@ -2835,7 +2835,7 @@
           <a:p>
             <a:fld id="{2E13BE49-2C18-44EC-B643-1287673AC118}" type="datetimeFigureOut">
               <a:rPr lang="en-GB" smtClean="0"/>
-              <a:t>20/11/2020</a:t>
+              <a:t>26/11/2020</a:t>
             </a:fld>
             <a:endParaRPr lang="en-GB"/>
           </a:p>
@@ -3124,7 +3124,7 @@
           <a:p>
             <a:fld id="{2E13BE49-2C18-44EC-B643-1287673AC118}" type="datetimeFigureOut">
               <a:rPr lang="en-GB" smtClean="0"/>
-              <a:t>20/11/2020</a:t>
+              <a:t>26/11/2020</a:t>
             </a:fld>
             <a:endParaRPr lang="en-GB"/>
           </a:p>
@@ -3367,7 +3367,7 @@
           <a:p>
             <a:fld id="{2E13BE49-2C18-44EC-B643-1287673AC118}" type="datetimeFigureOut">
               <a:rPr lang="en-GB" smtClean="0"/>
-              <a:t>20/11/2020</a:t>
+              <a:t>26/11/2020</a:t>
             </a:fld>
             <a:endParaRPr lang="en-GB"/>
           </a:p>
@@ -3798,10 +3798,10 @@
         </p:nvGrpSpPr>
         <p:grpSpPr>
           <a:xfrm>
-            <a:off x="123548" y="163556"/>
-            <a:ext cx="11944904" cy="5026090"/>
-            <a:chOff x="123548" y="163556"/>
-            <a:chExt cx="11944904" cy="5026090"/>
+            <a:off x="114215" y="163556"/>
+            <a:ext cx="11954237" cy="4988537"/>
+            <a:chOff x="114215" y="163556"/>
+            <a:chExt cx="11954237" cy="4988537"/>
           </a:xfrm>
         </p:grpSpPr>
         <p:grpSp>
@@ -3818,10 +3818,10 @@
           </p:nvGrpSpPr>
           <p:grpSpPr>
             <a:xfrm>
-              <a:off x="123548" y="163556"/>
-              <a:ext cx="11944904" cy="5026090"/>
-              <a:chOff x="123548" y="-128675"/>
-              <a:chExt cx="11944904" cy="5026090"/>
+              <a:off x="114215" y="163556"/>
+              <a:ext cx="11954237" cy="4988537"/>
+              <a:chOff x="114215" y="-128675"/>
+              <a:chExt cx="11954237" cy="4988537"/>
             </a:xfrm>
           </p:grpSpPr>
           <p:sp>
@@ -4365,7 +4365,7 @@
             </p:nvSpPr>
             <p:spPr>
               <a:xfrm>
-                <a:off x="123548" y="4643499"/>
+                <a:off x="114215" y="4605946"/>
                 <a:ext cx="1836722" cy="253916"/>
               </a:xfrm>
               <a:prstGeom prst="rect">
@@ -4888,7 +4888,7 @@
             </p:nvSpPr>
             <p:spPr>
               <a:xfrm>
-                <a:off x="10753342" y="3094810"/>
+                <a:off x="10710668" y="2967894"/>
                 <a:ext cx="1013314" cy="276999"/>
               </a:xfrm>
               <a:prstGeom prst="rect">
@@ -4934,8 +4934,8 @@
             </p:nvSpPr>
             <p:spPr>
               <a:xfrm>
-                <a:off x="9212690" y="3094810"/>
-                <a:ext cx="1195264" cy="276999"/>
+                <a:off x="9131559" y="2997189"/>
+                <a:ext cx="1820164" cy="461665"/>
               </a:xfrm>
               <a:prstGeom prst="rect">
                 <a:avLst/>
@@ -4949,11 +4949,14 @@
               <a:lstStyle/>
               <a:p>
                 <a:r>
-                  <a:rPr lang="en-GB" sz="1200" u="sng" dirty="0">
+                  <a:rPr lang="en-GB" sz="1200" u="sng" dirty="0" smtClean="0">
                     <a:latin typeface="Abadi" panose="020B0604020104020204" pitchFamily="34" charset="0"/>
                   </a:rPr>
-                  <a:t>Formula class</a:t>
+                  <a:t>Mass &amp; compound class plots</a:t>
                 </a:r>
+                <a:endParaRPr lang="en-GB" sz="1200" u="sng" dirty="0">
+                  <a:latin typeface="Abadi" panose="020B0604020104020204" pitchFamily="34" charset="0"/>
+                </a:endParaRPr>
               </a:p>
             </p:txBody>
           </p:sp>
@@ -5166,7 +5169,7 @@
             <p:spPr>
               <a:xfrm>
                 <a:off x="10703140" y="4373441"/>
-                <a:ext cx="1020842" cy="415498"/>
+                <a:ext cx="1095570" cy="415498"/>
               </a:xfrm>
               <a:prstGeom prst="rect">
                 <a:avLst/>
@@ -5436,6 +5439,144 @@
           </p:txBody>
         </p:sp>
       </p:grpSp>
+      <p:sp>
+        <p:nvSpPr>
+          <p:cNvPr id="45" name="TextBox 44">
+            <a:extLst>
+              <a:ext uri="{FF2B5EF4-FFF2-40B4-BE49-F238E27FC236}">
+                <a16:creationId xmlns:a16="http://schemas.microsoft.com/office/drawing/2014/main" id="{5B2FD2C5-4A9B-445D-BBB3-2E128EC92706}"/>
+              </a:ext>
+            </a:extLst>
+          </p:cNvPr>
+          <p:cNvSpPr txBox="1"/>
+          <p:nvPr/>
+        </p:nvSpPr>
+        <p:spPr>
+          <a:xfrm>
+            <a:off x="9212691" y="4923031"/>
+            <a:ext cx="1412967" cy="253916"/>
+          </a:xfrm>
+          <a:prstGeom prst="rect">
+            <a:avLst/>
+          </a:prstGeom>
+          <a:noFill/>
+        </p:spPr>
+        <p:txBody>
+          <a:bodyPr wrap="square" rtlCol="0">
+            <a:spAutoFit/>
+          </a:bodyPr>
+          <a:lstStyle/>
+          <a:p>
+            <a:r>
+              <a:rPr lang="en-GB" sz="1050" dirty="0" smtClean="0">
+                <a:latin typeface="Abadi" panose="020B0604020104020204" pitchFamily="34" charset="0"/>
+              </a:rPr>
+              <a:t>mass_histogram</a:t>
+            </a:r>
+            <a:r>
+              <a:rPr lang="en-GB" sz="1050" dirty="0" smtClean="0">
+                <a:latin typeface="Abadi" panose="020B0604020104020204" pitchFamily="34" charset="0"/>
+              </a:rPr>
+              <a:t>.py</a:t>
+            </a:r>
+            <a:endParaRPr lang="en-GB" sz="1050" dirty="0">
+              <a:latin typeface="Abadi" panose="020B0604020104020204" pitchFamily="34" charset="0"/>
+            </a:endParaRPr>
+          </a:p>
+        </p:txBody>
+      </p:sp>
+      <p:sp>
+        <p:nvSpPr>
+          <p:cNvPr id="47" name="TextBox 46">
+            <a:extLst>
+              <a:ext uri="{FF2B5EF4-FFF2-40B4-BE49-F238E27FC236}">
+                <a16:creationId xmlns:a16="http://schemas.microsoft.com/office/drawing/2014/main" id="{4B9C0C85-4EF8-4491-B0EE-19C68CE97DD2}"/>
+              </a:ext>
+            </a:extLst>
+          </p:cNvPr>
+          <p:cNvSpPr txBox="1"/>
+          <p:nvPr/>
+        </p:nvSpPr>
+        <p:spPr>
+          <a:xfrm>
+            <a:off x="114215" y="5144673"/>
+            <a:ext cx="1836722" cy="253916"/>
+          </a:xfrm>
+          <a:prstGeom prst="rect">
+            <a:avLst/>
+          </a:prstGeom>
+          <a:noFill/>
+        </p:spPr>
+        <p:txBody>
+          <a:bodyPr wrap="square" rtlCol="0">
+            <a:spAutoFit/>
+          </a:bodyPr>
+          <a:lstStyle/>
+          <a:p>
+            <a:r>
+              <a:rPr lang="en-GB" sz="1050" dirty="0" smtClean="0">
+                <a:latin typeface="Abadi" panose="020B0604020104020204" pitchFamily="34" charset="0"/>
+              </a:rPr>
+              <a:t>read_formularity</a:t>
+            </a:r>
+            <a:r>
+              <a:rPr lang="en-GB" sz="1050" dirty="0" smtClean="0">
+                <a:latin typeface="Abadi" panose="020B0604020104020204" pitchFamily="34" charset="0"/>
+              </a:rPr>
+              <a:t>.py</a:t>
+            </a:r>
+            <a:endParaRPr lang="en-GB" sz="1050" dirty="0">
+              <a:latin typeface="Abadi" panose="020B0604020104020204" pitchFamily="34" charset="0"/>
+            </a:endParaRPr>
+          </a:p>
+        </p:txBody>
+      </p:sp>
+      <p:sp>
+        <p:nvSpPr>
+          <p:cNvPr id="48" name="TextBox 47">
+            <a:extLst>
+              <a:ext uri="{FF2B5EF4-FFF2-40B4-BE49-F238E27FC236}">
+                <a16:creationId xmlns:a16="http://schemas.microsoft.com/office/drawing/2014/main" id="{5B2FD2C5-4A9B-445D-BBB3-2E128EC92706}"/>
+              </a:ext>
+            </a:extLst>
+          </p:cNvPr>
+          <p:cNvSpPr txBox="1"/>
+          <p:nvPr/>
+        </p:nvSpPr>
+        <p:spPr>
+          <a:xfrm>
+            <a:off x="9203358" y="5174849"/>
+            <a:ext cx="1412967" cy="253916"/>
+          </a:xfrm>
+          <a:prstGeom prst="rect">
+            <a:avLst/>
+          </a:prstGeom>
+          <a:noFill/>
+        </p:spPr>
+        <p:txBody>
+          <a:bodyPr wrap="square" rtlCol="0">
+            <a:spAutoFit/>
+          </a:bodyPr>
+          <a:lstStyle/>
+          <a:p>
+            <a:r>
+              <a:rPr lang="en-GB" sz="1050" dirty="0" smtClean="0">
+                <a:latin typeface="Abadi" panose="020B0604020104020204" pitchFamily="34" charset="0"/>
+              </a:rPr>
+              <a:t>mass_spectrum</a:t>
+            </a:r>
+            <a:r>
+              <a:rPr lang="en-GB" sz="1050" dirty="0" smtClean="0">
+                <a:latin typeface="Abadi" panose="020B0604020104020204" pitchFamily="34" charset="0"/>
+              </a:rPr>
+              <a:t>.py</a:t>
+            </a:r>
+            <a:endParaRPr lang="en-GB" sz="1050" dirty="0">
+              <a:latin typeface="Abadi" panose="020B0604020104020204" pitchFamily="34" charset="0"/>
+            </a:endParaRPr>
+          </a:p>
+        </p:txBody>
+      </p:sp>
     </p:spTree>
     <p:extLst>
       <p:ext uri="{BB962C8B-B14F-4D97-AF65-F5344CB8AC3E}">

</xml_diff>

<commit_message>
Added remove_si function, included KEGG database searching in compound_class function
</commit_message>
<xml_diff>
--- a/docs/PyKrev Interface.pptx
+++ b/docs/PyKrev Interface.pptx
@@ -115,6 +115,14 @@
 </p:presentation>
 </file>
 
+<file path=ppt/revisionInfo.xml><?xml version="1.0" encoding="utf-8"?>
+<p1510:revInfo xmlns:a="http://schemas.openxmlformats.org/drawingml/2006/main" xmlns:r="http://schemas.openxmlformats.org/officeDocument/2006/relationships" xmlns:p1510="http://schemas.microsoft.com/office/powerpoint/2015/10/main">
+  <p1510:revLst>
+    <p1510:client id="{0B1BB675-6809-4192-A2BE-E2AE18314836}" v="2" dt="2020-12-17T10:04:18.136"/>
+  </p1510:revLst>
+</p1510:revInfo>
+</file>
+
 <file path=ppt/notesMasters/notesMaster1.xml><?xml version="1.0" encoding="utf-8"?>
 <p:notesMaster xmlns:a="http://schemas.openxmlformats.org/drawingml/2006/main" xmlns:r="http://schemas.openxmlformats.org/officeDocument/2006/relationships" xmlns:p="http://schemas.openxmlformats.org/presentationml/2006/main">
   <p:cSld>
@@ -197,7 +205,7 @@
           <a:p>
             <a:fld id="{9740D62B-E2DD-4F8E-B5D8-976E68D9A4FC}" type="datetimeFigureOut">
               <a:rPr lang="en-GB" smtClean="0"/>
-              <a:t>26/11/2020</a:t>
+              <a:t>17/12/2020</a:t>
             </a:fld>
             <a:endParaRPr lang="en-GB"/>
           </a:p>
@@ -698,7 +706,7 @@
           <a:p>
             <a:fld id="{2E13BE49-2C18-44EC-B643-1287673AC118}" type="datetimeFigureOut">
               <a:rPr lang="en-GB" smtClean="0"/>
-              <a:t>26/11/2020</a:t>
+              <a:t>17/12/2020</a:t>
             </a:fld>
             <a:endParaRPr lang="en-GB"/>
           </a:p>
@@ -898,7 +906,7 @@
           <a:p>
             <a:fld id="{2E13BE49-2C18-44EC-B643-1287673AC118}" type="datetimeFigureOut">
               <a:rPr lang="en-GB" smtClean="0"/>
-              <a:t>26/11/2020</a:t>
+              <a:t>17/12/2020</a:t>
             </a:fld>
             <a:endParaRPr lang="en-GB"/>
           </a:p>
@@ -1108,7 +1116,7 @@
           <a:p>
             <a:fld id="{2E13BE49-2C18-44EC-B643-1287673AC118}" type="datetimeFigureOut">
               <a:rPr lang="en-GB" smtClean="0"/>
-              <a:t>26/11/2020</a:t>
+              <a:t>17/12/2020</a:t>
             </a:fld>
             <a:endParaRPr lang="en-GB"/>
           </a:p>
@@ -1308,7 +1316,7 @@
           <a:p>
             <a:fld id="{2E13BE49-2C18-44EC-B643-1287673AC118}" type="datetimeFigureOut">
               <a:rPr lang="en-GB" smtClean="0"/>
-              <a:t>26/11/2020</a:t>
+              <a:t>17/12/2020</a:t>
             </a:fld>
             <a:endParaRPr lang="en-GB"/>
           </a:p>
@@ -1584,7 +1592,7 @@
           <a:p>
             <a:fld id="{2E13BE49-2C18-44EC-B643-1287673AC118}" type="datetimeFigureOut">
               <a:rPr lang="en-GB" smtClean="0"/>
-              <a:t>26/11/2020</a:t>
+              <a:t>17/12/2020</a:t>
             </a:fld>
             <a:endParaRPr lang="en-GB"/>
           </a:p>
@@ -1852,7 +1860,7 @@
           <a:p>
             <a:fld id="{2E13BE49-2C18-44EC-B643-1287673AC118}" type="datetimeFigureOut">
               <a:rPr lang="en-GB" smtClean="0"/>
-              <a:t>26/11/2020</a:t>
+              <a:t>17/12/2020</a:t>
             </a:fld>
             <a:endParaRPr lang="en-GB"/>
           </a:p>
@@ -2267,7 +2275,7 @@
           <a:p>
             <a:fld id="{2E13BE49-2C18-44EC-B643-1287673AC118}" type="datetimeFigureOut">
               <a:rPr lang="en-GB" smtClean="0"/>
-              <a:t>26/11/2020</a:t>
+              <a:t>17/12/2020</a:t>
             </a:fld>
             <a:endParaRPr lang="en-GB"/>
           </a:p>
@@ -2409,7 +2417,7 @@
           <a:p>
             <a:fld id="{2E13BE49-2C18-44EC-B643-1287673AC118}" type="datetimeFigureOut">
               <a:rPr lang="en-GB" smtClean="0"/>
-              <a:t>26/11/2020</a:t>
+              <a:t>17/12/2020</a:t>
             </a:fld>
             <a:endParaRPr lang="en-GB"/>
           </a:p>
@@ -2522,7 +2530,7 @@
           <a:p>
             <a:fld id="{2E13BE49-2C18-44EC-B643-1287673AC118}" type="datetimeFigureOut">
               <a:rPr lang="en-GB" smtClean="0"/>
-              <a:t>26/11/2020</a:t>
+              <a:t>17/12/2020</a:t>
             </a:fld>
             <a:endParaRPr lang="en-GB"/>
           </a:p>
@@ -2835,7 +2843,7 @@
           <a:p>
             <a:fld id="{2E13BE49-2C18-44EC-B643-1287673AC118}" type="datetimeFigureOut">
               <a:rPr lang="en-GB" smtClean="0"/>
-              <a:t>26/11/2020</a:t>
+              <a:t>17/12/2020</a:t>
             </a:fld>
             <a:endParaRPr lang="en-GB"/>
           </a:p>
@@ -3124,7 +3132,7 @@
           <a:p>
             <a:fld id="{2E13BE49-2C18-44EC-B643-1287673AC118}" type="datetimeFigureOut">
               <a:rPr lang="en-GB" smtClean="0"/>
-              <a:t>26/11/2020</a:t>
+              <a:t>17/12/2020</a:t>
             </a:fld>
             <a:endParaRPr lang="en-GB"/>
           </a:p>
@@ -3367,7 +3375,7 @@
           <a:p>
             <a:fld id="{2E13BE49-2C18-44EC-B643-1287673AC118}" type="datetimeFigureOut">
               <a:rPr lang="en-GB" smtClean="0"/>
-              <a:t>26/11/2020</a:t>
+              <a:t>17/12/2020</a:t>
             </a:fld>
             <a:endParaRPr lang="en-GB"/>
           </a:p>
@@ -3786,10 +3794,10 @@
       </p:grpSpPr>
       <p:grpSp>
         <p:nvGrpSpPr>
-          <p:cNvPr id="3" name="Group 2">
-            <a:extLst>
-              <a:ext uri="{FF2B5EF4-FFF2-40B4-BE49-F238E27FC236}">
-                <a16:creationId xmlns:a16="http://schemas.microsoft.com/office/drawing/2014/main" id="{754F9C7F-C732-4756-8448-5429E7F39F94}"/>
+          <p:cNvPr id="4" name="Group 3">
+            <a:extLst>
+              <a:ext uri="{FF2B5EF4-FFF2-40B4-BE49-F238E27FC236}">
+                <a16:creationId xmlns:a16="http://schemas.microsoft.com/office/drawing/2014/main" id="{3EFA36F4-9934-441F-866C-88E813CDC7DC}"/>
               </a:ext>
             </a:extLst>
           </p:cNvPr>
@@ -3799,17 +3807,17 @@
         <p:grpSpPr>
           <a:xfrm>
             <a:off x="114215" y="163556"/>
-            <a:ext cx="11954237" cy="4988537"/>
+            <a:ext cx="11954237" cy="5265209"/>
             <a:chOff x="114215" y="163556"/>
-            <a:chExt cx="11954237" cy="4988537"/>
+            <a:chExt cx="11954237" cy="5265209"/>
           </a:xfrm>
         </p:grpSpPr>
         <p:grpSp>
           <p:nvGrpSpPr>
-            <p:cNvPr id="2" name="Group 1">
+            <p:cNvPr id="3" name="Group 2">
               <a:extLst>
                 <a:ext uri="{FF2B5EF4-FFF2-40B4-BE49-F238E27FC236}">
-                  <a16:creationId xmlns:a16="http://schemas.microsoft.com/office/drawing/2014/main" id="{56E3B14B-4D8B-41A0-B7F8-2715EDB9F66A}"/>
+                  <a16:creationId xmlns:a16="http://schemas.microsoft.com/office/drawing/2014/main" id="{754F9C7F-C732-4756-8448-5429E7F39F94}"/>
                 </a:ext>
               </a:extLst>
             </p:cNvPr>
@@ -3820,161 +3828,1573 @@
             <a:xfrm>
               <a:off x="114215" y="163556"/>
               <a:ext cx="11954237" cy="4988537"/>
-              <a:chOff x="114215" y="-128675"/>
+              <a:chOff x="114215" y="163556"/>
               <a:chExt cx="11954237" cy="4988537"/>
             </a:xfrm>
           </p:grpSpPr>
-          <p:sp>
-            <p:nvSpPr>
-              <p:cNvPr id="38" name="Left Brace 37">
+          <p:grpSp>
+            <p:nvGrpSpPr>
+              <p:cNvPr id="2" name="Group 1">
                 <a:extLst>
                   <a:ext uri="{FF2B5EF4-FFF2-40B4-BE49-F238E27FC236}">
-                    <a16:creationId xmlns:a16="http://schemas.microsoft.com/office/drawing/2014/main" id="{17B59A6E-315B-4B3B-A099-80D84DBFD058}"/>
+                    <a16:creationId xmlns:a16="http://schemas.microsoft.com/office/drawing/2014/main" id="{56E3B14B-4D8B-41A0-B7F8-2715EDB9F66A}"/>
                   </a:ext>
                 </a:extLst>
               </p:cNvPr>
-              <p:cNvSpPr/>
+              <p:cNvGrpSpPr/>
               <p:nvPr/>
-            </p:nvSpPr>
-            <p:spPr>
-              <a:xfrm rot="5400000">
-                <a:off x="1989151" y="856898"/>
-                <a:ext cx="785054" cy="4359150"/>
+            </p:nvGrpSpPr>
+            <p:grpSpPr>
+              <a:xfrm>
+                <a:off x="114215" y="163556"/>
+                <a:ext cx="11954237" cy="4988537"/>
+                <a:chOff x="114215" y="-128675"/>
+                <a:chExt cx="11954237" cy="4988537"/>
               </a:xfrm>
-              <a:prstGeom prst="leftBrace">
-                <a:avLst/>
-              </a:prstGeom>
-              <a:solidFill>
-                <a:schemeClr val="accent2">
-                  <a:lumMod val="20000"/>
-                  <a:lumOff val="80000"/>
-                </a:schemeClr>
-              </a:solidFill>
-              <a:ln>
+            </p:grpSpPr>
+            <p:sp>
+              <p:nvSpPr>
+                <p:cNvPr id="38" name="Left Brace 37">
+                  <a:extLst>
+                    <a:ext uri="{FF2B5EF4-FFF2-40B4-BE49-F238E27FC236}">
+                      <a16:creationId xmlns:a16="http://schemas.microsoft.com/office/drawing/2014/main" id="{17B59A6E-315B-4B3B-A099-80D84DBFD058}"/>
+                    </a:ext>
+                  </a:extLst>
+                </p:cNvPr>
+                <p:cNvSpPr/>
+                <p:nvPr/>
+              </p:nvSpPr>
+              <p:spPr>
+                <a:xfrm rot="5400000">
+                  <a:off x="1989151" y="856898"/>
+                  <a:ext cx="785054" cy="4359150"/>
+                </a:xfrm>
+                <a:prstGeom prst="leftBrace">
+                  <a:avLst/>
+                </a:prstGeom>
                 <a:solidFill>
                   <a:schemeClr val="accent2">
                     <a:lumMod val="20000"/>
                     <a:lumOff val="80000"/>
                   </a:schemeClr>
                 </a:solidFill>
-              </a:ln>
-            </p:spPr>
-            <p:style>
-              <a:lnRef idx="1">
-                <a:schemeClr val="accent1"/>
-              </a:lnRef>
-              <a:fillRef idx="0">
-                <a:schemeClr val="accent1"/>
-              </a:fillRef>
-              <a:effectRef idx="0">
-                <a:schemeClr val="accent1"/>
-              </a:effectRef>
-              <a:fontRef idx="minor">
-                <a:schemeClr val="tx1"/>
-              </a:fontRef>
-            </p:style>
-            <p:txBody>
-              <a:bodyPr rtlCol="0" anchor="ctr"/>
-              <a:lstStyle/>
-              <a:p>
-                <a:pPr algn="ctr"/>
-                <a:endParaRPr lang="en-GB"/>
-              </a:p>
-            </p:txBody>
-          </p:sp>
+                <a:ln>
+                  <a:solidFill>
+                    <a:schemeClr val="accent2">
+                      <a:lumMod val="20000"/>
+                      <a:lumOff val="80000"/>
+                    </a:schemeClr>
+                  </a:solidFill>
+                </a:ln>
+              </p:spPr>
+              <p:style>
+                <a:lnRef idx="1">
+                  <a:schemeClr val="accent1"/>
+                </a:lnRef>
+                <a:fillRef idx="0">
+                  <a:schemeClr val="accent1"/>
+                </a:fillRef>
+                <a:effectRef idx="0">
+                  <a:schemeClr val="accent1"/>
+                </a:effectRef>
+                <a:fontRef idx="minor">
+                  <a:schemeClr val="tx1"/>
+                </a:fontRef>
+              </p:style>
+              <p:txBody>
+                <a:bodyPr rtlCol="0" anchor="ctr"/>
+                <a:lstStyle/>
+                <a:p>
+                  <a:pPr algn="ctr"/>
+                  <a:endParaRPr lang="en-GB"/>
+                </a:p>
+              </p:txBody>
+            </p:sp>
+            <p:sp>
+              <p:nvSpPr>
+                <p:cNvPr id="15" name="Right Brace 14">
+                  <a:extLst>
+                    <a:ext uri="{FF2B5EF4-FFF2-40B4-BE49-F238E27FC236}">
+                      <a16:creationId xmlns:a16="http://schemas.microsoft.com/office/drawing/2014/main" id="{53DFC4B4-62FF-4762-B70C-3815C1AEAD9E}"/>
+                    </a:ext>
+                  </a:extLst>
+                </p:cNvPr>
+                <p:cNvSpPr/>
+                <p:nvPr/>
+              </p:nvSpPr>
+              <p:spPr>
+                <a:xfrm rot="16200000">
+                  <a:off x="5510373" y="-3078550"/>
+                  <a:ext cx="1318941" cy="9982985"/>
+                </a:xfrm>
+                <a:prstGeom prst="rightBrace">
+                  <a:avLst/>
+                </a:prstGeom>
+                <a:solidFill>
+                  <a:schemeClr val="accent1">
+                    <a:lumMod val="40000"/>
+                    <a:lumOff val="60000"/>
+                  </a:schemeClr>
+                </a:solidFill>
+                <a:ln w="9525"/>
+              </p:spPr>
+              <p:style>
+                <a:lnRef idx="1">
+                  <a:schemeClr val="accent1"/>
+                </a:lnRef>
+                <a:fillRef idx="0">
+                  <a:schemeClr val="accent1"/>
+                </a:fillRef>
+                <a:effectRef idx="0">
+                  <a:schemeClr val="accent1"/>
+                </a:effectRef>
+                <a:fontRef idx="minor">
+                  <a:schemeClr val="tx1"/>
+                </a:fontRef>
+              </p:style>
+              <p:txBody>
+                <a:bodyPr rtlCol="0" anchor="ctr"/>
+                <a:lstStyle/>
+                <a:p>
+                  <a:pPr algn="ctr"/>
+                  <a:endParaRPr lang="en-GB"/>
+                </a:p>
+              </p:txBody>
+            </p:sp>
+            <p:pic>
+              <p:nvPicPr>
+                <p:cNvPr id="5" name="Picture 4">
+                  <a:extLst>
+                    <a:ext uri="{FF2B5EF4-FFF2-40B4-BE49-F238E27FC236}">
+                      <a16:creationId xmlns:a16="http://schemas.microsoft.com/office/drawing/2014/main" id="{B5F909E9-3930-4E12-8CF3-7E8E3B5D29EA}"/>
+                    </a:ext>
+                  </a:extLst>
+                </p:cNvPr>
+                <p:cNvPicPr>
+                  <a:picLocks noChangeAspect="1"/>
+                </p:cNvPicPr>
+                <p:nvPr/>
+              </p:nvPicPr>
+              <p:blipFill>
+                <a:blip r:embed="rId3">
+                  <a:extLst>
+                    <a:ext uri="{28A0092B-C50C-407E-A947-70E740481C1C}">
+                      <a14:useLocalDpi xmlns:a14="http://schemas.microsoft.com/office/drawing/2010/main" val="0"/>
+                    </a:ext>
+                  </a:extLst>
+                </a:blip>
+                <a:stretch>
+                  <a:fillRect/>
+                </a:stretch>
+              </p:blipFill>
+              <p:spPr>
+                <a:xfrm>
+                  <a:off x="4069642" y="-128675"/>
+                  <a:ext cx="4195615" cy="1679052"/>
+                </a:xfrm>
+                <a:prstGeom prst="rect">
+                  <a:avLst/>
+                </a:prstGeom>
+              </p:spPr>
+            </p:pic>
+            <p:sp>
+              <p:nvSpPr>
+                <p:cNvPr id="6" name="TextBox 5">
+                  <a:extLst>
+                    <a:ext uri="{FF2B5EF4-FFF2-40B4-BE49-F238E27FC236}">
+                      <a16:creationId xmlns:a16="http://schemas.microsoft.com/office/drawing/2014/main" id="{4A3529D3-1F6C-470A-AEF0-E90ADF35C881}"/>
+                    </a:ext>
+                  </a:extLst>
+                </p:cNvPr>
+                <p:cNvSpPr txBox="1"/>
+                <p:nvPr/>
+              </p:nvSpPr>
+              <p:spPr>
+                <a:xfrm>
+                  <a:off x="1566342" y="2103224"/>
+                  <a:ext cx="1781665" cy="369332"/>
+                </a:xfrm>
+                <a:prstGeom prst="rect">
+                  <a:avLst/>
+                </a:prstGeom>
+                <a:noFill/>
+              </p:spPr>
+              <p:txBody>
+                <a:bodyPr wrap="square" rtlCol="0">
+                  <a:spAutoFit/>
+                </a:bodyPr>
+                <a:lstStyle/>
+                <a:p>
+                  <a:r>
+                    <a:rPr lang="en-GB" u="sng" dirty="0">
+                      <a:latin typeface="Abadi" panose="020B0604020104020204" pitchFamily="34" charset="0"/>
+                    </a:rPr>
+                    <a:t>.</a:t>
+                  </a:r>
+                  <a:r>
+                    <a:rPr lang="en-GB" u="sng" dirty="0" err="1">
+                      <a:latin typeface="Abadi" panose="020B0604020104020204" pitchFamily="34" charset="0"/>
+                    </a:rPr>
+                    <a:t>pykrev</a:t>
+                  </a:r>
+                  <a:r>
+                    <a:rPr lang="en-GB" u="sng" dirty="0">
+                      <a:latin typeface="Abadi" panose="020B0604020104020204" pitchFamily="34" charset="0"/>
+                    </a:rPr>
+                    <a:t>/formula </a:t>
+                  </a:r>
+                </a:p>
+              </p:txBody>
+            </p:sp>
+            <p:sp>
+              <p:nvSpPr>
+                <p:cNvPr id="17" name="TextBox 16">
+                  <a:extLst>
+                    <a:ext uri="{FF2B5EF4-FFF2-40B4-BE49-F238E27FC236}">
+                      <a16:creationId xmlns:a16="http://schemas.microsoft.com/office/drawing/2014/main" id="{D8A5E8C1-4283-4F9F-BBEF-77DCA9A88110}"/>
+                    </a:ext>
+                  </a:extLst>
+                </p:cNvPr>
+                <p:cNvSpPr txBox="1"/>
+                <p:nvPr/>
+              </p:nvSpPr>
+              <p:spPr>
+                <a:xfrm>
+                  <a:off x="123548" y="3484638"/>
+                  <a:ext cx="1582702" cy="261610"/>
+                </a:xfrm>
+                <a:prstGeom prst="rect">
+                  <a:avLst/>
+                </a:prstGeom>
+                <a:noFill/>
+              </p:spPr>
+              <p:txBody>
+                <a:bodyPr wrap="square" rtlCol="0">
+                  <a:spAutoFit/>
+                </a:bodyPr>
+                <a:lstStyle/>
+                <a:p>
+                  <a:r>
+                    <a:rPr lang="en-GB" sz="1050" dirty="0">
+                      <a:latin typeface="Abadi" panose="020B0604020104020204" pitchFamily="34" charset="0"/>
+                    </a:rPr>
+                    <a:t>element_counts.py</a:t>
+                  </a:r>
+                </a:p>
+              </p:txBody>
+            </p:sp>
+            <p:sp>
+              <p:nvSpPr>
+                <p:cNvPr id="19" name="TextBox 18">
+                  <a:extLst>
+                    <a:ext uri="{FF2B5EF4-FFF2-40B4-BE49-F238E27FC236}">
+                      <a16:creationId xmlns:a16="http://schemas.microsoft.com/office/drawing/2014/main" id="{6849FE89-FE1A-4725-9119-1BF82E005FBD}"/>
+                    </a:ext>
+                  </a:extLst>
+                </p:cNvPr>
+                <p:cNvSpPr txBox="1"/>
+                <p:nvPr/>
+              </p:nvSpPr>
+              <p:spPr>
+                <a:xfrm>
+                  <a:off x="1793982" y="3503579"/>
+                  <a:ext cx="1582702" cy="261610"/>
+                </a:xfrm>
+                <a:prstGeom prst="rect">
+                  <a:avLst/>
+                </a:prstGeom>
+                <a:noFill/>
+              </p:spPr>
+              <p:txBody>
+                <a:bodyPr wrap="square" rtlCol="0">
+                  <a:spAutoFit/>
+                </a:bodyPr>
+                <a:lstStyle/>
+                <a:p>
+                  <a:r>
+                    <a:rPr lang="en-GB" sz="1050" dirty="0">
+                      <a:latin typeface="Abadi" panose="020B0604020104020204" pitchFamily="34" charset="0"/>
+                    </a:rPr>
+                    <a:t>calculate_mass.py</a:t>
+                  </a:r>
+                </a:p>
+              </p:txBody>
+            </p:sp>
+            <p:sp>
+              <p:nvSpPr>
+                <p:cNvPr id="21" name="TextBox 20">
+                  <a:extLst>
+                    <a:ext uri="{FF2B5EF4-FFF2-40B4-BE49-F238E27FC236}">
+                      <a16:creationId xmlns:a16="http://schemas.microsoft.com/office/drawing/2014/main" id="{F9F23654-1617-4BC2-82D6-1DAF0244D0E8}"/>
+                    </a:ext>
+                  </a:extLst>
+                </p:cNvPr>
+                <p:cNvSpPr txBox="1"/>
+                <p:nvPr/>
+              </p:nvSpPr>
+              <p:spPr>
+                <a:xfrm>
+                  <a:off x="1854524" y="3752839"/>
+                  <a:ext cx="1113279" cy="415497"/>
+                </a:xfrm>
+                <a:prstGeom prst="rect">
+                  <a:avLst/>
+                </a:prstGeom>
+                <a:noFill/>
+              </p:spPr>
+              <p:txBody>
+                <a:bodyPr wrap="square" rtlCol="0">
+                  <a:spAutoFit/>
+                </a:bodyPr>
+                <a:lstStyle/>
+                <a:p>
+                  <a:r>
+                    <a:rPr lang="en-GB" sz="1050" dirty="0">
+                      <a:latin typeface="Abadi" panose="020B0604020104020204" pitchFamily="34" charset="0"/>
+                    </a:rPr>
+                    <a:t>kendrick_mass_defect.py</a:t>
+                  </a:r>
+                </a:p>
+              </p:txBody>
+            </p:sp>
+            <p:sp>
+              <p:nvSpPr>
+                <p:cNvPr id="23" name="TextBox 22">
+                  <a:extLst>
+                    <a:ext uri="{FF2B5EF4-FFF2-40B4-BE49-F238E27FC236}">
+                      <a16:creationId xmlns:a16="http://schemas.microsoft.com/office/drawing/2014/main" id="{5720F916-A2E5-4FF6-97CA-1AA032FE75A5}"/>
+                    </a:ext>
+                  </a:extLst>
+                </p:cNvPr>
+                <p:cNvSpPr txBox="1"/>
+                <p:nvPr/>
+              </p:nvSpPr>
+              <p:spPr>
+                <a:xfrm>
+                  <a:off x="3464417" y="3204674"/>
+                  <a:ext cx="1582702" cy="276999"/>
+                </a:xfrm>
+                <a:prstGeom prst="rect">
+                  <a:avLst/>
+                </a:prstGeom>
+                <a:noFill/>
+              </p:spPr>
+              <p:txBody>
+                <a:bodyPr wrap="square" rtlCol="0">
+                  <a:spAutoFit/>
+                </a:bodyPr>
+                <a:lstStyle/>
+                <a:p>
+                  <a:r>
+                    <a:rPr lang="en-GB" sz="1200" u="sng" dirty="0">
+                      <a:latin typeface="Abadi" panose="020B0604020104020204" pitchFamily="34" charset="0"/>
+                    </a:rPr>
+                    <a:t>Set analysis</a:t>
+                  </a:r>
+                </a:p>
+              </p:txBody>
+            </p:sp>
+            <p:sp>
+              <p:nvSpPr>
+                <p:cNvPr id="25" name="TextBox 24">
+                  <a:extLst>
+                    <a:ext uri="{FF2B5EF4-FFF2-40B4-BE49-F238E27FC236}">
+                      <a16:creationId xmlns:a16="http://schemas.microsoft.com/office/drawing/2014/main" id="{91C46627-0931-4840-B034-4F9566B3D21C}"/>
+                    </a:ext>
+                  </a:extLst>
+                </p:cNvPr>
+                <p:cNvSpPr txBox="1"/>
+                <p:nvPr/>
+              </p:nvSpPr>
+              <p:spPr>
+                <a:xfrm>
+                  <a:off x="3279273" y="3499287"/>
+                  <a:ext cx="1836722" cy="261610"/>
+                </a:xfrm>
+                <a:prstGeom prst="rect">
+                  <a:avLst/>
+                </a:prstGeom>
+                <a:noFill/>
+              </p:spPr>
+              <p:txBody>
+                <a:bodyPr wrap="square" rtlCol="0">
+                  <a:spAutoFit/>
+                </a:bodyPr>
+                <a:lstStyle/>
+                <a:p>
+                  <a:r>
+                    <a:rPr lang="en-GB" sz="1050" dirty="0">
+                      <a:latin typeface="Abadi" panose="020B0604020104020204" pitchFamily="34" charset="0"/>
+                    </a:rPr>
+                    <a:t>find_intersections.py</a:t>
+                  </a:r>
+                </a:p>
+              </p:txBody>
+            </p:sp>
+            <p:sp>
+              <p:nvSpPr>
+                <p:cNvPr id="27" name="TextBox 26">
+                  <a:extLst>
+                    <a:ext uri="{FF2B5EF4-FFF2-40B4-BE49-F238E27FC236}">
+                      <a16:creationId xmlns:a16="http://schemas.microsoft.com/office/drawing/2014/main" id="{D76C5206-36B7-4F79-B701-E9935EDA533E}"/>
+                    </a:ext>
+                  </a:extLst>
+                </p:cNvPr>
+                <p:cNvSpPr txBox="1"/>
+                <p:nvPr/>
+              </p:nvSpPr>
+              <p:spPr>
+                <a:xfrm>
+                  <a:off x="3279273" y="3735848"/>
+                  <a:ext cx="1836722" cy="261610"/>
+                </a:xfrm>
+                <a:prstGeom prst="rect">
+                  <a:avLst/>
+                </a:prstGeom>
+                <a:noFill/>
+              </p:spPr>
+              <p:txBody>
+                <a:bodyPr wrap="square" rtlCol="0">
+                  <a:spAutoFit/>
+                </a:bodyPr>
+                <a:lstStyle/>
+                <a:p>
+                  <a:r>
+                    <a:rPr lang="en-GB" sz="1050" dirty="0">
+                      <a:latin typeface="Abadi" panose="020B0604020104020204" pitchFamily="34" charset="0"/>
+                    </a:rPr>
+                    <a:t>unique_groups.py</a:t>
+                  </a:r>
+                </a:p>
+              </p:txBody>
+            </p:sp>
+            <p:sp>
+              <p:nvSpPr>
+                <p:cNvPr id="29" name="TextBox 28">
+                  <a:extLst>
+                    <a:ext uri="{FF2B5EF4-FFF2-40B4-BE49-F238E27FC236}">
+                      <a16:creationId xmlns:a16="http://schemas.microsoft.com/office/drawing/2014/main" id="{7C2C892A-12CE-4B2D-825D-3D8318E7BE40}"/>
+                    </a:ext>
+                  </a:extLst>
+                </p:cNvPr>
+                <p:cNvSpPr txBox="1"/>
+                <p:nvPr/>
+              </p:nvSpPr>
+              <p:spPr>
+                <a:xfrm>
+                  <a:off x="3279273" y="3993611"/>
+                  <a:ext cx="1836722" cy="261610"/>
+                </a:xfrm>
+                <a:prstGeom prst="rect">
+                  <a:avLst/>
+                </a:prstGeom>
+                <a:noFill/>
+              </p:spPr>
+              <p:txBody>
+                <a:bodyPr wrap="square" rtlCol="0">
+                  <a:spAutoFit/>
+                </a:bodyPr>
+                <a:lstStyle/>
+                <a:p>
+                  <a:r>
+                    <a:rPr lang="en-GB" sz="1050" dirty="0">
+                      <a:latin typeface="Abadi" panose="020B0604020104020204" pitchFamily="34" charset="0"/>
+                    </a:rPr>
+                    <a:t>missing_groups.py</a:t>
+                  </a:r>
+                </a:p>
+              </p:txBody>
+            </p:sp>
+            <p:sp>
+              <p:nvSpPr>
+                <p:cNvPr id="31" name="TextBox 30">
+                  <a:extLst>
+                    <a:ext uri="{FF2B5EF4-FFF2-40B4-BE49-F238E27FC236}">
+                      <a16:creationId xmlns:a16="http://schemas.microsoft.com/office/drawing/2014/main" id="{1B90A93C-152D-4680-88A8-0F233EDD5513}"/>
+                    </a:ext>
+                  </a:extLst>
+                </p:cNvPr>
+                <p:cNvSpPr txBox="1"/>
+                <p:nvPr/>
+              </p:nvSpPr>
+              <p:spPr>
+                <a:xfrm>
+                  <a:off x="123548" y="4019059"/>
+                  <a:ext cx="1034059" cy="415497"/>
+                </a:xfrm>
+                <a:prstGeom prst="rect">
+                  <a:avLst/>
+                </a:prstGeom>
+                <a:noFill/>
+              </p:spPr>
+              <p:txBody>
+                <a:bodyPr wrap="square" rtlCol="0">
+                  <a:spAutoFit/>
+                </a:bodyPr>
+                <a:lstStyle/>
+                <a:p>
+                  <a:r>
+                    <a:rPr lang="en-GB" sz="1050" dirty="0">
+                      <a:latin typeface="Abadi" panose="020B0604020104020204" pitchFamily="34" charset="0"/>
+                    </a:rPr>
+                    <a:t>double_bond_equivalent.py</a:t>
+                  </a:r>
+                </a:p>
+              </p:txBody>
+            </p:sp>
+            <p:sp>
+              <p:nvSpPr>
+                <p:cNvPr id="33" name="TextBox 32">
+                  <a:extLst>
+                    <a:ext uri="{FF2B5EF4-FFF2-40B4-BE49-F238E27FC236}">
+                      <a16:creationId xmlns:a16="http://schemas.microsoft.com/office/drawing/2014/main" id="{B36588A5-FF59-4957-875F-EBA2ECBCBD65}"/>
+                    </a:ext>
+                  </a:extLst>
+                </p:cNvPr>
+                <p:cNvSpPr txBox="1"/>
+                <p:nvPr/>
+              </p:nvSpPr>
+              <p:spPr>
+                <a:xfrm>
+                  <a:off x="123548" y="4389583"/>
+                  <a:ext cx="1836722" cy="253916"/>
+                </a:xfrm>
+                <a:prstGeom prst="rect">
+                  <a:avLst/>
+                </a:prstGeom>
+                <a:noFill/>
+              </p:spPr>
+              <p:txBody>
+                <a:bodyPr wrap="square" rtlCol="0">
+                  <a:spAutoFit/>
+                </a:bodyPr>
+                <a:lstStyle/>
+                <a:p>
+                  <a:r>
+                    <a:rPr lang="en-GB" sz="1050" dirty="0">
+                      <a:latin typeface="Abadi" panose="020B0604020104020204" pitchFamily="34" charset="0"/>
+                    </a:rPr>
+                    <a:t>aromaticity_index.py</a:t>
+                  </a:r>
+                </a:p>
+              </p:txBody>
+            </p:sp>
+            <p:sp>
+              <p:nvSpPr>
+                <p:cNvPr id="35" name="TextBox 34">
+                  <a:extLst>
+                    <a:ext uri="{FF2B5EF4-FFF2-40B4-BE49-F238E27FC236}">
+                      <a16:creationId xmlns:a16="http://schemas.microsoft.com/office/drawing/2014/main" id="{4B9C0C85-4EF8-4491-B0EE-19C68CE97DD2}"/>
+                    </a:ext>
+                  </a:extLst>
+                </p:cNvPr>
+                <p:cNvSpPr txBox="1"/>
+                <p:nvPr/>
+              </p:nvSpPr>
+              <p:spPr>
+                <a:xfrm>
+                  <a:off x="114215" y="4605946"/>
+                  <a:ext cx="1836722" cy="253916"/>
+                </a:xfrm>
+                <a:prstGeom prst="rect">
+                  <a:avLst/>
+                </a:prstGeom>
+                <a:noFill/>
+              </p:spPr>
+              <p:txBody>
+                <a:bodyPr wrap="square" rtlCol="0">
+                  <a:spAutoFit/>
+                </a:bodyPr>
+                <a:lstStyle/>
+                <a:p>
+                  <a:r>
+                    <a:rPr lang="en-GB" sz="1050" dirty="0">
+                      <a:latin typeface="Abadi" panose="020B0604020104020204" pitchFamily="34" charset="0"/>
+                    </a:rPr>
+                    <a:t>nominal_oxidation_state.py</a:t>
+                  </a:r>
+                </a:p>
+              </p:txBody>
+            </p:sp>
+            <p:sp>
+              <p:nvSpPr>
+                <p:cNvPr id="37" name="TextBox 36">
+                  <a:extLst>
+                    <a:ext uri="{FF2B5EF4-FFF2-40B4-BE49-F238E27FC236}">
+                      <a16:creationId xmlns:a16="http://schemas.microsoft.com/office/drawing/2014/main" id="{87235915-F6CF-4215-8602-DC452CCFD485}"/>
+                    </a:ext>
+                  </a:extLst>
+                </p:cNvPr>
+                <p:cNvSpPr txBox="1"/>
+                <p:nvPr/>
+              </p:nvSpPr>
+              <p:spPr>
+                <a:xfrm>
+                  <a:off x="123548" y="3763898"/>
+                  <a:ext cx="1836722" cy="261610"/>
+                </a:xfrm>
+                <a:prstGeom prst="rect">
+                  <a:avLst/>
+                </a:prstGeom>
+                <a:noFill/>
+              </p:spPr>
+              <p:txBody>
+                <a:bodyPr wrap="square" rtlCol="0">
+                  <a:spAutoFit/>
+                </a:bodyPr>
+                <a:lstStyle/>
+                <a:p>
+                  <a:r>
+                    <a:rPr lang="en-GB" sz="1050" dirty="0">
+                      <a:latin typeface="Abadi" panose="020B0604020104020204" pitchFamily="34" charset="0"/>
+                    </a:rPr>
+                    <a:t>element_ratios.py</a:t>
+                  </a:r>
+                </a:p>
+              </p:txBody>
+            </p:sp>
+            <p:sp>
+              <p:nvSpPr>
+                <p:cNvPr id="40" name="TextBox 39">
+                  <a:extLst>
+                    <a:ext uri="{FF2B5EF4-FFF2-40B4-BE49-F238E27FC236}">
+                      <a16:creationId xmlns:a16="http://schemas.microsoft.com/office/drawing/2014/main" id="{62FFD0EF-8A37-4D98-A5F9-849FF2AD321E}"/>
+                    </a:ext>
+                  </a:extLst>
+                </p:cNvPr>
+                <p:cNvSpPr txBox="1"/>
+                <p:nvPr/>
+              </p:nvSpPr>
+              <p:spPr>
+                <a:xfrm>
+                  <a:off x="1863704" y="3207462"/>
+                  <a:ext cx="1582702" cy="276999"/>
+                </a:xfrm>
+                <a:prstGeom prst="rect">
+                  <a:avLst/>
+                </a:prstGeom>
+                <a:noFill/>
+              </p:spPr>
+              <p:txBody>
+                <a:bodyPr wrap="square" rtlCol="0">
+                  <a:spAutoFit/>
+                </a:bodyPr>
+                <a:lstStyle/>
+                <a:p>
+                  <a:r>
+                    <a:rPr lang="en-GB" sz="1200" u="sng" dirty="0">
+                      <a:latin typeface="Abadi" panose="020B0604020104020204" pitchFamily="34" charset="0"/>
+                    </a:rPr>
+                    <a:t>Mass analysis</a:t>
+                  </a:r>
+                </a:p>
+              </p:txBody>
+            </p:sp>
+            <p:sp>
+              <p:nvSpPr>
+                <p:cNvPr id="42" name="TextBox 41">
+                  <a:extLst>
+                    <a:ext uri="{FF2B5EF4-FFF2-40B4-BE49-F238E27FC236}">
+                      <a16:creationId xmlns:a16="http://schemas.microsoft.com/office/drawing/2014/main" id="{246B4A45-DEF9-44C8-8671-380A03F6A3F0}"/>
+                    </a:ext>
+                  </a:extLst>
+                </p:cNvPr>
+                <p:cNvSpPr txBox="1"/>
+                <p:nvPr/>
+              </p:nvSpPr>
+              <p:spPr>
+                <a:xfrm>
+                  <a:off x="293822" y="3022796"/>
+                  <a:ext cx="1582702" cy="461665"/>
+                </a:xfrm>
+                <a:prstGeom prst="rect">
+                  <a:avLst/>
+                </a:prstGeom>
+                <a:noFill/>
+              </p:spPr>
+              <p:txBody>
+                <a:bodyPr wrap="square" rtlCol="0">
+                  <a:spAutoFit/>
+                </a:bodyPr>
+                <a:lstStyle/>
+                <a:p>
+                  <a:r>
+                    <a:rPr lang="en-GB" sz="1200" u="sng" dirty="0">
+                      <a:latin typeface="Abadi" panose="020B0604020104020204" pitchFamily="34" charset="0"/>
+                    </a:rPr>
+                    <a:t>Stoichiometric analysis</a:t>
+                  </a:r>
+                </a:p>
+              </p:txBody>
+            </p:sp>
+            <p:sp>
+              <p:nvSpPr>
+                <p:cNvPr id="44" name="Left Brace 43">
+                  <a:extLst>
+                    <a:ext uri="{FF2B5EF4-FFF2-40B4-BE49-F238E27FC236}">
+                      <a16:creationId xmlns:a16="http://schemas.microsoft.com/office/drawing/2014/main" id="{B13BC78F-A9EA-4C6B-AC51-4DA8DD768EF3}"/>
+                    </a:ext>
+                  </a:extLst>
+                </p:cNvPr>
+                <p:cNvSpPr/>
+                <p:nvPr/>
+              </p:nvSpPr>
+              <p:spPr>
+                <a:xfrm rot="5400000">
+                  <a:off x="5703472" y="1693154"/>
+                  <a:ext cx="785054" cy="2686639"/>
+                </a:xfrm>
+                <a:prstGeom prst="leftBrace">
+                  <a:avLst/>
+                </a:prstGeom>
+                <a:solidFill>
+                  <a:schemeClr val="accent6">
+                    <a:lumMod val="20000"/>
+                    <a:lumOff val="80000"/>
+                  </a:schemeClr>
+                </a:solidFill>
+                <a:ln>
+                  <a:solidFill>
+                    <a:schemeClr val="accent6">
+                      <a:lumMod val="20000"/>
+                      <a:lumOff val="80000"/>
+                    </a:schemeClr>
+                  </a:solidFill>
+                </a:ln>
+              </p:spPr>
+              <p:style>
+                <a:lnRef idx="1">
+                  <a:schemeClr val="accent1"/>
+                </a:lnRef>
+                <a:fillRef idx="0">
+                  <a:schemeClr val="accent1"/>
+                </a:fillRef>
+                <a:effectRef idx="0">
+                  <a:schemeClr val="accent1"/>
+                </a:effectRef>
+                <a:fontRef idx="minor">
+                  <a:schemeClr val="tx1"/>
+                </a:fontRef>
+              </p:style>
+              <p:txBody>
+                <a:bodyPr rtlCol="0" anchor="ctr"/>
+                <a:lstStyle/>
+                <a:p>
+                  <a:pPr algn="ctr"/>
+                  <a:endParaRPr lang="en-GB"/>
+                </a:p>
+              </p:txBody>
+            </p:sp>
+            <p:sp>
+              <p:nvSpPr>
+                <p:cNvPr id="46" name="Left Brace 45">
+                  <a:extLst>
+                    <a:ext uri="{FF2B5EF4-FFF2-40B4-BE49-F238E27FC236}">
+                      <a16:creationId xmlns:a16="http://schemas.microsoft.com/office/drawing/2014/main" id="{268985DF-3936-4CAB-A180-45088E893897}"/>
+                    </a:ext>
+                  </a:extLst>
+                </p:cNvPr>
+                <p:cNvSpPr/>
+                <p:nvPr/>
+              </p:nvSpPr>
+              <p:spPr>
+                <a:xfrm rot="5400000">
+                  <a:off x="9417795" y="843221"/>
+                  <a:ext cx="785054" cy="4359150"/>
+                </a:xfrm>
+                <a:prstGeom prst="leftBrace">
+                  <a:avLst/>
+                </a:prstGeom>
+                <a:solidFill>
+                  <a:schemeClr val="accent5">
+                    <a:lumMod val="20000"/>
+                    <a:lumOff val="80000"/>
+                  </a:schemeClr>
+                </a:solidFill>
+                <a:ln>
+                  <a:solidFill>
+                    <a:schemeClr val="accent5">
+                      <a:lumMod val="20000"/>
+                      <a:lumOff val="80000"/>
+                    </a:schemeClr>
+                  </a:solidFill>
+                </a:ln>
+              </p:spPr>
+              <p:style>
+                <a:lnRef idx="1">
+                  <a:schemeClr val="accent1"/>
+                </a:lnRef>
+                <a:fillRef idx="0">
+                  <a:schemeClr val="accent1"/>
+                </a:fillRef>
+                <a:effectRef idx="0">
+                  <a:schemeClr val="accent1"/>
+                </a:effectRef>
+                <a:fontRef idx="minor">
+                  <a:schemeClr val="tx1"/>
+                </a:fontRef>
+              </p:style>
+              <p:txBody>
+                <a:bodyPr rtlCol="0" anchor="ctr"/>
+                <a:lstStyle/>
+                <a:p>
+                  <a:pPr algn="ctr"/>
+                  <a:endParaRPr lang="en-GB"/>
+                </a:p>
+              </p:txBody>
+            </p:sp>
+            <p:sp>
+              <p:nvSpPr>
+                <p:cNvPr id="52" name="TextBox 51">
+                  <a:extLst>
+                    <a:ext uri="{FF2B5EF4-FFF2-40B4-BE49-F238E27FC236}">
+                      <a16:creationId xmlns:a16="http://schemas.microsoft.com/office/drawing/2014/main" id="{3F1A7E60-50DF-4992-951C-7F7E5C654219}"/>
+                    </a:ext>
+                  </a:extLst>
+                </p:cNvPr>
+                <p:cNvSpPr txBox="1"/>
+                <p:nvPr/>
+              </p:nvSpPr>
+              <p:spPr>
+                <a:xfrm>
+                  <a:off x="6613973" y="3002479"/>
+                  <a:ext cx="1013314" cy="461665"/>
+                </a:xfrm>
+                <a:prstGeom prst="rect">
+                  <a:avLst/>
+                </a:prstGeom>
+                <a:noFill/>
+              </p:spPr>
+              <p:txBody>
+                <a:bodyPr wrap="square" rtlCol="0">
+                  <a:spAutoFit/>
+                </a:bodyPr>
+                <a:lstStyle/>
+                <a:p>
+                  <a:r>
+                    <a:rPr lang="en-GB" sz="1200" u="sng" dirty="0">
+                      <a:latin typeface="Abadi" panose="020B0604020104020204" pitchFamily="34" charset="0"/>
+                    </a:rPr>
+                    <a:t>Diversity metrics</a:t>
+                  </a:r>
+                </a:p>
+              </p:txBody>
+            </p:sp>
+            <p:sp>
+              <p:nvSpPr>
+                <p:cNvPr id="54" name="TextBox 53">
+                  <a:extLst>
+                    <a:ext uri="{FF2B5EF4-FFF2-40B4-BE49-F238E27FC236}">
+                      <a16:creationId xmlns:a16="http://schemas.microsoft.com/office/drawing/2014/main" id="{481314B8-CBC0-4BE8-8582-39833513FECF}"/>
+                    </a:ext>
+                  </a:extLst>
+                </p:cNvPr>
+                <p:cNvSpPr txBox="1"/>
+                <p:nvPr/>
+              </p:nvSpPr>
+              <p:spPr>
+                <a:xfrm>
+                  <a:off x="4848542" y="3189609"/>
+                  <a:ext cx="1013314" cy="276999"/>
+                </a:xfrm>
+                <a:prstGeom prst="rect">
+                  <a:avLst/>
+                </a:prstGeom>
+                <a:noFill/>
+              </p:spPr>
+              <p:txBody>
+                <a:bodyPr wrap="square" rtlCol="0">
+                  <a:spAutoFit/>
+                </a:bodyPr>
+                <a:lstStyle/>
+                <a:p>
+                  <a:r>
+                    <a:rPr lang="en-GB" sz="1200" u="sng" dirty="0">
+                      <a:latin typeface="Abadi" panose="020B0604020104020204" pitchFamily="34" charset="0"/>
+                    </a:rPr>
+                    <a:t>Ordination</a:t>
+                  </a:r>
+                </a:p>
+              </p:txBody>
+            </p:sp>
+            <p:sp>
+              <p:nvSpPr>
+                <p:cNvPr id="56" name="TextBox 55">
+                  <a:extLst>
+                    <a:ext uri="{FF2B5EF4-FFF2-40B4-BE49-F238E27FC236}">
+                      <a16:creationId xmlns:a16="http://schemas.microsoft.com/office/drawing/2014/main" id="{008E72D4-9286-4520-AC36-3D425B39EFCF}"/>
+                    </a:ext>
+                  </a:extLst>
+                </p:cNvPr>
+                <p:cNvSpPr txBox="1"/>
+                <p:nvPr/>
+              </p:nvSpPr>
+              <p:spPr>
+                <a:xfrm>
+                  <a:off x="6091878" y="3519940"/>
+                  <a:ext cx="1535409" cy="253916"/>
+                </a:xfrm>
+                <a:prstGeom prst="rect">
+                  <a:avLst/>
+                </a:prstGeom>
+                <a:noFill/>
+              </p:spPr>
+              <p:txBody>
+                <a:bodyPr wrap="square" rtlCol="0">
+                  <a:spAutoFit/>
+                </a:bodyPr>
+                <a:lstStyle/>
+                <a:p>
+                  <a:r>
+                    <a:rPr lang="en-GB" sz="1050" dirty="0">
+                      <a:latin typeface="Abadi" panose="020B0604020104020204" pitchFamily="34" charset="0"/>
+                    </a:rPr>
+                    <a:t>relative_intensities.py</a:t>
+                  </a:r>
+                </a:p>
+              </p:txBody>
+            </p:sp>
+            <p:sp>
+              <p:nvSpPr>
+                <p:cNvPr id="58" name="TextBox 57">
+                  <a:extLst>
+                    <a:ext uri="{FF2B5EF4-FFF2-40B4-BE49-F238E27FC236}">
+                      <a16:creationId xmlns:a16="http://schemas.microsoft.com/office/drawing/2014/main" id="{EA5EC986-6336-4D63-83DC-CC254A457880}"/>
+                    </a:ext>
+                  </a:extLst>
+                </p:cNvPr>
+                <p:cNvSpPr txBox="1"/>
+                <p:nvPr/>
+              </p:nvSpPr>
+              <p:spPr>
+                <a:xfrm>
+                  <a:off x="6091877" y="3757486"/>
+                  <a:ext cx="1535409" cy="253916"/>
+                </a:xfrm>
+                <a:prstGeom prst="rect">
+                  <a:avLst/>
+                </a:prstGeom>
+                <a:noFill/>
+              </p:spPr>
+              <p:txBody>
+                <a:bodyPr wrap="square" rtlCol="0">
+                  <a:spAutoFit/>
+                </a:bodyPr>
+                <a:lstStyle/>
+                <a:p>
+                  <a:r>
+                    <a:rPr lang="en-GB" sz="1050" dirty="0">
+                      <a:latin typeface="Abadi" panose="020B0604020104020204" pitchFamily="34" charset="0"/>
+                    </a:rPr>
+                    <a:t>diversity_indices.py</a:t>
+                  </a:r>
+                </a:p>
+              </p:txBody>
+            </p:sp>
+            <p:sp>
+              <p:nvSpPr>
+                <p:cNvPr id="60" name="TextBox 59">
+                  <a:extLst>
+                    <a:ext uri="{FF2B5EF4-FFF2-40B4-BE49-F238E27FC236}">
+                      <a16:creationId xmlns:a16="http://schemas.microsoft.com/office/drawing/2014/main" id="{DDFDE051-31F4-493F-BAD0-86437A5CFE17}"/>
+                    </a:ext>
+                  </a:extLst>
+                </p:cNvPr>
+                <p:cNvSpPr txBox="1"/>
+                <p:nvPr/>
+              </p:nvSpPr>
+              <p:spPr>
+                <a:xfrm>
+                  <a:off x="4695687" y="3514352"/>
+                  <a:ext cx="1535409" cy="253916"/>
+                </a:xfrm>
+                <a:prstGeom prst="rect">
+                  <a:avLst/>
+                </a:prstGeom>
+                <a:noFill/>
+              </p:spPr>
+              <p:txBody>
+                <a:bodyPr wrap="square" rtlCol="0">
+                  <a:spAutoFit/>
+                </a:bodyPr>
+                <a:lstStyle/>
+                <a:p>
+                  <a:r>
+                    <a:rPr lang="en-GB" sz="1050" dirty="0">
+                      <a:latin typeface="Abadi" panose="020B0604020104020204" pitchFamily="34" charset="0"/>
+                    </a:rPr>
+                    <a:t>ordination_matrix.py</a:t>
+                  </a:r>
+                </a:p>
+              </p:txBody>
+            </p:sp>
+            <p:sp>
+              <p:nvSpPr>
+                <p:cNvPr id="62" name="TextBox 61">
+                  <a:extLst>
+                    <a:ext uri="{FF2B5EF4-FFF2-40B4-BE49-F238E27FC236}">
+                      <a16:creationId xmlns:a16="http://schemas.microsoft.com/office/drawing/2014/main" id="{C6FA2430-BB3D-4884-ACDC-DF3D12148676}"/>
+                    </a:ext>
+                  </a:extLst>
+                </p:cNvPr>
+                <p:cNvSpPr txBox="1"/>
+                <p:nvPr/>
+              </p:nvSpPr>
+              <p:spPr>
+                <a:xfrm>
+                  <a:off x="6091877" y="3985737"/>
+                  <a:ext cx="1535409" cy="253916"/>
+                </a:xfrm>
+                <a:prstGeom prst="rect">
+                  <a:avLst/>
+                </a:prstGeom>
+                <a:noFill/>
+              </p:spPr>
+              <p:txBody>
+                <a:bodyPr wrap="square" rtlCol="0">
+                  <a:spAutoFit/>
+                </a:bodyPr>
+                <a:lstStyle/>
+                <a:p>
+                  <a:r>
+                    <a:rPr lang="en-GB" sz="1050" dirty="0">
+                      <a:latin typeface="Abadi" panose="020B0604020104020204" pitchFamily="34" charset="0"/>
+                    </a:rPr>
+                    <a:t>compound_class.py</a:t>
+                  </a:r>
+                </a:p>
+              </p:txBody>
+            </p:sp>
+            <p:sp>
+              <p:nvSpPr>
+                <p:cNvPr id="64" name="TextBox 63">
+                  <a:extLst>
+                    <a:ext uri="{FF2B5EF4-FFF2-40B4-BE49-F238E27FC236}">
+                      <a16:creationId xmlns:a16="http://schemas.microsoft.com/office/drawing/2014/main" id="{4468D425-F4E5-4B34-8FB2-9D3E65817AA6}"/>
+                    </a:ext>
+                  </a:extLst>
+                </p:cNvPr>
+                <p:cNvSpPr txBox="1"/>
+                <p:nvPr/>
+              </p:nvSpPr>
+              <p:spPr>
+                <a:xfrm>
+                  <a:off x="4695687" y="3761759"/>
+                  <a:ext cx="1535409" cy="253916"/>
+                </a:xfrm>
+                <a:prstGeom prst="rect">
+                  <a:avLst/>
+                </a:prstGeom>
+                <a:noFill/>
+              </p:spPr>
+              <p:txBody>
+                <a:bodyPr wrap="square" rtlCol="0">
+                  <a:spAutoFit/>
+                </a:bodyPr>
+                <a:lstStyle/>
+                <a:p>
+                  <a:r>
+                    <a:rPr lang="en-GB" sz="1050" dirty="0">
+                      <a:latin typeface="Abadi" panose="020B0604020104020204" pitchFamily="34" charset="0"/>
+                    </a:rPr>
+                    <a:t>bray_curtis_matrix.py</a:t>
+                  </a:r>
+                </a:p>
+              </p:txBody>
+            </p:sp>
+            <p:sp>
+              <p:nvSpPr>
+                <p:cNvPr id="68" name="TextBox 67">
+                  <a:extLst>
+                    <a:ext uri="{FF2B5EF4-FFF2-40B4-BE49-F238E27FC236}">
+                      <a16:creationId xmlns:a16="http://schemas.microsoft.com/office/drawing/2014/main" id="{5DB46D51-913D-4103-9E6E-F19D3ECAAA0A}"/>
+                    </a:ext>
+                  </a:extLst>
+                </p:cNvPr>
+                <p:cNvSpPr txBox="1"/>
+                <p:nvPr/>
+              </p:nvSpPr>
+              <p:spPr>
+                <a:xfrm>
+                  <a:off x="10785396" y="2987912"/>
+                  <a:ext cx="1013314" cy="276999"/>
+                </a:xfrm>
+                <a:prstGeom prst="rect">
+                  <a:avLst/>
+                </a:prstGeom>
+                <a:noFill/>
+              </p:spPr>
+              <p:txBody>
+                <a:bodyPr wrap="square" rtlCol="0">
+                  <a:spAutoFit/>
+                </a:bodyPr>
+                <a:lstStyle/>
+                <a:p>
+                  <a:r>
+                    <a:rPr lang="en-GB" sz="1200" u="sng" dirty="0">
+                      <a:latin typeface="Abadi" panose="020B0604020104020204" pitchFamily="34" charset="0"/>
+                    </a:rPr>
+                    <a:t>van </a:t>
+                  </a:r>
+                  <a:r>
+                    <a:rPr lang="en-GB" sz="1200" u="sng" dirty="0" err="1">
+                      <a:latin typeface="Abadi" panose="020B0604020104020204" pitchFamily="34" charset="0"/>
+                    </a:rPr>
+                    <a:t>Krevelen</a:t>
+                  </a:r>
+                  <a:endParaRPr lang="en-GB" sz="1200" u="sng" dirty="0">
+                    <a:latin typeface="Abadi" panose="020B0604020104020204" pitchFamily="34" charset="0"/>
+                  </a:endParaRPr>
+                </a:p>
+              </p:txBody>
+            </p:sp>
+            <p:sp>
+              <p:nvSpPr>
+                <p:cNvPr id="70" name="TextBox 69">
+                  <a:extLst>
+                    <a:ext uri="{FF2B5EF4-FFF2-40B4-BE49-F238E27FC236}">
+                      <a16:creationId xmlns:a16="http://schemas.microsoft.com/office/drawing/2014/main" id="{49726771-81C9-4851-8F35-E130C7216F17}"/>
+                    </a:ext>
+                  </a:extLst>
+                </p:cNvPr>
+                <p:cNvSpPr txBox="1"/>
+                <p:nvPr/>
+              </p:nvSpPr>
+              <p:spPr>
+                <a:xfrm>
+                  <a:off x="9131559" y="2997189"/>
+                  <a:ext cx="1820164" cy="461665"/>
+                </a:xfrm>
+                <a:prstGeom prst="rect">
+                  <a:avLst/>
+                </a:prstGeom>
+                <a:noFill/>
+              </p:spPr>
+              <p:txBody>
+                <a:bodyPr wrap="square" rtlCol="0">
+                  <a:spAutoFit/>
+                </a:bodyPr>
+                <a:lstStyle/>
+                <a:p>
+                  <a:r>
+                    <a:rPr lang="en-GB" sz="1200" u="sng" dirty="0">
+                      <a:latin typeface="Abadi" panose="020B0604020104020204" pitchFamily="34" charset="0"/>
+                    </a:rPr>
+                    <a:t>Mass &amp; compound class plots</a:t>
+                  </a:r>
+                </a:p>
+              </p:txBody>
+            </p:sp>
+            <p:sp>
+              <p:nvSpPr>
+                <p:cNvPr id="72" name="TextBox 71">
+                  <a:extLst>
+                    <a:ext uri="{FF2B5EF4-FFF2-40B4-BE49-F238E27FC236}">
+                      <a16:creationId xmlns:a16="http://schemas.microsoft.com/office/drawing/2014/main" id="{A6F91E70-E852-4E96-A7BB-77DD23D566D9}"/>
+                    </a:ext>
+                  </a:extLst>
+                </p:cNvPr>
+                <p:cNvSpPr txBox="1"/>
+                <p:nvPr/>
+              </p:nvSpPr>
+              <p:spPr>
+                <a:xfrm>
+                  <a:off x="7758600" y="2981013"/>
+                  <a:ext cx="1013314" cy="461665"/>
+                </a:xfrm>
+                <a:prstGeom prst="rect">
+                  <a:avLst/>
+                </a:prstGeom>
+                <a:noFill/>
+              </p:spPr>
+              <p:txBody>
+                <a:bodyPr wrap="square" rtlCol="0">
+                  <a:spAutoFit/>
+                </a:bodyPr>
+                <a:lstStyle/>
+                <a:p>
+                  <a:r>
+                    <a:rPr lang="en-GB" sz="1200" u="sng" dirty="0">
+                      <a:latin typeface="Abadi" panose="020B0604020104020204" pitchFamily="34" charset="0"/>
+                    </a:rPr>
+                    <a:t>Intersection plots</a:t>
+                  </a:r>
+                </a:p>
+              </p:txBody>
+            </p:sp>
+            <p:sp>
+              <p:nvSpPr>
+                <p:cNvPr id="74" name="TextBox 73">
+                  <a:extLst>
+                    <a:ext uri="{FF2B5EF4-FFF2-40B4-BE49-F238E27FC236}">
+                      <a16:creationId xmlns:a16="http://schemas.microsoft.com/office/drawing/2014/main" id="{A78937DD-E267-42B1-95C4-7750CEDB8AC6}"/>
+                    </a:ext>
+                  </a:extLst>
+                </p:cNvPr>
+                <p:cNvSpPr txBox="1"/>
+                <p:nvPr/>
+              </p:nvSpPr>
+              <p:spPr>
+                <a:xfrm>
+                  <a:off x="7623109" y="4031904"/>
+                  <a:ext cx="1535409" cy="415498"/>
+                </a:xfrm>
+                <a:prstGeom prst="rect">
+                  <a:avLst/>
+                </a:prstGeom>
+                <a:noFill/>
+              </p:spPr>
+              <p:txBody>
+                <a:bodyPr wrap="square" rtlCol="0">
+                  <a:spAutoFit/>
+                </a:bodyPr>
+                <a:lstStyle/>
+                <a:p>
+                  <a:r>
+                    <a:rPr lang="en-GB" sz="1050" dirty="0">
+                      <a:latin typeface="Abadi" panose="020B0604020104020204" pitchFamily="34" charset="0"/>
+                    </a:rPr>
+                    <a:t>+ Upset plots using </a:t>
+                  </a:r>
+                  <a:r>
+                    <a:rPr lang="en-GB" sz="1050" dirty="0" err="1">
+                      <a:latin typeface="Abadi" panose="020B0604020104020204" pitchFamily="34" charset="0"/>
+                    </a:rPr>
+                    <a:t>UpSetPlot</a:t>
+                  </a:r>
+                  <a:endParaRPr lang="en-GB" sz="1050" dirty="0">
+                    <a:latin typeface="Abadi" panose="020B0604020104020204" pitchFamily="34" charset="0"/>
+                  </a:endParaRPr>
+                </a:p>
+              </p:txBody>
+            </p:sp>
+            <p:sp>
+              <p:nvSpPr>
+                <p:cNvPr id="76" name="TextBox 75">
+                  <a:extLst>
+                    <a:ext uri="{FF2B5EF4-FFF2-40B4-BE49-F238E27FC236}">
+                      <a16:creationId xmlns:a16="http://schemas.microsoft.com/office/drawing/2014/main" id="{8A211461-06CE-4714-9FCB-52F0E802F4E0}"/>
+                    </a:ext>
+                  </a:extLst>
+                </p:cNvPr>
+                <p:cNvSpPr txBox="1"/>
+                <p:nvPr/>
+              </p:nvSpPr>
+              <p:spPr>
+                <a:xfrm>
+                  <a:off x="9212690" y="3464144"/>
+                  <a:ext cx="1113719" cy="415498"/>
+                </a:xfrm>
+                <a:prstGeom prst="rect">
+                  <a:avLst/>
+                </a:prstGeom>
+                <a:noFill/>
+              </p:spPr>
+              <p:txBody>
+                <a:bodyPr wrap="square" rtlCol="0">
+                  <a:spAutoFit/>
+                </a:bodyPr>
+                <a:lstStyle/>
+                <a:p>
+                  <a:r>
+                    <a:rPr lang="en-GB" sz="1050" dirty="0">
+                      <a:latin typeface="Abadi" panose="020B0604020104020204" pitchFamily="34" charset="0"/>
+                    </a:rPr>
+                    <a:t>kendrick_mass_defect_plot.py</a:t>
+                  </a:r>
+                </a:p>
+              </p:txBody>
+            </p:sp>
+            <p:sp>
+              <p:nvSpPr>
+                <p:cNvPr id="78" name="TextBox 77">
+                  <a:extLst>
+                    <a:ext uri="{FF2B5EF4-FFF2-40B4-BE49-F238E27FC236}">
+                      <a16:creationId xmlns:a16="http://schemas.microsoft.com/office/drawing/2014/main" id="{4E099D9F-6E90-4F64-BE60-904DE321CE4F}"/>
+                    </a:ext>
+                  </a:extLst>
+                </p:cNvPr>
+                <p:cNvSpPr txBox="1"/>
+                <p:nvPr/>
+              </p:nvSpPr>
+              <p:spPr>
+                <a:xfrm>
+                  <a:off x="10703140" y="3481673"/>
+                  <a:ext cx="1020842" cy="415498"/>
+                </a:xfrm>
+                <a:prstGeom prst="rect">
+                  <a:avLst/>
+                </a:prstGeom>
+                <a:noFill/>
+              </p:spPr>
+              <p:txBody>
+                <a:bodyPr wrap="square" rtlCol="0">
+                  <a:spAutoFit/>
+                </a:bodyPr>
+                <a:lstStyle/>
+                <a:p>
+                  <a:r>
+                    <a:rPr lang="en-GB" sz="1050" dirty="0">
+                      <a:latin typeface="Abadi" panose="020B0604020104020204" pitchFamily="34" charset="0"/>
+                    </a:rPr>
+                    <a:t>van_krevelen_plot.py</a:t>
+                  </a:r>
+                </a:p>
+              </p:txBody>
+            </p:sp>
+            <p:sp>
+              <p:nvSpPr>
+                <p:cNvPr id="80" name="TextBox 79">
+                  <a:extLst>
+                    <a:ext uri="{FF2B5EF4-FFF2-40B4-BE49-F238E27FC236}">
+                      <a16:creationId xmlns:a16="http://schemas.microsoft.com/office/drawing/2014/main" id="{CB4CBEE0-5705-450B-A8E6-8D9F1DF37FB1}"/>
+                    </a:ext>
+                  </a:extLst>
+                </p:cNvPr>
+                <p:cNvSpPr txBox="1"/>
+                <p:nvPr/>
+              </p:nvSpPr>
+              <p:spPr>
+                <a:xfrm>
+                  <a:off x="10703140" y="3957943"/>
+                  <a:ext cx="1365312" cy="415498"/>
+                </a:xfrm>
+                <a:prstGeom prst="rect">
+                  <a:avLst/>
+                </a:prstGeom>
+                <a:noFill/>
+              </p:spPr>
+              <p:txBody>
+                <a:bodyPr wrap="square" rtlCol="0">
+                  <a:spAutoFit/>
+                </a:bodyPr>
+                <a:lstStyle/>
+                <a:p>
+                  <a:r>
+                    <a:rPr lang="en-GB" sz="1050" dirty="0">
+                      <a:latin typeface="Abadi" panose="020B0604020104020204" pitchFamily="34" charset="0"/>
+                    </a:rPr>
+                    <a:t>multi_van_krevelen_plot.py</a:t>
+                  </a:r>
+                </a:p>
+              </p:txBody>
+            </p:sp>
+            <p:sp>
+              <p:nvSpPr>
+                <p:cNvPr id="82" name="TextBox 81">
+                  <a:extLst>
+                    <a:ext uri="{FF2B5EF4-FFF2-40B4-BE49-F238E27FC236}">
+                      <a16:creationId xmlns:a16="http://schemas.microsoft.com/office/drawing/2014/main" id="{584728CF-8A75-4441-9082-0A89D04525F9}"/>
+                    </a:ext>
+                  </a:extLst>
+                </p:cNvPr>
+                <p:cNvSpPr txBox="1"/>
+                <p:nvPr/>
+              </p:nvSpPr>
+              <p:spPr>
+                <a:xfrm>
+                  <a:off x="10703140" y="4373441"/>
+                  <a:ext cx="1095570" cy="415498"/>
+                </a:xfrm>
+                <a:prstGeom prst="rect">
+                  <a:avLst/>
+                </a:prstGeom>
+                <a:noFill/>
+              </p:spPr>
+              <p:txBody>
+                <a:bodyPr wrap="square" rtlCol="0">
+                  <a:spAutoFit/>
+                </a:bodyPr>
+                <a:lstStyle/>
+                <a:p>
+                  <a:r>
+                    <a:rPr lang="en-GB" sz="1050" dirty="0">
+                      <a:latin typeface="Abadi" panose="020B0604020104020204" pitchFamily="34" charset="0"/>
+                    </a:rPr>
+                    <a:t>van_krevelen_histogram.py</a:t>
+                  </a:r>
+                </a:p>
+              </p:txBody>
+            </p:sp>
+            <p:sp>
+              <p:nvSpPr>
+                <p:cNvPr id="84" name="TextBox 83">
+                  <a:extLst>
+                    <a:ext uri="{FF2B5EF4-FFF2-40B4-BE49-F238E27FC236}">
+                      <a16:creationId xmlns:a16="http://schemas.microsoft.com/office/drawing/2014/main" id="{A9A9C561-562D-430E-811C-FE6C3E8F780C}"/>
+                    </a:ext>
+                  </a:extLst>
+                </p:cNvPr>
+                <p:cNvSpPr txBox="1"/>
+                <p:nvPr/>
+              </p:nvSpPr>
+              <p:spPr>
+                <a:xfrm>
+                  <a:off x="5158520" y="2095348"/>
+                  <a:ext cx="1866714" cy="369332"/>
+                </a:xfrm>
+                <a:prstGeom prst="rect">
+                  <a:avLst/>
+                </a:prstGeom>
+                <a:noFill/>
+              </p:spPr>
+              <p:txBody>
+                <a:bodyPr wrap="square" rtlCol="0">
+                  <a:spAutoFit/>
+                </a:bodyPr>
+                <a:lstStyle/>
+                <a:p>
+                  <a:r>
+                    <a:rPr lang="en-GB" u="sng" dirty="0">
+                      <a:latin typeface="Abadi" panose="020B0604020104020204" pitchFamily="34" charset="0"/>
+                    </a:rPr>
+                    <a:t>.</a:t>
+                  </a:r>
+                  <a:r>
+                    <a:rPr lang="en-GB" u="sng" dirty="0" err="1">
+                      <a:latin typeface="Abadi" panose="020B0604020104020204" pitchFamily="34" charset="0"/>
+                    </a:rPr>
+                    <a:t>pykrev</a:t>
+                  </a:r>
+                  <a:r>
+                    <a:rPr lang="en-GB" u="sng" dirty="0">
+                      <a:latin typeface="Abadi" panose="020B0604020104020204" pitchFamily="34" charset="0"/>
+                    </a:rPr>
+                    <a:t>/diversity</a:t>
+                  </a:r>
+                </a:p>
+              </p:txBody>
+            </p:sp>
+            <p:sp>
+              <p:nvSpPr>
+                <p:cNvPr id="86" name="TextBox 85">
+                  <a:extLst>
+                    <a:ext uri="{FF2B5EF4-FFF2-40B4-BE49-F238E27FC236}">
+                      <a16:creationId xmlns:a16="http://schemas.microsoft.com/office/drawing/2014/main" id="{F94979BA-8023-4E93-98C1-ECE967BFB36B}"/>
+                    </a:ext>
+                  </a:extLst>
+                </p:cNvPr>
+                <p:cNvSpPr txBox="1"/>
+                <p:nvPr/>
+              </p:nvSpPr>
+              <p:spPr>
+                <a:xfrm>
+                  <a:off x="8758944" y="2107508"/>
+                  <a:ext cx="1866714" cy="369332"/>
+                </a:xfrm>
+                <a:prstGeom prst="rect">
+                  <a:avLst/>
+                </a:prstGeom>
+                <a:noFill/>
+              </p:spPr>
+              <p:txBody>
+                <a:bodyPr wrap="square" rtlCol="0">
+                  <a:spAutoFit/>
+                </a:bodyPr>
+                <a:lstStyle/>
+                <a:p>
+                  <a:r>
+                    <a:rPr lang="en-GB" u="sng" dirty="0">
+                      <a:latin typeface="Abadi" panose="020B0604020104020204" pitchFamily="34" charset="0"/>
+                    </a:rPr>
+                    <a:t>.</a:t>
+                  </a:r>
+                  <a:r>
+                    <a:rPr lang="en-GB" u="sng" dirty="0" err="1">
+                      <a:latin typeface="Abadi" panose="020B0604020104020204" pitchFamily="34" charset="0"/>
+                    </a:rPr>
+                    <a:t>pykrev</a:t>
+                  </a:r>
+                  <a:r>
+                    <a:rPr lang="en-GB" u="sng" dirty="0">
+                      <a:latin typeface="Abadi" panose="020B0604020104020204" pitchFamily="34" charset="0"/>
+                    </a:rPr>
+                    <a:t>/plotting</a:t>
+                  </a:r>
+                </a:p>
+              </p:txBody>
+            </p:sp>
+            <p:sp>
+              <p:nvSpPr>
+                <p:cNvPr id="88" name="TextBox 87">
+                  <a:extLst>
+                    <a:ext uri="{FF2B5EF4-FFF2-40B4-BE49-F238E27FC236}">
+                      <a16:creationId xmlns:a16="http://schemas.microsoft.com/office/drawing/2014/main" id="{D22C270C-24C8-4AFA-ADA0-1AFF3D13B442}"/>
+                    </a:ext>
+                  </a:extLst>
+                </p:cNvPr>
+                <p:cNvSpPr txBox="1"/>
+                <p:nvPr/>
+              </p:nvSpPr>
+              <p:spPr>
+                <a:xfrm>
+                  <a:off x="7599906" y="3773856"/>
+                  <a:ext cx="1124994" cy="253916"/>
+                </a:xfrm>
+                <a:prstGeom prst="rect">
+                  <a:avLst/>
+                </a:prstGeom>
+                <a:noFill/>
+              </p:spPr>
+              <p:txBody>
+                <a:bodyPr wrap="square" rtlCol="0">
+                  <a:spAutoFit/>
+                </a:bodyPr>
+                <a:lstStyle/>
+                <a:p>
+                  <a:r>
+                    <a:rPr lang="en-GB" sz="1050" dirty="0">
+                      <a:latin typeface="Abadi" panose="020B0604020104020204" pitchFamily="34" charset="0"/>
+                    </a:rPr>
+                    <a:t>missing_plot.py</a:t>
+                  </a:r>
+                </a:p>
+              </p:txBody>
+            </p:sp>
+            <p:sp>
+              <p:nvSpPr>
+                <p:cNvPr id="90" name="TextBox 89">
+                  <a:extLst>
+                    <a:ext uri="{FF2B5EF4-FFF2-40B4-BE49-F238E27FC236}">
+                      <a16:creationId xmlns:a16="http://schemas.microsoft.com/office/drawing/2014/main" id="{B954979D-B3A5-4875-AB54-93E4446F0FB6}"/>
+                    </a:ext>
+                  </a:extLst>
+                </p:cNvPr>
+                <p:cNvSpPr txBox="1"/>
+                <p:nvPr/>
+              </p:nvSpPr>
+              <p:spPr>
+                <a:xfrm>
+                  <a:off x="7623109" y="3498923"/>
+                  <a:ext cx="1124994" cy="253916"/>
+                </a:xfrm>
+                <a:prstGeom prst="rect">
+                  <a:avLst/>
+                </a:prstGeom>
+                <a:noFill/>
+              </p:spPr>
+              <p:txBody>
+                <a:bodyPr wrap="square" rtlCol="0">
+                  <a:spAutoFit/>
+                </a:bodyPr>
+                <a:lstStyle/>
+                <a:p>
+                  <a:r>
+                    <a:rPr lang="en-GB" sz="1050" dirty="0">
+                      <a:latin typeface="Abadi" panose="020B0604020104020204" pitchFamily="34" charset="0"/>
+                    </a:rPr>
+                    <a:t>unique_plot.py</a:t>
+                  </a:r>
+                </a:p>
+              </p:txBody>
+            </p:sp>
+          </p:grpSp>
           <p:sp>
             <p:nvSpPr>
-              <p:cNvPr id="15" name="Right Brace 14">
+              <p:cNvPr id="41" name="TextBox 40">
                 <a:extLst>
                   <a:ext uri="{FF2B5EF4-FFF2-40B4-BE49-F238E27FC236}">
-                    <a16:creationId xmlns:a16="http://schemas.microsoft.com/office/drawing/2014/main" id="{53DFC4B4-62FF-4762-B70C-3815C1AEAD9E}"/>
-                  </a:ext>
-                </a:extLst>
-              </p:cNvPr>
-              <p:cNvSpPr/>
-              <p:nvPr/>
-            </p:nvSpPr>
-            <p:spPr>
-              <a:xfrm rot="16200000">
-                <a:off x="5510373" y="-3078550"/>
-                <a:ext cx="1318941" cy="9982985"/>
-              </a:xfrm>
-              <a:prstGeom prst="rightBrace">
-                <a:avLst/>
-              </a:prstGeom>
-              <a:solidFill>
-                <a:schemeClr val="accent1">
-                  <a:lumMod val="40000"/>
-                  <a:lumOff val="60000"/>
-                </a:schemeClr>
-              </a:solidFill>
-              <a:ln w="9525"/>
-            </p:spPr>
-            <p:style>
-              <a:lnRef idx="1">
-                <a:schemeClr val="accent1"/>
-              </a:lnRef>
-              <a:fillRef idx="0">
-                <a:schemeClr val="accent1"/>
-              </a:fillRef>
-              <a:effectRef idx="0">
-                <a:schemeClr val="accent1"/>
-              </a:effectRef>
-              <a:fontRef idx="minor">
-                <a:schemeClr val="tx1"/>
-              </a:fontRef>
-            </p:style>
-            <p:txBody>
-              <a:bodyPr rtlCol="0" anchor="ctr"/>
-              <a:lstStyle/>
-              <a:p>
-                <a:pPr algn="ctr"/>
-                <a:endParaRPr lang="en-GB"/>
-              </a:p>
-            </p:txBody>
-          </p:sp>
-          <p:pic>
-            <p:nvPicPr>
-              <p:cNvPr id="5" name="Picture 4">
-                <a:extLst>
-                  <a:ext uri="{FF2B5EF4-FFF2-40B4-BE49-F238E27FC236}">
-                    <a16:creationId xmlns:a16="http://schemas.microsoft.com/office/drawing/2014/main" id="{B5F909E9-3930-4E12-8CF3-7E8E3B5D29EA}"/>
-                  </a:ext>
-                </a:extLst>
-              </p:cNvPr>
-              <p:cNvPicPr>
-                <a:picLocks noChangeAspect="1"/>
-              </p:cNvPicPr>
-              <p:nvPr/>
-            </p:nvPicPr>
-            <p:blipFill>
-              <a:blip r:embed="rId3">
-                <a:extLst>
-                  <a:ext uri="{28A0092B-C50C-407E-A947-70E740481C1C}">
-                    <a14:useLocalDpi xmlns:a14="http://schemas.microsoft.com/office/drawing/2010/main" val="0"/>
-                  </a:ext>
-                </a:extLst>
-              </a:blip>
-              <a:stretch>
-                <a:fillRect/>
-              </a:stretch>
-            </p:blipFill>
-            <p:spPr>
-              <a:xfrm>
-                <a:off x="4069642" y="-128675"/>
-                <a:ext cx="4195615" cy="1679052"/>
-              </a:xfrm>
-              <a:prstGeom prst="rect">
-                <a:avLst/>
-              </a:prstGeom>
-            </p:spPr>
-          </p:pic>
-          <p:sp>
-            <p:nvSpPr>
-              <p:cNvPr id="6" name="TextBox 5">
-                <a:extLst>
-                  <a:ext uri="{FF2B5EF4-FFF2-40B4-BE49-F238E27FC236}">
-                    <a16:creationId xmlns:a16="http://schemas.microsoft.com/office/drawing/2014/main" id="{4A3529D3-1F6C-470A-AEF0-E90ADF35C881}"/>
+                    <a16:creationId xmlns:a16="http://schemas.microsoft.com/office/drawing/2014/main" id="{B518140A-1821-44F9-8E9D-D1D150307634}"/>
                   </a:ext>
                 </a:extLst>
               </p:cNvPr>
@@ -3983,57 +5403,8 @@
             </p:nvSpPr>
             <p:spPr>
               <a:xfrm>
-                <a:off x="1566342" y="2103224"/>
-                <a:ext cx="1781665" cy="369332"/>
-              </a:xfrm>
-              <a:prstGeom prst="rect">
-                <a:avLst/>
-              </a:prstGeom>
-              <a:noFill/>
-            </p:spPr>
-            <p:txBody>
-              <a:bodyPr wrap="square" rtlCol="0">
-                <a:spAutoFit/>
-              </a:bodyPr>
-              <a:lstStyle/>
-              <a:p>
-                <a:r>
-                  <a:rPr lang="en-GB" u="sng" dirty="0">
-                    <a:latin typeface="Abadi" panose="020B0604020104020204" pitchFamily="34" charset="0"/>
-                  </a:rPr>
-                  <a:t>.</a:t>
-                </a:r>
-                <a:r>
-                  <a:rPr lang="en-GB" u="sng" dirty="0" err="1">
-                    <a:latin typeface="Abadi" panose="020B0604020104020204" pitchFamily="34" charset="0"/>
-                  </a:rPr>
-                  <a:t>pykrev</a:t>
-                </a:r>
-                <a:r>
-                  <a:rPr lang="en-GB" u="sng" dirty="0">
-                    <a:latin typeface="Abadi" panose="020B0604020104020204" pitchFamily="34" charset="0"/>
-                  </a:rPr>
-                  <a:t>/formula </a:t>
-                </a:r>
-              </a:p>
-            </p:txBody>
-          </p:sp>
-          <p:sp>
-            <p:nvSpPr>
-              <p:cNvPr id="17" name="TextBox 16">
-                <a:extLst>
-                  <a:ext uri="{FF2B5EF4-FFF2-40B4-BE49-F238E27FC236}">
-                    <a16:creationId xmlns:a16="http://schemas.microsoft.com/office/drawing/2014/main" id="{D8A5E8C1-4283-4F9F-BBEF-77DCA9A88110}"/>
-                  </a:ext>
-                </a:extLst>
-              </p:cNvPr>
-              <p:cNvSpPr txBox="1"/>
-              <p:nvPr/>
-            </p:nvSpPr>
-            <p:spPr>
-              <a:xfrm>
-                <a:off x="123548" y="3484638"/>
-                <a:ext cx="1582702" cy="261610"/>
+                <a:off x="9212691" y="4131954"/>
+                <a:ext cx="1018600" cy="415498"/>
               </a:xfrm>
               <a:prstGeom prst="rect">
                 <a:avLst/>
@@ -4050,17 +5421,17 @@
                   <a:rPr lang="en-GB" sz="1050" dirty="0">
                     <a:latin typeface="Abadi" panose="020B0604020104020204" pitchFamily="34" charset="0"/>
                   </a:rPr>
-                  <a:t>element_counts.py</a:t>
+                  <a:t>atomic_class_plot.py</a:t>
                 </a:r>
               </a:p>
             </p:txBody>
           </p:sp>
           <p:sp>
             <p:nvSpPr>
-              <p:cNvPr id="19" name="TextBox 18">
+              <p:cNvPr id="43" name="TextBox 42">
                 <a:extLst>
                   <a:ext uri="{FF2B5EF4-FFF2-40B4-BE49-F238E27FC236}">
-                    <a16:creationId xmlns:a16="http://schemas.microsoft.com/office/drawing/2014/main" id="{6849FE89-FE1A-4725-9119-1BF82E005FBD}"/>
+                    <a16:creationId xmlns:a16="http://schemas.microsoft.com/office/drawing/2014/main" id="{5B2FD2C5-4A9B-445D-BBB3-2E128EC92706}"/>
                   </a:ext>
                 </a:extLst>
               </p:cNvPr>
@@ -4069,8 +5440,8 @@
             </p:nvSpPr>
             <p:spPr>
               <a:xfrm>
-                <a:off x="1793982" y="3503579"/>
-                <a:ext cx="1582702" cy="261610"/>
+                <a:off x="9212691" y="4520232"/>
+                <a:ext cx="1195263" cy="415498"/>
               </a:xfrm>
               <a:prstGeom prst="rect">
                 <a:avLst/>
@@ -4087,1278 +5458,7 @@
                   <a:rPr lang="en-GB" sz="1050" dirty="0">
                     <a:latin typeface="Abadi" panose="020B0604020104020204" pitchFamily="34" charset="0"/>
                   </a:rPr>
-                  <a:t>calculate_mass.py</a:t>
-                </a:r>
-              </a:p>
-            </p:txBody>
-          </p:sp>
-          <p:sp>
-            <p:nvSpPr>
-              <p:cNvPr id="21" name="TextBox 20">
-                <a:extLst>
-                  <a:ext uri="{FF2B5EF4-FFF2-40B4-BE49-F238E27FC236}">
-                    <a16:creationId xmlns:a16="http://schemas.microsoft.com/office/drawing/2014/main" id="{F9F23654-1617-4BC2-82D6-1DAF0244D0E8}"/>
-                  </a:ext>
-                </a:extLst>
-              </p:cNvPr>
-              <p:cNvSpPr txBox="1"/>
-              <p:nvPr/>
-            </p:nvSpPr>
-            <p:spPr>
-              <a:xfrm>
-                <a:off x="1865591" y="3802696"/>
-                <a:ext cx="1113279" cy="415497"/>
-              </a:xfrm>
-              <a:prstGeom prst="rect">
-                <a:avLst/>
-              </a:prstGeom>
-              <a:noFill/>
-            </p:spPr>
-            <p:txBody>
-              <a:bodyPr wrap="square" rtlCol="0">
-                <a:spAutoFit/>
-              </a:bodyPr>
-              <a:lstStyle/>
-              <a:p>
-                <a:r>
-                  <a:rPr lang="en-GB" sz="1050" dirty="0">
-                    <a:latin typeface="Abadi" panose="020B0604020104020204" pitchFamily="34" charset="0"/>
-                  </a:rPr>
-                  <a:t>kendrick_mass_defect.py</a:t>
-                </a:r>
-              </a:p>
-            </p:txBody>
-          </p:sp>
-          <p:sp>
-            <p:nvSpPr>
-              <p:cNvPr id="23" name="TextBox 22">
-                <a:extLst>
-                  <a:ext uri="{FF2B5EF4-FFF2-40B4-BE49-F238E27FC236}">
-                    <a16:creationId xmlns:a16="http://schemas.microsoft.com/office/drawing/2014/main" id="{5720F916-A2E5-4FF6-97CA-1AA032FE75A5}"/>
-                  </a:ext>
-                </a:extLst>
-              </p:cNvPr>
-              <p:cNvSpPr txBox="1"/>
-              <p:nvPr/>
-            </p:nvSpPr>
-            <p:spPr>
-              <a:xfrm>
-                <a:off x="3464417" y="3204674"/>
-                <a:ext cx="1582702" cy="276999"/>
-              </a:xfrm>
-              <a:prstGeom prst="rect">
-                <a:avLst/>
-              </a:prstGeom>
-              <a:noFill/>
-            </p:spPr>
-            <p:txBody>
-              <a:bodyPr wrap="square" rtlCol="0">
-                <a:spAutoFit/>
-              </a:bodyPr>
-              <a:lstStyle/>
-              <a:p>
-                <a:r>
-                  <a:rPr lang="en-GB" sz="1200" u="sng" dirty="0">
-                    <a:latin typeface="Abadi" panose="020B0604020104020204" pitchFamily="34" charset="0"/>
-                  </a:rPr>
-                  <a:t>Set analysis</a:t>
-                </a:r>
-              </a:p>
-            </p:txBody>
-          </p:sp>
-          <p:sp>
-            <p:nvSpPr>
-              <p:cNvPr id="25" name="TextBox 24">
-                <a:extLst>
-                  <a:ext uri="{FF2B5EF4-FFF2-40B4-BE49-F238E27FC236}">
-                    <a16:creationId xmlns:a16="http://schemas.microsoft.com/office/drawing/2014/main" id="{91C46627-0931-4840-B034-4F9566B3D21C}"/>
-                  </a:ext>
-                </a:extLst>
-              </p:cNvPr>
-              <p:cNvSpPr txBox="1"/>
-              <p:nvPr/>
-            </p:nvSpPr>
-            <p:spPr>
-              <a:xfrm>
-                <a:off x="3279273" y="3499287"/>
-                <a:ext cx="1836722" cy="261610"/>
-              </a:xfrm>
-              <a:prstGeom prst="rect">
-                <a:avLst/>
-              </a:prstGeom>
-              <a:noFill/>
-            </p:spPr>
-            <p:txBody>
-              <a:bodyPr wrap="square" rtlCol="0">
-                <a:spAutoFit/>
-              </a:bodyPr>
-              <a:lstStyle/>
-              <a:p>
-                <a:r>
-                  <a:rPr lang="en-GB" sz="1050" dirty="0">
-                    <a:latin typeface="Abadi" panose="020B0604020104020204" pitchFamily="34" charset="0"/>
-                  </a:rPr>
-                  <a:t>find_intersections.py</a:t>
-                </a:r>
-              </a:p>
-            </p:txBody>
-          </p:sp>
-          <p:sp>
-            <p:nvSpPr>
-              <p:cNvPr id="27" name="TextBox 26">
-                <a:extLst>
-                  <a:ext uri="{FF2B5EF4-FFF2-40B4-BE49-F238E27FC236}">
-                    <a16:creationId xmlns:a16="http://schemas.microsoft.com/office/drawing/2014/main" id="{D76C5206-36B7-4F79-B701-E9935EDA533E}"/>
-                  </a:ext>
-                </a:extLst>
-              </p:cNvPr>
-              <p:cNvSpPr txBox="1"/>
-              <p:nvPr/>
-            </p:nvSpPr>
-            <p:spPr>
-              <a:xfrm>
-                <a:off x="3279273" y="3735848"/>
-                <a:ext cx="1836722" cy="261610"/>
-              </a:xfrm>
-              <a:prstGeom prst="rect">
-                <a:avLst/>
-              </a:prstGeom>
-              <a:noFill/>
-            </p:spPr>
-            <p:txBody>
-              <a:bodyPr wrap="square" rtlCol="0">
-                <a:spAutoFit/>
-              </a:bodyPr>
-              <a:lstStyle/>
-              <a:p>
-                <a:r>
-                  <a:rPr lang="en-GB" sz="1050" dirty="0">
-                    <a:latin typeface="Abadi" panose="020B0604020104020204" pitchFamily="34" charset="0"/>
-                  </a:rPr>
-                  <a:t>unique_groups.py</a:t>
-                </a:r>
-              </a:p>
-            </p:txBody>
-          </p:sp>
-          <p:sp>
-            <p:nvSpPr>
-              <p:cNvPr id="29" name="TextBox 28">
-                <a:extLst>
-                  <a:ext uri="{FF2B5EF4-FFF2-40B4-BE49-F238E27FC236}">
-                    <a16:creationId xmlns:a16="http://schemas.microsoft.com/office/drawing/2014/main" id="{7C2C892A-12CE-4B2D-825D-3D8318E7BE40}"/>
-                  </a:ext>
-                </a:extLst>
-              </p:cNvPr>
-              <p:cNvSpPr txBox="1"/>
-              <p:nvPr/>
-            </p:nvSpPr>
-            <p:spPr>
-              <a:xfrm>
-                <a:off x="3279273" y="3993611"/>
-                <a:ext cx="1836722" cy="261610"/>
-              </a:xfrm>
-              <a:prstGeom prst="rect">
-                <a:avLst/>
-              </a:prstGeom>
-              <a:noFill/>
-            </p:spPr>
-            <p:txBody>
-              <a:bodyPr wrap="square" rtlCol="0">
-                <a:spAutoFit/>
-              </a:bodyPr>
-              <a:lstStyle/>
-              <a:p>
-                <a:r>
-                  <a:rPr lang="en-GB" sz="1050" dirty="0">
-                    <a:latin typeface="Abadi" panose="020B0604020104020204" pitchFamily="34" charset="0"/>
-                  </a:rPr>
-                  <a:t>missing_groups.py</a:t>
-                </a:r>
-              </a:p>
-            </p:txBody>
-          </p:sp>
-          <p:sp>
-            <p:nvSpPr>
-              <p:cNvPr id="31" name="TextBox 30">
-                <a:extLst>
-                  <a:ext uri="{FF2B5EF4-FFF2-40B4-BE49-F238E27FC236}">
-                    <a16:creationId xmlns:a16="http://schemas.microsoft.com/office/drawing/2014/main" id="{1B90A93C-152D-4680-88A8-0F233EDD5513}"/>
-                  </a:ext>
-                </a:extLst>
-              </p:cNvPr>
-              <p:cNvSpPr txBox="1"/>
-              <p:nvPr/>
-            </p:nvSpPr>
-            <p:spPr>
-              <a:xfrm>
-                <a:off x="123548" y="4019059"/>
-                <a:ext cx="1034059" cy="415497"/>
-              </a:xfrm>
-              <a:prstGeom prst="rect">
-                <a:avLst/>
-              </a:prstGeom>
-              <a:noFill/>
-            </p:spPr>
-            <p:txBody>
-              <a:bodyPr wrap="square" rtlCol="0">
-                <a:spAutoFit/>
-              </a:bodyPr>
-              <a:lstStyle/>
-              <a:p>
-                <a:r>
-                  <a:rPr lang="en-GB" sz="1050" dirty="0">
-                    <a:latin typeface="Abadi" panose="020B0604020104020204" pitchFamily="34" charset="0"/>
-                  </a:rPr>
-                  <a:t>double_bond_equivalent.py</a:t>
-                </a:r>
-              </a:p>
-            </p:txBody>
-          </p:sp>
-          <p:sp>
-            <p:nvSpPr>
-              <p:cNvPr id="33" name="TextBox 32">
-                <a:extLst>
-                  <a:ext uri="{FF2B5EF4-FFF2-40B4-BE49-F238E27FC236}">
-                    <a16:creationId xmlns:a16="http://schemas.microsoft.com/office/drawing/2014/main" id="{B36588A5-FF59-4957-875F-EBA2ECBCBD65}"/>
-                  </a:ext>
-                </a:extLst>
-              </p:cNvPr>
-              <p:cNvSpPr txBox="1"/>
-              <p:nvPr/>
-            </p:nvSpPr>
-            <p:spPr>
-              <a:xfrm>
-                <a:off x="123548" y="4389583"/>
-                <a:ext cx="1836722" cy="253916"/>
-              </a:xfrm>
-              <a:prstGeom prst="rect">
-                <a:avLst/>
-              </a:prstGeom>
-              <a:noFill/>
-            </p:spPr>
-            <p:txBody>
-              <a:bodyPr wrap="square" rtlCol="0">
-                <a:spAutoFit/>
-              </a:bodyPr>
-              <a:lstStyle/>
-              <a:p>
-                <a:r>
-                  <a:rPr lang="en-GB" sz="1050" dirty="0">
-                    <a:latin typeface="Abadi" panose="020B0604020104020204" pitchFamily="34" charset="0"/>
-                  </a:rPr>
-                  <a:t>aromaticity_index.py</a:t>
-                </a:r>
-              </a:p>
-            </p:txBody>
-          </p:sp>
-          <p:sp>
-            <p:nvSpPr>
-              <p:cNvPr id="35" name="TextBox 34">
-                <a:extLst>
-                  <a:ext uri="{FF2B5EF4-FFF2-40B4-BE49-F238E27FC236}">
-                    <a16:creationId xmlns:a16="http://schemas.microsoft.com/office/drawing/2014/main" id="{4B9C0C85-4EF8-4491-B0EE-19C68CE97DD2}"/>
-                  </a:ext>
-                </a:extLst>
-              </p:cNvPr>
-              <p:cNvSpPr txBox="1"/>
-              <p:nvPr/>
-            </p:nvSpPr>
-            <p:spPr>
-              <a:xfrm>
-                <a:off x="114215" y="4605946"/>
-                <a:ext cx="1836722" cy="253916"/>
-              </a:xfrm>
-              <a:prstGeom prst="rect">
-                <a:avLst/>
-              </a:prstGeom>
-              <a:noFill/>
-            </p:spPr>
-            <p:txBody>
-              <a:bodyPr wrap="square" rtlCol="0">
-                <a:spAutoFit/>
-              </a:bodyPr>
-              <a:lstStyle/>
-              <a:p>
-                <a:r>
-                  <a:rPr lang="en-GB" sz="1050" dirty="0">
-                    <a:latin typeface="Abadi" panose="020B0604020104020204" pitchFamily="34" charset="0"/>
-                  </a:rPr>
-                  <a:t>nominal_oxidation_state.py</a:t>
-                </a:r>
-              </a:p>
-            </p:txBody>
-          </p:sp>
-          <p:sp>
-            <p:nvSpPr>
-              <p:cNvPr id="37" name="TextBox 36">
-                <a:extLst>
-                  <a:ext uri="{FF2B5EF4-FFF2-40B4-BE49-F238E27FC236}">
-                    <a16:creationId xmlns:a16="http://schemas.microsoft.com/office/drawing/2014/main" id="{87235915-F6CF-4215-8602-DC452CCFD485}"/>
-                  </a:ext>
-                </a:extLst>
-              </p:cNvPr>
-              <p:cNvSpPr txBox="1"/>
-              <p:nvPr/>
-            </p:nvSpPr>
-            <p:spPr>
-              <a:xfrm>
-                <a:off x="123548" y="3763898"/>
-                <a:ext cx="1836722" cy="261610"/>
-              </a:xfrm>
-              <a:prstGeom prst="rect">
-                <a:avLst/>
-              </a:prstGeom>
-              <a:noFill/>
-            </p:spPr>
-            <p:txBody>
-              <a:bodyPr wrap="square" rtlCol="0">
-                <a:spAutoFit/>
-              </a:bodyPr>
-              <a:lstStyle/>
-              <a:p>
-                <a:r>
-                  <a:rPr lang="en-GB" sz="1050" dirty="0">
-                    <a:latin typeface="Abadi" panose="020B0604020104020204" pitchFamily="34" charset="0"/>
-                  </a:rPr>
-                  <a:t>element_ratios.py</a:t>
-                </a:r>
-              </a:p>
-            </p:txBody>
-          </p:sp>
-          <p:sp>
-            <p:nvSpPr>
-              <p:cNvPr id="40" name="TextBox 39">
-                <a:extLst>
-                  <a:ext uri="{FF2B5EF4-FFF2-40B4-BE49-F238E27FC236}">
-                    <a16:creationId xmlns:a16="http://schemas.microsoft.com/office/drawing/2014/main" id="{62FFD0EF-8A37-4D98-A5F9-849FF2AD321E}"/>
-                  </a:ext>
-                </a:extLst>
-              </p:cNvPr>
-              <p:cNvSpPr txBox="1"/>
-              <p:nvPr/>
-            </p:nvSpPr>
-            <p:spPr>
-              <a:xfrm>
-                <a:off x="1863704" y="3207462"/>
-                <a:ext cx="1582702" cy="276999"/>
-              </a:xfrm>
-              <a:prstGeom prst="rect">
-                <a:avLst/>
-              </a:prstGeom>
-              <a:noFill/>
-            </p:spPr>
-            <p:txBody>
-              <a:bodyPr wrap="square" rtlCol="0">
-                <a:spAutoFit/>
-              </a:bodyPr>
-              <a:lstStyle/>
-              <a:p>
-                <a:r>
-                  <a:rPr lang="en-GB" sz="1200" u="sng" dirty="0">
-                    <a:latin typeface="Abadi" panose="020B0604020104020204" pitchFamily="34" charset="0"/>
-                  </a:rPr>
-                  <a:t>Mass analysis</a:t>
-                </a:r>
-              </a:p>
-            </p:txBody>
-          </p:sp>
-          <p:sp>
-            <p:nvSpPr>
-              <p:cNvPr id="42" name="TextBox 41">
-                <a:extLst>
-                  <a:ext uri="{FF2B5EF4-FFF2-40B4-BE49-F238E27FC236}">
-                    <a16:creationId xmlns:a16="http://schemas.microsoft.com/office/drawing/2014/main" id="{246B4A45-DEF9-44C8-8671-380A03F6A3F0}"/>
-                  </a:ext>
-                </a:extLst>
-              </p:cNvPr>
-              <p:cNvSpPr txBox="1"/>
-              <p:nvPr/>
-            </p:nvSpPr>
-            <p:spPr>
-              <a:xfrm>
-                <a:off x="293822" y="3022796"/>
-                <a:ext cx="1582702" cy="461665"/>
-              </a:xfrm>
-              <a:prstGeom prst="rect">
-                <a:avLst/>
-              </a:prstGeom>
-              <a:noFill/>
-            </p:spPr>
-            <p:txBody>
-              <a:bodyPr wrap="square" rtlCol="0">
-                <a:spAutoFit/>
-              </a:bodyPr>
-              <a:lstStyle/>
-              <a:p>
-                <a:r>
-                  <a:rPr lang="en-GB" sz="1200" u="sng" dirty="0">
-                    <a:latin typeface="Abadi" panose="020B0604020104020204" pitchFamily="34" charset="0"/>
-                  </a:rPr>
-                  <a:t>Stoichiometric analysis</a:t>
-                </a:r>
-              </a:p>
-            </p:txBody>
-          </p:sp>
-          <p:sp>
-            <p:nvSpPr>
-              <p:cNvPr id="44" name="Left Brace 43">
-                <a:extLst>
-                  <a:ext uri="{FF2B5EF4-FFF2-40B4-BE49-F238E27FC236}">
-                    <a16:creationId xmlns:a16="http://schemas.microsoft.com/office/drawing/2014/main" id="{B13BC78F-A9EA-4C6B-AC51-4DA8DD768EF3}"/>
-                  </a:ext>
-                </a:extLst>
-              </p:cNvPr>
-              <p:cNvSpPr/>
-              <p:nvPr/>
-            </p:nvSpPr>
-            <p:spPr>
-              <a:xfrm rot="5400000">
-                <a:off x="5703472" y="1693154"/>
-                <a:ext cx="785054" cy="2686639"/>
-              </a:xfrm>
-              <a:prstGeom prst="leftBrace">
-                <a:avLst/>
-              </a:prstGeom>
-              <a:solidFill>
-                <a:schemeClr val="accent6">
-                  <a:lumMod val="20000"/>
-                  <a:lumOff val="80000"/>
-                </a:schemeClr>
-              </a:solidFill>
-              <a:ln>
-                <a:solidFill>
-                  <a:schemeClr val="accent6">
-                    <a:lumMod val="20000"/>
-                    <a:lumOff val="80000"/>
-                  </a:schemeClr>
-                </a:solidFill>
-              </a:ln>
-            </p:spPr>
-            <p:style>
-              <a:lnRef idx="1">
-                <a:schemeClr val="accent1"/>
-              </a:lnRef>
-              <a:fillRef idx="0">
-                <a:schemeClr val="accent1"/>
-              </a:fillRef>
-              <a:effectRef idx="0">
-                <a:schemeClr val="accent1"/>
-              </a:effectRef>
-              <a:fontRef idx="minor">
-                <a:schemeClr val="tx1"/>
-              </a:fontRef>
-            </p:style>
-            <p:txBody>
-              <a:bodyPr rtlCol="0" anchor="ctr"/>
-              <a:lstStyle/>
-              <a:p>
-                <a:pPr algn="ctr"/>
-                <a:endParaRPr lang="en-GB"/>
-              </a:p>
-            </p:txBody>
-          </p:sp>
-          <p:sp>
-            <p:nvSpPr>
-              <p:cNvPr id="46" name="Left Brace 45">
-                <a:extLst>
-                  <a:ext uri="{FF2B5EF4-FFF2-40B4-BE49-F238E27FC236}">
-                    <a16:creationId xmlns:a16="http://schemas.microsoft.com/office/drawing/2014/main" id="{268985DF-3936-4CAB-A180-45088E893897}"/>
-                  </a:ext>
-                </a:extLst>
-              </p:cNvPr>
-              <p:cNvSpPr/>
-              <p:nvPr/>
-            </p:nvSpPr>
-            <p:spPr>
-              <a:xfrm rot="5400000">
-                <a:off x="9417795" y="843221"/>
-                <a:ext cx="785054" cy="4359150"/>
-              </a:xfrm>
-              <a:prstGeom prst="leftBrace">
-                <a:avLst/>
-              </a:prstGeom>
-              <a:solidFill>
-                <a:schemeClr val="accent5">
-                  <a:lumMod val="20000"/>
-                  <a:lumOff val="80000"/>
-                </a:schemeClr>
-              </a:solidFill>
-              <a:ln>
-                <a:solidFill>
-                  <a:schemeClr val="accent5">
-                    <a:lumMod val="20000"/>
-                    <a:lumOff val="80000"/>
-                  </a:schemeClr>
-                </a:solidFill>
-              </a:ln>
-            </p:spPr>
-            <p:style>
-              <a:lnRef idx="1">
-                <a:schemeClr val="accent1"/>
-              </a:lnRef>
-              <a:fillRef idx="0">
-                <a:schemeClr val="accent1"/>
-              </a:fillRef>
-              <a:effectRef idx="0">
-                <a:schemeClr val="accent1"/>
-              </a:effectRef>
-              <a:fontRef idx="minor">
-                <a:schemeClr val="tx1"/>
-              </a:fontRef>
-            </p:style>
-            <p:txBody>
-              <a:bodyPr rtlCol="0" anchor="ctr"/>
-              <a:lstStyle/>
-              <a:p>
-                <a:pPr algn="ctr"/>
-                <a:endParaRPr lang="en-GB"/>
-              </a:p>
-            </p:txBody>
-          </p:sp>
-          <p:sp>
-            <p:nvSpPr>
-              <p:cNvPr id="52" name="TextBox 51">
-                <a:extLst>
-                  <a:ext uri="{FF2B5EF4-FFF2-40B4-BE49-F238E27FC236}">
-                    <a16:creationId xmlns:a16="http://schemas.microsoft.com/office/drawing/2014/main" id="{3F1A7E60-50DF-4992-951C-7F7E5C654219}"/>
-                  </a:ext>
-                </a:extLst>
-              </p:cNvPr>
-              <p:cNvSpPr txBox="1"/>
-              <p:nvPr/>
-            </p:nvSpPr>
-            <p:spPr>
-              <a:xfrm>
-                <a:off x="6613973" y="3002479"/>
-                <a:ext cx="1013314" cy="461665"/>
-              </a:xfrm>
-              <a:prstGeom prst="rect">
-                <a:avLst/>
-              </a:prstGeom>
-              <a:noFill/>
-            </p:spPr>
-            <p:txBody>
-              <a:bodyPr wrap="square" rtlCol="0">
-                <a:spAutoFit/>
-              </a:bodyPr>
-              <a:lstStyle/>
-              <a:p>
-                <a:r>
-                  <a:rPr lang="en-GB" sz="1200" u="sng" dirty="0">
-                    <a:latin typeface="Abadi" panose="020B0604020104020204" pitchFamily="34" charset="0"/>
-                  </a:rPr>
-                  <a:t>Diversity metrics</a:t>
-                </a:r>
-              </a:p>
-            </p:txBody>
-          </p:sp>
-          <p:sp>
-            <p:nvSpPr>
-              <p:cNvPr id="54" name="TextBox 53">
-                <a:extLst>
-                  <a:ext uri="{FF2B5EF4-FFF2-40B4-BE49-F238E27FC236}">
-                    <a16:creationId xmlns:a16="http://schemas.microsoft.com/office/drawing/2014/main" id="{481314B8-CBC0-4BE8-8582-39833513FECF}"/>
-                  </a:ext>
-                </a:extLst>
-              </p:cNvPr>
-              <p:cNvSpPr txBox="1"/>
-              <p:nvPr/>
-            </p:nvSpPr>
-            <p:spPr>
-              <a:xfrm>
-                <a:off x="4848542" y="3189609"/>
-                <a:ext cx="1013314" cy="276999"/>
-              </a:xfrm>
-              <a:prstGeom prst="rect">
-                <a:avLst/>
-              </a:prstGeom>
-              <a:noFill/>
-            </p:spPr>
-            <p:txBody>
-              <a:bodyPr wrap="square" rtlCol="0">
-                <a:spAutoFit/>
-              </a:bodyPr>
-              <a:lstStyle/>
-              <a:p>
-                <a:r>
-                  <a:rPr lang="en-GB" sz="1200" u="sng" dirty="0">
-                    <a:latin typeface="Abadi" panose="020B0604020104020204" pitchFamily="34" charset="0"/>
-                  </a:rPr>
-                  <a:t>Ordination</a:t>
-                </a:r>
-              </a:p>
-            </p:txBody>
-          </p:sp>
-          <p:sp>
-            <p:nvSpPr>
-              <p:cNvPr id="56" name="TextBox 55">
-                <a:extLst>
-                  <a:ext uri="{FF2B5EF4-FFF2-40B4-BE49-F238E27FC236}">
-                    <a16:creationId xmlns:a16="http://schemas.microsoft.com/office/drawing/2014/main" id="{008E72D4-9286-4520-AC36-3D425B39EFCF}"/>
-                  </a:ext>
-                </a:extLst>
-              </p:cNvPr>
-              <p:cNvSpPr txBox="1"/>
-              <p:nvPr/>
-            </p:nvSpPr>
-            <p:spPr>
-              <a:xfrm>
-                <a:off x="6091878" y="3519940"/>
-                <a:ext cx="1535409" cy="253916"/>
-              </a:xfrm>
-              <a:prstGeom prst="rect">
-                <a:avLst/>
-              </a:prstGeom>
-              <a:noFill/>
-            </p:spPr>
-            <p:txBody>
-              <a:bodyPr wrap="square" rtlCol="0">
-                <a:spAutoFit/>
-              </a:bodyPr>
-              <a:lstStyle/>
-              <a:p>
-                <a:r>
-                  <a:rPr lang="en-GB" sz="1050" dirty="0">
-                    <a:latin typeface="Abadi" panose="020B0604020104020204" pitchFamily="34" charset="0"/>
-                  </a:rPr>
-                  <a:t>relative_intensities.py</a:t>
-                </a:r>
-              </a:p>
-            </p:txBody>
-          </p:sp>
-          <p:sp>
-            <p:nvSpPr>
-              <p:cNvPr id="58" name="TextBox 57">
-                <a:extLst>
-                  <a:ext uri="{FF2B5EF4-FFF2-40B4-BE49-F238E27FC236}">
-                    <a16:creationId xmlns:a16="http://schemas.microsoft.com/office/drawing/2014/main" id="{EA5EC986-6336-4D63-83DC-CC254A457880}"/>
-                  </a:ext>
-                </a:extLst>
-              </p:cNvPr>
-              <p:cNvSpPr txBox="1"/>
-              <p:nvPr/>
-            </p:nvSpPr>
-            <p:spPr>
-              <a:xfrm>
-                <a:off x="6091877" y="3757486"/>
-                <a:ext cx="1535409" cy="253916"/>
-              </a:xfrm>
-              <a:prstGeom prst="rect">
-                <a:avLst/>
-              </a:prstGeom>
-              <a:noFill/>
-            </p:spPr>
-            <p:txBody>
-              <a:bodyPr wrap="square" rtlCol="0">
-                <a:spAutoFit/>
-              </a:bodyPr>
-              <a:lstStyle/>
-              <a:p>
-                <a:r>
-                  <a:rPr lang="en-GB" sz="1050" dirty="0">
-                    <a:latin typeface="Abadi" panose="020B0604020104020204" pitchFamily="34" charset="0"/>
-                  </a:rPr>
-                  <a:t>diversity_indices.py</a:t>
-                </a:r>
-              </a:p>
-            </p:txBody>
-          </p:sp>
-          <p:sp>
-            <p:nvSpPr>
-              <p:cNvPr id="60" name="TextBox 59">
-                <a:extLst>
-                  <a:ext uri="{FF2B5EF4-FFF2-40B4-BE49-F238E27FC236}">
-                    <a16:creationId xmlns:a16="http://schemas.microsoft.com/office/drawing/2014/main" id="{DDFDE051-31F4-493F-BAD0-86437A5CFE17}"/>
-                  </a:ext>
-                </a:extLst>
-              </p:cNvPr>
-              <p:cNvSpPr txBox="1"/>
-              <p:nvPr/>
-            </p:nvSpPr>
-            <p:spPr>
-              <a:xfrm>
-                <a:off x="4695687" y="3514352"/>
-                <a:ext cx="1535409" cy="253916"/>
-              </a:xfrm>
-              <a:prstGeom prst="rect">
-                <a:avLst/>
-              </a:prstGeom>
-              <a:noFill/>
-            </p:spPr>
-            <p:txBody>
-              <a:bodyPr wrap="square" rtlCol="0">
-                <a:spAutoFit/>
-              </a:bodyPr>
-              <a:lstStyle/>
-              <a:p>
-                <a:r>
-                  <a:rPr lang="en-GB" sz="1050" dirty="0">
-                    <a:latin typeface="Abadi" panose="020B0604020104020204" pitchFamily="34" charset="0"/>
-                  </a:rPr>
-                  <a:t>ordination_matrix.py</a:t>
-                </a:r>
-              </a:p>
-            </p:txBody>
-          </p:sp>
-          <p:sp>
-            <p:nvSpPr>
-              <p:cNvPr id="62" name="TextBox 61">
-                <a:extLst>
-                  <a:ext uri="{FF2B5EF4-FFF2-40B4-BE49-F238E27FC236}">
-                    <a16:creationId xmlns:a16="http://schemas.microsoft.com/office/drawing/2014/main" id="{C6FA2430-BB3D-4884-ACDC-DF3D12148676}"/>
-                  </a:ext>
-                </a:extLst>
-              </p:cNvPr>
-              <p:cNvSpPr txBox="1"/>
-              <p:nvPr/>
-            </p:nvSpPr>
-            <p:spPr>
-              <a:xfrm>
-                <a:off x="6091877" y="3985737"/>
-                <a:ext cx="1535409" cy="253916"/>
-              </a:xfrm>
-              <a:prstGeom prst="rect">
-                <a:avLst/>
-              </a:prstGeom>
-              <a:noFill/>
-            </p:spPr>
-            <p:txBody>
-              <a:bodyPr wrap="square" rtlCol="0">
-                <a:spAutoFit/>
-              </a:bodyPr>
-              <a:lstStyle/>
-              <a:p>
-                <a:r>
-                  <a:rPr lang="en-GB" sz="1050" dirty="0">
-                    <a:latin typeface="Abadi" panose="020B0604020104020204" pitchFamily="34" charset="0"/>
-                  </a:rPr>
-                  <a:t>compound_class.py</a:t>
-                </a:r>
-              </a:p>
-            </p:txBody>
-          </p:sp>
-          <p:sp>
-            <p:nvSpPr>
-              <p:cNvPr id="64" name="TextBox 63">
-                <a:extLst>
-                  <a:ext uri="{FF2B5EF4-FFF2-40B4-BE49-F238E27FC236}">
-                    <a16:creationId xmlns:a16="http://schemas.microsoft.com/office/drawing/2014/main" id="{4468D425-F4E5-4B34-8FB2-9D3E65817AA6}"/>
-                  </a:ext>
-                </a:extLst>
-              </p:cNvPr>
-              <p:cNvSpPr txBox="1"/>
-              <p:nvPr/>
-            </p:nvSpPr>
-            <p:spPr>
-              <a:xfrm>
-                <a:off x="4695687" y="3761759"/>
-                <a:ext cx="1535409" cy="253916"/>
-              </a:xfrm>
-              <a:prstGeom prst="rect">
-                <a:avLst/>
-              </a:prstGeom>
-              <a:noFill/>
-            </p:spPr>
-            <p:txBody>
-              <a:bodyPr wrap="square" rtlCol="0">
-                <a:spAutoFit/>
-              </a:bodyPr>
-              <a:lstStyle/>
-              <a:p>
-                <a:r>
-                  <a:rPr lang="en-GB" sz="1050" dirty="0">
-                    <a:latin typeface="Abadi" panose="020B0604020104020204" pitchFamily="34" charset="0"/>
-                  </a:rPr>
-                  <a:t>bray_curtis_matrix.py</a:t>
-                </a:r>
-              </a:p>
-            </p:txBody>
-          </p:sp>
-          <p:sp>
-            <p:nvSpPr>
-              <p:cNvPr id="68" name="TextBox 67">
-                <a:extLst>
-                  <a:ext uri="{FF2B5EF4-FFF2-40B4-BE49-F238E27FC236}">
-                    <a16:creationId xmlns:a16="http://schemas.microsoft.com/office/drawing/2014/main" id="{5DB46D51-913D-4103-9E6E-F19D3ECAAA0A}"/>
-                  </a:ext>
-                </a:extLst>
-              </p:cNvPr>
-              <p:cNvSpPr txBox="1"/>
-              <p:nvPr/>
-            </p:nvSpPr>
-            <p:spPr>
-              <a:xfrm>
-                <a:off x="10710668" y="2967894"/>
-                <a:ext cx="1013314" cy="276999"/>
-              </a:xfrm>
-              <a:prstGeom prst="rect">
-                <a:avLst/>
-              </a:prstGeom>
-              <a:noFill/>
-            </p:spPr>
-            <p:txBody>
-              <a:bodyPr wrap="square" rtlCol="0">
-                <a:spAutoFit/>
-              </a:bodyPr>
-              <a:lstStyle/>
-              <a:p>
-                <a:r>
-                  <a:rPr lang="en-GB" sz="1200" u="sng" dirty="0">
-                    <a:latin typeface="Abadi" panose="020B0604020104020204" pitchFamily="34" charset="0"/>
-                  </a:rPr>
-                  <a:t>van </a:t>
-                </a:r>
-                <a:r>
-                  <a:rPr lang="en-GB" sz="1200" u="sng" dirty="0" err="1">
-                    <a:latin typeface="Abadi" panose="020B0604020104020204" pitchFamily="34" charset="0"/>
-                  </a:rPr>
-                  <a:t>Krevelen</a:t>
-                </a:r>
-                <a:endParaRPr lang="en-GB" sz="1200" u="sng" dirty="0">
-                  <a:latin typeface="Abadi" panose="020B0604020104020204" pitchFamily="34" charset="0"/>
-                </a:endParaRPr>
-              </a:p>
-            </p:txBody>
-          </p:sp>
-          <p:sp>
-            <p:nvSpPr>
-              <p:cNvPr id="70" name="TextBox 69">
-                <a:extLst>
-                  <a:ext uri="{FF2B5EF4-FFF2-40B4-BE49-F238E27FC236}">
-                    <a16:creationId xmlns:a16="http://schemas.microsoft.com/office/drawing/2014/main" id="{49726771-81C9-4851-8F35-E130C7216F17}"/>
-                  </a:ext>
-                </a:extLst>
-              </p:cNvPr>
-              <p:cNvSpPr txBox="1"/>
-              <p:nvPr/>
-            </p:nvSpPr>
-            <p:spPr>
-              <a:xfrm>
-                <a:off x="9131559" y="2997189"/>
-                <a:ext cx="1820164" cy="461665"/>
-              </a:xfrm>
-              <a:prstGeom prst="rect">
-                <a:avLst/>
-              </a:prstGeom>
-              <a:noFill/>
-            </p:spPr>
-            <p:txBody>
-              <a:bodyPr wrap="square" rtlCol="0">
-                <a:spAutoFit/>
-              </a:bodyPr>
-              <a:lstStyle/>
-              <a:p>
-                <a:r>
-                  <a:rPr lang="en-GB" sz="1200" u="sng" dirty="0" smtClean="0">
-                    <a:latin typeface="Abadi" panose="020B0604020104020204" pitchFamily="34" charset="0"/>
-                  </a:rPr>
-                  <a:t>Mass &amp; compound class plots</a:t>
-                </a:r>
-                <a:endParaRPr lang="en-GB" sz="1200" u="sng" dirty="0">
-                  <a:latin typeface="Abadi" panose="020B0604020104020204" pitchFamily="34" charset="0"/>
-                </a:endParaRPr>
-              </a:p>
-            </p:txBody>
-          </p:sp>
-          <p:sp>
-            <p:nvSpPr>
-              <p:cNvPr id="72" name="TextBox 71">
-                <a:extLst>
-                  <a:ext uri="{FF2B5EF4-FFF2-40B4-BE49-F238E27FC236}">
-                    <a16:creationId xmlns:a16="http://schemas.microsoft.com/office/drawing/2014/main" id="{A6F91E70-E852-4E96-A7BB-77DD23D566D9}"/>
-                  </a:ext>
-                </a:extLst>
-              </p:cNvPr>
-              <p:cNvSpPr txBox="1"/>
-              <p:nvPr/>
-            </p:nvSpPr>
-            <p:spPr>
-              <a:xfrm>
-                <a:off x="7758600" y="2981013"/>
-                <a:ext cx="1013314" cy="461665"/>
-              </a:xfrm>
-              <a:prstGeom prst="rect">
-                <a:avLst/>
-              </a:prstGeom>
-              <a:noFill/>
-            </p:spPr>
-            <p:txBody>
-              <a:bodyPr wrap="square" rtlCol="0">
-                <a:spAutoFit/>
-              </a:bodyPr>
-              <a:lstStyle/>
-              <a:p>
-                <a:r>
-                  <a:rPr lang="en-GB" sz="1200" u="sng" dirty="0">
-                    <a:latin typeface="Abadi" panose="020B0604020104020204" pitchFamily="34" charset="0"/>
-                  </a:rPr>
-                  <a:t>Intersection plots</a:t>
-                </a:r>
-              </a:p>
-            </p:txBody>
-          </p:sp>
-          <p:sp>
-            <p:nvSpPr>
-              <p:cNvPr id="74" name="TextBox 73">
-                <a:extLst>
-                  <a:ext uri="{FF2B5EF4-FFF2-40B4-BE49-F238E27FC236}">
-                    <a16:creationId xmlns:a16="http://schemas.microsoft.com/office/drawing/2014/main" id="{A78937DD-E267-42B1-95C4-7750CEDB8AC6}"/>
-                  </a:ext>
-                </a:extLst>
-              </p:cNvPr>
-              <p:cNvSpPr txBox="1"/>
-              <p:nvPr/>
-            </p:nvSpPr>
-            <p:spPr>
-              <a:xfrm>
-                <a:off x="7623109" y="4031904"/>
-                <a:ext cx="1535409" cy="415498"/>
-              </a:xfrm>
-              <a:prstGeom prst="rect">
-                <a:avLst/>
-              </a:prstGeom>
-              <a:noFill/>
-            </p:spPr>
-            <p:txBody>
-              <a:bodyPr wrap="square" rtlCol="0">
-                <a:spAutoFit/>
-              </a:bodyPr>
-              <a:lstStyle/>
-              <a:p>
-                <a:r>
-                  <a:rPr lang="en-GB" sz="1050" dirty="0">
-                    <a:latin typeface="Abadi" panose="020B0604020104020204" pitchFamily="34" charset="0"/>
-                  </a:rPr>
-                  <a:t>+ Upset plots using </a:t>
-                </a:r>
-                <a:r>
-                  <a:rPr lang="en-GB" sz="1050" dirty="0" err="1">
-                    <a:latin typeface="Abadi" panose="020B0604020104020204" pitchFamily="34" charset="0"/>
-                  </a:rPr>
-                  <a:t>UpSetPlot</a:t>
-                </a:r>
-                <a:endParaRPr lang="en-GB" sz="1050" dirty="0">
-                  <a:latin typeface="Abadi" panose="020B0604020104020204" pitchFamily="34" charset="0"/>
-                </a:endParaRPr>
-              </a:p>
-            </p:txBody>
-          </p:sp>
-          <p:sp>
-            <p:nvSpPr>
-              <p:cNvPr id="76" name="TextBox 75">
-                <a:extLst>
-                  <a:ext uri="{FF2B5EF4-FFF2-40B4-BE49-F238E27FC236}">
-                    <a16:creationId xmlns:a16="http://schemas.microsoft.com/office/drawing/2014/main" id="{8A211461-06CE-4714-9FCB-52F0E802F4E0}"/>
-                  </a:ext>
-                </a:extLst>
-              </p:cNvPr>
-              <p:cNvSpPr txBox="1"/>
-              <p:nvPr/>
-            </p:nvSpPr>
-            <p:spPr>
-              <a:xfrm>
-                <a:off x="9212690" y="3464144"/>
-                <a:ext cx="1113719" cy="415498"/>
-              </a:xfrm>
-              <a:prstGeom prst="rect">
-                <a:avLst/>
-              </a:prstGeom>
-              <a:noFill/>
-            </p:spPr>
-            <p:txBody>
-              <a:bodyPr wrap="square" rtlCol="0">
-                <a:spAutoFit/>
-              </a:bodyPr>
-              <a:lstStyle/>
-              <a:p>
-                <a:r>
-                  <a:rPr lang="en-GB" sz="1050" dirty="0">
-                    <a:latin typeface="Abadi" panose="020B0604020104020204" pitchFamily="34" charset="0"/>
-                  </a:rPr>
-                  <a:t>kendrick_mass_defect_plot.py</a:t>
-                </a:r>
-              </a:p>
-            </p:txBody>
-          </p:sp>
-          <p:sp>
-            <p:nvSpPr>
-              <p:cNvPr id="78" name="TextBox 77">
-                <a:extLst>
-                  <a:ext uri="{FF2B5EF4-FFF2-40B4-BE49-F238E27FC236}">
-                    <a16:creationId xmlns:a16="http://schemas.microsoft.com/office/drawing/2014/main" id="{4E099D9F-6E90-4F64-BE60-904DE321CE4F}"/>
-                  </a:ext>
-                </a:extLst>
-              </p:cNvPr>
-              <p:cNvSpPr txBox="1"/>
-              <p:nvPr/>
-            </p:nvSpPr>
-            <p:spPr>
-              <a:xfrm>
-                <a:off x="10703140" y="3481673"/>
-                <a:ext cx="1020842" cy="415498"/>
-              </a:xfrm>
-              <a:prstGeom prst="rect">
-                <a:avLst/>
-              </a:prstGeom>
-              <a:noFill/>
-            </p:spPr>
-            <p:txBody>
-              <a:bodyPr wrap="square" rtlCol="0">
-                <a:spAutoFit/>
-              </a:bodyPr>
-              <a:lstStyle/>
-              <a:p>
-                <a:r>
-                  <a:rPr lang="en-GB" sz="1050" dirty="0">
-                    <a:latin typeface="Abadi" panose="020B0604020104020204" pitchFamily="34" charset="0"/>
-                  </a:rPr>
-                  <a:t>van_krevelen_plot.py</a:t>
-                </a:r>
-              </a:p>
-            </p:txBody>
-          </p:sp>
-          <p:sp>
-            <p:nvSpPr>
-              <p:cNvPr id="80" name="TextBox 79">
-                <a:extLst>
-                  <a:ext uri="{FF2B5EF4-FFF2-40B4-BE49-F238E27FC236}">
-                    <a16:creationId xmlns:a16="http://schemas.microsoft.com/office/drawing/2014/main" id="{CB4CBEE0-5705-450B-A8E6-8D9F1DF37FB1}"/>
-                  </a:ext>
-                </a:extLst>
-              </p:cNvPr>
-              <p:cNvSpPr txBox="1"/>
-              <p:nvPr/>
-            </p:nvSpPr>
-            <p:spPr>
-              <a:xfrm>
-                <a:off x="10703140" y="3957943"/>
-                <a:ext cx="1365312" cy="415498"/>
-              </a:xfrm>
-              <a:prstGeom prst="rect">
-                <a:avLst/>
-              </a:prstGeom>
-              <a:noFill/>
-            </p:spPr>
-            <p:txBody>
-              <a:bodyPr wrap="square" rtlCol="0">
-                <a:spAutoFit/>
-              </a:bodyPr>
-              <a:lstStyle/>
-              <a:p>
-                <a:r>
-                  <a:rPr lang="en-GB" sz="1050" dirty="0">
-                    <a:latin typeface="Abadi" panose="020B0604020104020204" pitchFamily="34" charset="0"/>
-                  </a:rPr>
-                  <a:t>multi_van_krevelen_plot.py</a:t>
-                </a:r>
-              </a:p>
-            </p:txBody>
-          </p:sp>
-          <p:sp>
-            <p:nvSpPr>
-              <p:cNvPr id="82" name="TextBox 81">
-                <a:extLst>
-                  <a:ext uri="{FF2B5EF4-FFF2-40B4-BE49-F238E27FC236}">
-                    <a16:creationId xmlns:a16="http://schemas.microsoft.com/office/drawing/2014/main" id="{584728CF-8A75-4441-9082-0A89D04525F9}"/>
-                  </a:ext>
-                </a:extLst>
-              </p:cNvPr>
-              <p:cNvSpPr txBox="1"/>
-              <p:nvPr/>
-            </p:nvSpPr>
-            <p:spPr>
-              <a:xfrm>
-                <a:off x="10703140" y="4373441"/>
-                <a:ext cx="1095570" cy="415498"/>
-              </a:xfrm>
-              <a:prstGeom prst="rect">
-                <a:avLst/>
-              </a:prstGeom>
-              <a:noFill/>
-            </p:spPr>
-            <p:txBody>
-              <a:bodyPr wrap="square" rtlCol="0">
-                <a:spAutoFit/>
-              </a:bodyPr>
-              <a:lstStyle/>
-              <a:p>
-                <a:r>
-                  <a:rPr lang="en-GB" sz="1050" dirty="0">
-                    <a:latin typeface="Abadi" panose="020B0604020104020204" pitchFamily="34" charset="0"/>
-                  </a:rPr>
-                  <a:t>van_krevelen_histogram.py</a:t>
-                </a:r>
-              </a:p>
-            </p:txBody>
-          </p:sp>
-          <p:sp>
-            <p:nvSpPr>
-              <p:cNvPr id="84" name="TextBox 83">
-                <a:extLst>
-                  <a:ext uri="{FF2B5EF4-FFF2-40B4-BE49-F238E27FC236}">
-                    <a16:creationId xmlns:a16="http://schemas.microsoft.com/office/drawing/2014/main" id="{A9A9C561-562D-430E-811C-FE6C3E8F780C}"/>
-                  </a:ext>
-                </a:extLst>
-              </p:cNvPr>
-              <p:cNvSpPr txBox="1"/>
-              <p:nvPr/>
-            </p:nvSpPr>
-            <p:spPr>
-              <a:xfrm>
-                <a:off x="5158520" y="2095348"/>
-                <a:ext cx="1866714" cy="369332"/>
-              </a:xfrm>
-              <a:prstGeom prst="rect">
-                <a:avLst/>
-              </a:prstGeom>
-              <a:noFill/>
-            </p:spPr>
-            <p:txBody>
-              <a:bodyPr wrap="square" rtlCol="0">
-                <a:spAutoFit/>
-              </a:bodyPr>
-              <a:lstStyle/>
-              <a:p>
-                <a:r>
-                  <a:rPr lang="en-GB" u="sng" dirty="0">
-                    <a:latin typeface="Abadi" panose="020B0604020104020204" pitchFamily="34" charset="0"/>
-                  </a:rPr>
-                  <a:t>.</a:t>
-                </a:r>
-                <a:r>
-                  <a:rPr lang="en-GB" u="sng" dirty="0" err="1">
-                    <a:latin typeface="Abadi" panose="020B0604020104020204" pitchFamily="34" charset="0"/>
-                  </a:rPr>
-                  <a:t>pykrev</a:t>
-                </a:r>
-                <a:r>
-                  <a:rPr lang="en-GB" u="sng" dirty="0">
-                    <a:latin typeface="Abadi" panose="020B0604020104020204" pitchFamily="34" charset="0"/>
-                  </a:rPr>
-                  <a:t>/diversity</a:t>
-                </a:r>
-              </a:p>
-            </p:txBody>
-          </p:sp>
-          <p:sp>
-            <p:nvSpPr>
-              <p:cNvPr id="86" name="TextBox 85">
-                <a:extLst>
-                  <a:ext uri="{FF2B5EF4-FFF2-40B4-BE49-F238E27FC236}">
-                    <a16:creationId xmlns:a16="http://schemas.microsoft.com/office/drawing/2014/main" id="{F94979BA-8023-4E93-98C1-ECE967BFB36B}"/>
-                  </a:ext>
-                </a:extLst>
-              </p:cNvPr>
-              <p:cNvSpPr txBox="1"/>
-              <p:nvPr/>
-            </p:nvSpPr>
-            <p:spPr>
-              <a:xfrm>
-                <a:off x="8758944" y="2107508"/>
-                <a:ext cx="1866714" cy="369332"/>
-              </a:xfrm>
-              <a:prstGeom prst="rect">
-                <a:avLst/>
-              </a:prstGeom>
-              <a:noFill/>
-            </p:spPr>
-            <p:txBody>
-              <a:bodyPr wrap="square" rtlCol="0">
-                <a:spAutoFit/>
-              </a:bodyPr>
-              <a:lstStyle/>
-              <a:p>
-                <a:r>
-                  <a:rPr lang="en-GB" u="sng" dirty="0">
-                    <a:latin typeface="Abadi" panose="020B0604020104020204" pitchFamily="34" charset="0"/>
-                  </a:rPr>
-                  <a:t>.</a:t>
-                </a:r>
-                <a:r>
-                  <a:rPr lang="en-GB" u="sng" dirty="0" err="1">
-                    <a:latin typeface="Abadi" panose="020B0604020104020204" pitchFamily="34" charset="0"/>
-                  </a:rPr>
-                  <a:t>pykrev</a:t>
-                </a:r>
-                <a:r>
-                  <a:rPr lang="en-GB" u="sng" dirty="0">
-                    <a:latin typeface="Abadi" panose="020B0604020104020204" pitchFamily="34" charset="0"/>
-                  </a:rPr>
-                  <a:t>/plotting</a:t>
-                </a:r>
-              </a:p>
-            </p:txBody>
-          </p:sp>
-          <p:sp>
-            <p:nvSpPr>
-              <p:cNvPr id="88" name="TextBox 87">
-                <a:extLst>
-                  <a:ext uri="{FF2B5EF4-FFF2-40B4-BE49-F238E27FC236}">
-                    <a16:creationId xmlns:a16="http://schemas.microsoft.com/office/drawing/2014/main" id="{D22C270C-24C8-4AFA-ADA0-1AFF3D13B442}"/>
-                  </a:ext>
-                </a:extLst>
-              </p:cNvPr>
-              <p:cNvSpPr txBox="1"/>
-              <p:nvPr/>
-            </p:nvSpPr>
-            <p:spPr>
-              <a:xfrm>
-                <a:off x="7599906" y="3773856"/>
-                <a:ext cx="1124994" cy="253916"/>
-              </a:xfrm>
-              <a:prstGeom prst="rect">
-                <a:avLst/>
-              </a:prstGeom>
-              <a:noFill/>
-            </p:spPr>
-            <p:txBody>
-              <a:bodyPr wrap="square" rtlCol="0">
-                <a:spAutoFit/>
-              </a:bodyPr>
-              <a:lstStyle/>
-              <a:p>
-                <a:r>
-                  <a:rPr lang="en-GB" sz="1050" dirty="0">
-                    <a:latin typeface="Abadi" panose="020B0604020104020204" pitchFamily="34" charset="0"/>
-                  </a:rPr>
-                  <a:t>missing_plot.py</a:t>
-                </a:r>
-              </a:p>
-            </p:txBody>
-          </p:sp>
-          <p:sp>
-            <p:nvSpPr>
-              <p:cNvPr id="90" name="TextBox 89">
-                <a:extLst>
-                  <a:ext uri="{FF2B5EF4-FFF2-40B4-BE49-F238E27FC236}">
-                    <a16:creationId xmlns:a16="http://schemas.microsoft.com/office/drawing/2014/main" id="{B954979D-B3A5-4875-AB54-93E4446F0FB6}"/>
-                  </a:ext>
-                </a:extLst>
-              </p:cNvPr>
-              <p:cNvSpPr txBox="1"/>
-              <p:nvPr/>
-            </p:nvSpPr>
-            <p:spPr>
-              <a:xfrm>
-                <a:off x="7623109" y="3498923"/>
-                <a:ext cx="1124994" cy="253916"/>
-              </a:xfrm>
-              <a:prstGeom prst="rect">
-                <a:avLst/>
-              </a:prstGeom>
-              <a:noFill/>
-            </p:spPr>
-            <p:txBody>
-              <a:bodyPr wrap="square" rtlCol="0">
-                <a:spAutoFit/>
-              </a:bodyPr>
-              <a:lstStyle/>
-              <a:p>
-                <a:r>
-                  <a:rPr lang="en-GB" sz="1050" dirty="0">
-                    <a:latin typeface="Abadi" panose="020B0604020104020204" pitchFamily="34" charset="0"/>
-                  </a:rPr>
-                  <a:t>unique_plot.py</a:t>
+                  <a:t>compound_class_plot.py</a:t>
                 </a:r>
               </a:p>
             </p:txBody>
@@ -5366,10 +5466,10 @@
         </p:grpSp>
         <p:sp>
           <p:nvSpPr>
-            <p:cNvPr id="41" name="TextBox 40">
+            <p:cNvPr id="45" name="TextBox 44">
               <a:extLst>
                 <a:ext uri="{FF2B5EF4-FFF2-40B4-BE49-F238E27FC236}">
-                  <a16:creationId xmlns:a16="http://schemas.microsoft.com/office/drawing/2014/main" id="{B518140A-1821-44F9-8E9D-D1D150307634}"/>
+                  <a16:creationId xmlns:a16="http://schemas.microsoft.com/office/drawing/2014/main" id="{5B2FD2C5-4A9B-445D-BBB3-2E128EC92706}"/>
                 </a:ext>
               </a:extLst>
             </p:cNvPr>
@@ -5378,8 +5478,8 @@
           </p:nvSpPr>
           <p:spPr>
             <a:xfrm>
-              <a:off x="9212691" y="4131954"/>
-              <a:ext cx="1018600" cy="415498"/>
+              <a:off x="9212691" y="4923031"/>
+              <a:ext cx="1412967" cy="253916"/>
             </a:xfrm>
             <a:prstGeom prst="rect">
               <a:avLst/>
@@ -5396,17 +5496,17 @@
                 <a:rPr lang="en-GB" sz="1050" dirty="0">
                   <a:latin typeface="Abadi" panose="020B0604020104020204" pitchFamily="34" charset="0"/>
                 </a:rPr>
-                <a:t>atomic_class_plot.py</a:t>
+                <a:t>mass_histogram.py</a:t>
               </a:r>
             </a:p>
           </p:txBody>
         </p:sp>
         <p:sp>
           <p:nvSpPr>
-            <p:cNvPr id="43" name="TextBox 42">
+            <p:cNvPr id="47" name="TextBox 46">
               <a:extLst>
                 <a:ext uri="{FF2B5EF4-FFF2-40B4-BE49-F238E27FC236}">
-                  <a16:creationId xmlns:a16="http://schemas.microsoft.com/office/drawing/2014/main" id="{5B2FD2C5-4A9B-445D-BBB3-2E128EC92706}"/>
+                  <a16:creationId xmlns:a16="http://schemas.microsoft.com/office/drawing/2014/main" id="{4B9C0C85-4EF8-4491-B0EE-19C68CE97DD2}"/>
                 </a:ext>
               </a:extLst>
             </p:cNvPr>
@@ -5415,8 +5515,8 @@
           </p:nvSpPr>
           <p:spPr>
             <a:xfrm>
-              <a:off x="9212691" y="4520232"/>
-              <a:ext cx="1195263" cy="415498"/>
+              <a:off x="114215" y="5144673"/>
+              <a:ext cx="1836722" cy="253916"/>
             </a:xfrm>
             <a:prstGeom prst="rect">
               <a:avLst/>
@@ -5433,150 +5533,92 @@
                 <a:rPr lang="en-GB" sz="1050" dirty="0">
                   <a:latin typeface="Abadi" panose="020B0604020104020204" pitchFamily="34" charset="0"/>
                 </a:rPr>
-                <a:t>compound_class_plot.py</a:t>
+                <a:t>read_formularity.py</a:t>
+              </a:r>
+            </a:p>
+          </p:txBody>
+        </p:sp>
+        <p:sp>
+          <p:nvSpPr>
+            <p:cNvPr id="48" name="TextBox 47">
+              <a:extLst>
+                <a:ext uri="{FF2B5EF4-FFF2-40B4-BE49-F238E27FC236}">
+                  <a16:creationId xmlns:a16="http://schemas.microsoft.com/office/drawing/2014/main" id="{5B2FD2C5-4A9B-445D-BBB3-2E128EC92706}"/>
+                </a:ext>
+              </a:extLst>
+            </p:cNvPr>
+            <p:cNvSpPr txBox="1"/>
+            <p:nvPr/>
+          </p:nvSpPr>
+          <p:spPr>
+            <a:xfrm>
+              <a:off x="9203358" y="5174849"/>
+              <a:ext cx="1412967" cy="253916"/>
+            </a:xfrm>
+            <a:prstGeom prst="rect">
+              <a:avLst/>
+            </a:prstGeom>
+            <a:noFill/>
+          </p:spPr>
+          <p:txBody>
+            <a:bodyPr wrap="square" rtlCol="0">
+              <a:spAutoFit/>
+            </a:bodyPr>
+            <a:lstStyle/>
+            <a:p>
+              <a:r>
+                <a:rPr lang="en-GB" sz="1050" dirty="0">
+                  <a:latin typeface="Abadi" panose="020B0604020104020204" pitchFamily="34" charset="0"/>
+                </a:rPr>
+                <a:t>mass_spectrum.py</a:t>
+              </a:r>
+            </a:p>
+          </p:txBody>
+        </p:sp>
+        <p:sp>
+          <p:nvSpPr>
+            <p:cNvPr id="49" name="TextBox 48">
+              <a:extLst>
+                <a:ext uri="{FF2B5EF4-FFF2-40B4-BE49-F238E27FC236}">
+                  <a16:creationId xmlns:a16="http://schemas.microsoft.com/office/drawing/2014/main" id="{FF499F3A-53C1-46A7-A9CD-97D60F3E92CA}"/>
+                </a:ext>
+              </a:extLst>
+            </p:cNvPr>
+            <p:cNvSpPr txBox="1"/>
+            <p:nvPr/>
+          </p:nvSpPr>
+          <p:spPr>
+            <a:xfrm>
+              <a:off x="1825039" y="4416649"/>
+              <a:ext cx="1034058" cy="415498"/>
+            </a:xfrm>
+            <a:prstGeom prst="rect">
+              <a:avLst/>
+            </a:prstGeom>
+            <a:noFill/>
+          </p:spPr>
+          <p:txBody>
+            <a:bodyPr wrap="square" rtlCol="0">
+              <a:spAutoFit/>
+            </a:bodyPr>
+            <a:lstStyle/>
+            <a:p>
+              <a:r>
+                <a:rPr lang="en-US" sz="1050" dirty="0">
+                  <a:latin typeface="Abadi" panose="020B0604020104020204" pitchFamily="34" charset="0"/>
+                </a:rPr>
+                <a:t>f</a:t>
+              </a:r>
+              <a:r>
+                <a:rPr lang="en-GB" sz="1050" dirty="0">
+                  <a:latin typeface="Abadi" panose="020B0604020104020204" pitchFamily="34" charset="0"/>
+                </a:rPr>
+                <a:t>ilter_spectral_interference.py</a:t>
               </a:r>
             </a:p>
           </p:txBody>
         </p:sp>
       </p:grpSp>
-      <p:sp>
-        <p:nvSpPr>
-          <p:cNvPr id="45" name="TextBox 44">
-            <a:extLst>
-              <a:ext uri="{FF2B5EF4-FFF2-40B4-BE49-F238E27FC236}">
-                <a16:creationId xmlns:a16="http://schemas.microsoft.com/office/drawing/2014/main" id="{5B2FD2C5-4A9B-445D-BBB3-2E128EC92706}"/>
-              </a:ext>
-            </a:extLst>
-          </p:cNvPr>
-          <p:cNvSpPr txBox="1"/>
-          <p:nvPr/>
-        </p:nvSpPr>
-        <p:spPr>
-          <a:xfrm>
-            <a:off x="9212691" y="4923031"/>
-            <a:ext cx="1412967" cy="253916"/>
-          </a:xfrm>
-          <a:prstGeom prst="rect">
-            <a:avLst/>
-          </a:prstGeom>
-          <a:noFill/>
-        </p:spPr>
-        <p:txBody>
-          <a:bodyPr wrap="square" rtlCol="0">
-            <a:spAutoFit/>
-          </a:bodyPr>
-          <a:lstStyle/>
-          <a:p>
-            <a:r>
-              <a:rPr lang="en-GB" sz="1050" dirty="0" smtClean="0">
-                <a:latin typeface="Abadi" panose="020B0604020104020204" pitchFamily="34" charset="0"/>
-              </a:rPr>
-              <a:t>mass_histogram</a:t>
-            </a:r>
-            <a:r>
-              <a:rPr lang="en-GB" sz="1050" dirty="0" smtClean="0">
-                <a:latin typeface="Abadi" panose="020B0604020104020204" pitchFamily="34" charset="0"/>
-              </a:rPr>
-              <a:t>.py</a:t>
-            </a:r>
-            <a:endParaRPr lang="en-GB" sz="1050" dirty="0">
-              <a:latin typeface="Abadi" panose="020B0604020104020204" pitchFamily="34" charset="0"/>
-            </a:endParaRPr>
-          </a:p>
-        </p:txBody>
-      </p:sp>
-      <p:sp>
-        <p:nvSpPr>
-          <p:cNvPr id="47" name="TextBox 46">
-            <a:extLst>
-              <a:ext uri="{FF2B5EF4-FFF2-40B4-BE49-F238E27FC236}">
-                <a16:creationId xmlns:a16="http://schemas.microsoft.com/office/drawing/2014/main" id="{4B9C0C85-4EF8-4491-B0EE-19C68CE97DD2}"/>
-              </a:ext>
-            </a:extLst>
-          </p:cNvPr>
-          <p:cNvSpPr txBox="1"/>
-          <p:nvPr/>
-        </p:nvSpPr>
-        <p:spPr>
-          <a:xfrm>
-            <a:off x="114215" y="5144673"/>
-            <a:ext cx="1836722" cy="253916"/>
-          </a:xfrm>
-          <a:prstGeom prst="rect">
-            <a:avLst/>
-          </a:prstGeom>
-          <a:noFill/>
-        </p:spPr>
-        <p:txBody>
-          <a:bodyPr wrap="square" rtlCol="0">
-            <a:spAutoFit/>
-          </a:bodyPr>
-          <a:lstStyle/>
-          <a:p>
-            <a:r>
-              <a:rPr lang="en-GB" sz="1050" dirty="0" smtClean="0">
-                <a:latin typeface="Abadi" panose="020B0604020104020204" pitchFamily="34" charset="0"/>
-              </a:rPr>
-              <a:t>read_formularity</a:t>
-            </a:r>
-            <a:r>
-              <a:rPr lang="en-GB" sz="1050" dirty="0" smtClean="0">
-                <a:latin typeface="Abadi" panose="020B0604020104020204" pitchFamily="34" charset="0"/>
-              </a:rPr>
-              <a:t>.py</a:t>
-            </a:r>
-            <a:endParaRPr lang="en-GB" sz="1050" dirty="0">
-              <a:latin typeface="Abadi" panose="020B0604020104020204" pitchFamily="34" charset="0"/>
-            </a:endParaRPr>
-          </a:p>
-        </p:txBody>
-      </p:sp>
-      <p:sp>
-        <p:nvSpPr>
-          <p:cNvPr id="48" name="TextBox 47">
-            <a:extLst>
-              <a:ext uri="{FF2B5EF4-FFF2-40B4-BE49-F238E27FC236}">
-                <a16:creationId xmlns:a16="http://schemas.microsoft.com/office/drawing/2014/main" id="{5B2FD2C5-4A9B-445D-BBB3-2E128EC92706}"/>
-              </a:ext>
-            </a:extLst>
-          </p:cNvPr>
-          <p:cNvSpPr txBox="1"/>
-          <p:nvPr/>
-        </p:nvSpPr>
-        <p:spPr>
-          <a:xfrm>
-            <a:off x="9203358" y="5174849"/>
-            <a:ext cx="1412967" cy="253916"/>
-          </a:xfrm>
-          <a:prstGeom prst="rect">
-            <a:avLst/>
-          </a:prstGeom>
-          <a:noFill/>
-        </p:spPr>
-        <p:txBody>
-          <a:bodyPr wrap="square" rtlCol="0">
-            <a:spAutoFit/>
-          </a:bodyPr>
-          <a:lstStyle/>
-          <a:p>
-            <a:r>
-              <a:rPr lang="en-GB" sz="1050" dirty="0" smtClean="0">
-                <a:latin typeface="Abadi" panose="020B0604020104020204" pitchFamily="34" charset="0"/>
-              </a:rPr>
-              <a:t>mass_spectrum</a:t>
-            </a:r>
-            <a:r>
-              <a:rPr lang="en-GB" sz="1050" dirty="0" smtClean="0">
-                <a:latin typeface="Abadi" panose="020B0604020104020204" pitchFamily="34" charset="0"/>
-              </a:rPr>
-              <a:t>.py</a:t>
-            </a:r>
-            <a:endParaRPr lang="en-GB" sz="1050" dirty="0">
-              <a:latin typeface="Abadi" panose="020B0604020104020204" pitchFamily="34" charset="0"/>
-            </a:endParaRPr>
-          </a:p>
-        </p:txBody>
-      </p:sp>
     </p:spTree>
     <p:extLst>
       <p:ext uri="{BB962C8B-B14F-4D97-AF65-F5344CB8AC3E}">

</xml_diff>